<commit_message>
Presentation improvement by ValueOverStatic
</commit_message>
<xml_diff>
--- a/Seminar1_Github_v02.pptx
+++ b/Seminar1_Github_v02.pptx
@@ -5,7 +5,7 @@
     <p:sldMasterId id="2147483659" r:id="rId1"/>
   </p:sldMasterIdLst>
   <p:notesMasterIdLst>
-    <p:notesMasterId r:id="rId22"/>
+    <p:notesMasterId r:id="rId21"/>
   </p:notesMasterIdLst>
   <p:sldIdLst>
     <p:sldId id="256" r:id="rId2"/>
@@ -21,30 +21,29 @@
     <p:sldId id="270" r:id="rId12"/>
     <p:sldId id="271" r:id="rId13"/>
     <p:sldId id="272" r:id="rId14"/>
-    <p:sldId id="274" r:id="rId15"/>
-    <p:sldId id="273" r:id="rId16"/>
-    <p:sldId id="275" r:id="rId17"/>
-    <p:sldId id="276" r:id="rId18"/>
-    <p:sldId id="277" r:id="rId19"/>
-    <p:sldId id="278" r:id="rId20"/>
-    <p:sldId id="279" r:id="rId21"/>
+    <p:sldId id="273" r:id="rId15"/>
+    <p:sldId id="275" r:id="rId16"/>
+    <p:sldId id="276" r:id="rId17"/>
+    <p:sldId id="277" r:id="rId18"/>
+    <p:sldId id="278" r:id="rId19"/>
+    <p:sldId id="279" r:id="rId20"/>
   </p:sldIdLst>
   <p:sldSz cx="9144000" cy="5143500" type="screen16x9"/>
   <p:notesSz cx="6858000" cy="9144000"/>
   <p:embeddedFontLst>
     <p:embeddedFont>
-      <p:font typeface="Montserrat" panose="020B0604020202020204" charset="-52"/>
-      <p:regular r:id="rId23"/>
-      <p:bold r:id="rId24"/>
-      <p:italic r:id="rId25"/>
-      <p:boldItalic r:id="rId26"/>
+      <p:font typeface="Montserrat" charset="-52"/>
+      <p:regular r:id="rId22"/>
+      <p:bold r:id="rId23"/>
+      <p:italic r:id="rId24"/>
+      <p:boldItalic r:id="rId25"/>
     </p:embeddedFont>
     <p:embeddedFont>
-      <p:font typeface="Lato" panose="020B0604020202020204" charset="0"/>
-      <p:regular r:id="rId27"/>
-      <p:bold r:id="rId28"/>
-      <p:italic r:id="rId29"/>
-      <p:boldItalic r:id="rId30"/>
+      <p:font typeface="Lato" charset="0"/>
+      <p:regular r:id="rId26"/>
+      <p:bold r:id="rId27"/>
+      <p:italic r:id="rId28"/>
+      <p:boldItalic r:id="rId29"/>
     </p:embeddedFont>
   </p:embeddedFontLst>
   <p:defaultTextStyle>
@@ -278,7 +277,7 @@
   </p:defaultTextStyle>
   <p:extLst>
     <p:ext uri="{EFAFB233-063F-42B5-8137-9DF3F51BA10A}">
-      <p15:sldGuideLst xmlns:p15="http://schemas.microsoft.com/office/powerpoint/2012/main">
+      <p15:sldGuideLst xmlns:p15="http://schemas.microsoft.com/office/powerpoint/2012/main" xmlns="">
         <p15:guide id="1" orient="horz" pos="1620">
           <p15:clr>
             <a:srgbClr val="A4A3A4"/>
@@ -522,6 +521,11 @@
         </p:txBody>
       </p:sp>
     </p:spTree>
+    <p:extLst>
+      <p:ext uri="{BB962C8B-B14F-4D97-AF65-F5344CB8AC3E}">
+        <p14:creationId xmlns:p14="http://schemas.microsoft.com/office/powerpoint/2010/main" val="3952077279"/>
+      </p:ext>
+    </p:extLst>
   </p:cSld>
   <p:clrMap bg1="lt1" tx1="dk1" bg2="dk2" tx2="lt2" accent1="accent1" accent2="accent2" accent3="accent3" accent4="accent4" accent5="accent5" accent6="accent6" hlink="hlink" folHlink="folHlink"/>
   <p:notesStyle>
@@ -1281,110 +1285,6 @@
   <p:cSld>
     <p:spTree>
       <p:nvGrpSpPr>
-        <p:cNvPr id="1" name="Shape 292"/>
-        <p:cNvGrpSpPr/>
-        <p:nvPr/>
-      </p:nvGrpSpPr>
-      <p:grpSpPr>
-        <a:xfrm>
-          <a:off x="0" y="0"/>
-          <a:ext cx="0" cy="0"/>
-          <a:chOff x="0" y="0"/>
-          <a:chExt cx="0" cy="0"/>
-        </a:xfrm>
-      </p:grpSpPr>
-      <p:sp>
-        <p:nvSpPr>
-          <p:cNvPr id="293" name="Google Shape;293;g72f56af603_2_27:notes"/>
-          <p:cNvSpPr>
-            <a:spLocks noGrp="1" noRot="1" noChangeAspect="1"/>
-          </p:cNvSpPr>
-          <p:nvPr>
-            <p:ph type="sldImg" idx="2"/>
-          </p:nvPr>
-        </p:nvSpPr>
-        <p:spPr>
-          <a:xfrm>
-            <a:off x="381000" y="685800"/>
-            <a:ext cx="6096000" cy="3429000"/>
-          </a:xfrm>
-          <a:custGeom>
-            <a:avLst/>
-            <a:gdLst/>
-            <a:ahLst/>
-            <a:cxnLst/>
-            <a:rect l="l" t="t" r="r" b="b"/>
-            <a:pathLst>
-              <a:path w="120000" h="120000" extrusionOk="0">
-                <a:moveTo>
-                  <a:pt x="0" y="0"/>
-                </a:moveTo>
-                <a:lnTo>
-                  <a:pt x="120000" y="0"/>
-                </a:lnTo>
-                <a:lnTo>
-                  <a:pt x="120000" y="120000"/>
-                </a:lnTo>
-                <a:lnTo>
-                  <a:pt x="0" y="120000"/>
-                </a:lnTo>
-                <a:close/>
-              </a:path>
-            </a:pathLst>
-          </a:custGeom>
-        </p:spPr>
-      </p:sp>
-      <p:sp>
-        <p:nvSpPr>
-          <p:cNvPr id="294" name="Google Shape;294;g72f56af603_2_27:notes"/>
-          <p:cNvSpPr txBox="1">
-            <a:spLocks noGrp="1"/>
-          </p:cNvSpPr>
-          <p:nvPr>
-            <p:ph type="body" idx="1"/>
-          </p:nvPr>
-        </p:nvSpPr>
-        <p:spPr>
-          <a:xfrm>
-            <a:off x="685800" y="4343400"/>
-            <a:ext cx="5486400" cy="4114800"/>
-          </a:xfrm>
-          <a:prstGeom prst="rect">
-            <a:avLst/>
-          </a:prstGeom>
-        </p:spPr>
-        <p:txBody>
-          <a:bodyPr spcFirstLastPara="1" wrap="square" lIns="91425" tIns="91425" rIns="91425" bIns="91425" anchor="t" anchorCtr="0">
-            <a:noAutofit/>
-          </a:bodyPr>
-          <a:lstStyle/>
-          <a:p>
-            <a:pPr marL="0" lvl="0" indent="0" algn="l" rtl="0">
-              <a:spcBef>
-                <a:spcPts val="0"/>
-              </a:spcBef>
-              <a:spcAft>
-                <a:spcPts val="0"/>
-              </a:spcAft>
-              <a:buNone/>
-            </a:pPr>
-            <a:endParaRPr/>
-          </a:p>
-        </p:txBody>
-      </p:sp>
-    </p:spTree>
-  </p:cSld>
-  <p:clrMapOvr>
-    <a:masterClrMapping/>
-  </p:clrMapOvr>
-</p:notes>
-</file>
-
-<file path=ppt/notesSlides/notesSlide15.xml><?xml version="1.0" encoding="utf-8"?>
-<p:notes xmlns:a="http://schemas.openxmlformats.org/drawingml/2006/main" xmlns:r="http://schemas.openxmlformats.org/officeDocument/2006/relationships" xmlns:p="http://schemas.openxmlformats.org/presentationml/2006/main" showMasterSp="0" showMasterPhAnim="0">
-  <p:cSld>
-    <p:spTree>
-      <p:nvGrpSpPr>
         <p:cNvPr id="1" name="Shape 283"/>
         <p:cNvGrpSpPr/>
         <p:nvPr/>
@@ -1484,7 +1384,7 @@
 </p:notes>
 </file>
 
-<file path=ppt/notesSlides/notesSlide16.xml><?xml version="1.0" encoding="utf-8"?>
+<file path=ppt/notesSlides/notesSlide15.xml><?xml version="1.0" encoding="utf-8"?>
 <p:notes xmlns:a="http://schemas.openxmlformats.org/drawingml/2006/main" xmlns:r="http://schemas.openxmlformats.org/officeDocument/2006/relationships" xmlns:p="http://schemas.openxmlformats.org/presentationml/2006/main" showMasterSp="0" showMasterPhAnim="0">
   <p:cSld>
     <p:spTree>
@@ -1588,7 +1488,7 @@
 </p:notes>
 </file>
 
-<file path=ppt/notesSlides/notesSlide17.xml><?xml version="1.0" encoding="utf-8"?>
+<file path=ppt/notesSlides/notesSlide16.xml><?xml version="1.0" encoding="utf-8"?>
 <p:notes xmlns:a="http://schemas.openxmlformats.org/drawingml/2006/main" xmlns:r="http://schemas.openxmlformats.org/officeDocument/2006/relationships" xmlns:p="http://schemas.openxmlformats.org/presentationml/2006/main" showMasterSp="0" showMasterPhAnim="0">
   <p:cSld>
     <p:spTree>
@@ -1692,7 +1592,7 @@
 </p:notes>
 </file>
 
-<file path=ppt/notesSlides/notesSlide18.xml><?xml version="1.0" encoding="utf-8"?>
+<file path=ppt/notesSlides/notesSlide17.xml><?xml version="1.0" encoding="utf-8"?>
 <p:notes xmlns:a="http://schemas.openxmlformats.org/drawingml/2006/main" xmlns:r="http://schemas.openxmlformats.org/officeDocument/2006/relationships" xmlns:p="http://schemas.openxmlformats.org/presentationml/2006/main" showMasterSp="0" showMasterPhAnim="0">
   <p:cSld>
     <p:spTree>
@@ -1796,7 +1696,7 @@
 </p:notes>
 </file>
 
-<file path=ppt/notesSlides/notesSlide19.xml><?xml version="1.0" encoding="utf-8"?>
+<file path=ppt/notesSlides/notesSlide18.xml><?xml version="1.0" encoding="utf-8"?>
 <p:notes xmlns:a="http://schemas.openxmlformats.org/drawingml/2006/main" xmlns:r="http://schemas.openxmlformats.org/officeDocument/2006/relationships" xmlns:p="http://schemas.openxmlformats.org/presentationml/2006/main" showMasterSp="0" showMasterPhAnim="0">
   <p:cSld>
     <p:spTree>
@@ -2049,6 +1949,110 @@
 </p:notes>
 </file>
 
+<file path=ppt/notesSlides/notesSlide19.xml><?xml version="1.0" encoding="utf-8"?>
+<p:notes xmlns:a="http://schemas.openxmlformats.org/drawingml/2006/main" xmlns:r="http://schemas.openxmlformats.org/officeDocument/2006/relationships" xmlns:p="http://schemas.openxmlformats.org/presentationml/2006/main" showMasterSp="0" showMasterPhAnim="0">
+  <p:cSld>
+    <p:spTree>
+      <p:nvGrpSpPr>
+        <p:cNvPr id="1" name="Shape 328"/>
+        <p:cNvGrpSpPr/>
+        <p:nvPr/>
+      </p:nvGrpSpPr>
+      <p:grpSpPr>
+        <a:xfrm>
+          <a:off x="0" y="0"/>
+          <a:ext cx="0" cy="0"/>
+          <a:chOff x="0" y="0"/>
+          <a:chExt cx="0" cy="0"/>
+        </a:xfrm>
+      </p:grpSpPr>
+      <p:sp>
+        <p:nvSpPr>
+          <p:cNvPr id="329" name="Google Shape;329;g72be0e060f_0_11:notes"/>
+          <p:cNvSpPr>
+            <a:spLocks noGrp="1" noRot="1" noChangeAspect="1"/>
+          </p:cNvSpPr>
+          <p:nvPr>
+            <p:ph type="sldImg" idx="2"/>
+          </p:nvPr>
+        </p:nvSpPr>
+        <p:spPr>
+          <a:xfrm>
+            <a:off x="381000" y="685800"/>
+            <a:ext cx="6096000" cy="3429000"/>
+          </a:xfrm>
+          <a:custGeom>
+            <a:avLst/>
+            <a:gdLst/>
+            <a:ahLst/>
+            <a:cxnLst/>
+            <a:rect l="l" t="t" r="r" b="b"/>
+            <a:pathLst>
+              <a:path w="120000" h="120000" extrusionOk="0">
+                <a:moveTo>
+                  <a:pt x="0" y="0"/>
+                </a:moveTo>
+                <a:lnTo>
+                  <a:pt x="120000" y="0"/>
+                </a:lnTo>
+                <a:lnTo>
+                  <a:pt x="120000" y="120000"/>
+                </a:lnTo>
+                <a:lnTo>
+                  <a:pt x="0" y="120000"/>
+                </a:lnTo>
+                <a:close/>
+              </a:path>
+            </a:pathLst>
+          </a:custGeom>
+        </p:spPr>
+      </p:sp>
+      <p:sp>
+        <p:nvSpPr>
+          <p:cNvPr id="330" name="Google Shape;330;g72be0e060f_0_11:notes"/>
+          <p:cNvSpPr txBox="1">
+            <a:spLocks noGrp="1"/>
+          </p:cNvSpPr>
+          <p:nvPr>
+            <p:ph type="body" idx="1"/>
+          </p:nvPr>
+        </p:nvSpPr>
+        <p:spPr>
+          <a:xfrm>
+            <a:off x="685800" y="4343400"/>
+            <a:ext cx="5486400" cy="4114800"/>
+          </a:xfrm>
+          <a:prstGeom prst="rect">
+            <a:avLst/>
+          </a:prstGeom>
+        </p:spPr>
+        <p:txBody>
+          <a:bodyPr spcFirstLastPara="1" wrap="square" lIns="91425" tIns="91425" rIns="91425" bIns="91425" anchor="t" anchorCtr="0">
+            <a:noAutofit/>
+          </a:bodyPr>
+          <a:lstStyle/>
+          <a:p>
+            <a:pPr marL="0" lvl="0" indent="0" algn="l" rtl="0">
+              <a:spcBef>
+                <a:spcPts val="0"/>
+              </a:spcBef>
+              <a:spcAft>
+                <a:spcPts val="0"/>
+              </a:spcAft>
+              <a:buNone/>
+            </a:pPr>
+            <a:endParaRPr/>
+          </a:p>
+        </p:txBody>
+      </p:sp>
+    </p:spTree>
+  </p:cSld>
+  <p:clrMapOvr>
+    <a:masterClrMapping/>
+  </p:clrMapOvr>
+</p:notes>
+</file>
+
 <file path=ppt/notesSlides/notesSlide2.xml><?xml version="1.0" encoding="utf-8"?>
 <p:notes xmlns:a="http://schemas.openxmlformats.org/drawingml/2006/main" xmlns:r="http://schemas.openxmlformats.org/officeDocument/2006/relationships" xmlns:p="http://schemas.openxmlformats.org/presentationml/2006/main" showMasterSp="0" showMasterPhAnim="0">
   <p:cSld>
@@ -2110,110 +2114,6 @@
       <p:sp>
         <p:nvSpPr>
           <p:cNvPr id="171" name="Google Shape;171;g72e66355c3_0_0:notes"/>
-          <p:cNvSpPr txBox="1">
-            <a:spLocks noGrp="1"/>
-          </p:cNvSpPr>
-          <p:nvPr>
-            <p:ph type="body" idx="1"/>
-          </p:nvPr>
-        </p:nvSpPr>
-        <p:spPr>
-          <a:xfrm>
-            <a:off x="685800" y="4343400"/>
-            <a:ext cx="5486400" cy="4114800"/>
-          </a:xfrm>
-          <a:prstGeom prst="rect">
-            <a:avLst/>
-          </a:prstGeom>
-        </p:spPr>
-        <p:txBody>
-          <a:bodyPr spcFirstLastPara="1" wrap="square" lIns="91425" tIns="91425" rIns="91425" bIns="91425" anchor="t" anchorCtr="0">
-            <a:noAutofit/>
-          </a:bodyPr>
-          <a:lstStyle/>
-          <a:p>
-            <a:pPr marL="0" lvl="0" indent="0" algn="l" rtl="0">
-              <a:spcBef>
-                <a:spcPts val="0"/>
-              </a:spcBef>
-              <a:spcAft>
-                <a:spcPts val="0"/>
-              </a:spcAft>
-              <a:buNone/>
-            </a:pPr>
-            <a:endParaRPr/>
-          </a:p>
-        </p:txBody>
-      </p:sp>
-    </p:spTree>
-  </p:cSld>
-  <p:clrMapOvr>
-    <a:masterClrMapping/>
-  </p:clrMapOvr>
-</p:notes>
-</file>
-
-<file path=ppt/notesSlides/notesSlide20.xml><?xml version="1.0" encoding="utf-8"?>
-<p:notes xmlns:a="http://schemas.openxmlformats.org/drawingml/2006/main" xmlns:r="http://schemas.openxmlformats.org/officeDocument/2006/relationships" xmlns:p="http://schemas.openxmlformats.org/presentationml/2006/main" showMasterSp="0" showMasterPhAnim="0">
-  <p:cSld>
-    <p:spTree>
-      <p:nvGrpSpPr>
-        <p:cNvPr id="1" name="Shape 328"/>
-        <p:cNvGrpSpPr/>
-        <p:nvPr/>
-      </p:nvGrpSpPr>
-      <p:grpSpPr>
-        <a:xfrm>
-          <a:off x="0" y="0"/>
-          <a:ext cx="0" cy="0"/>
-          <a:chOff x="0" y="0"/>
-          <a:chExt cx="0" cy="0"/>
-        </a:xfrm>
-      </p:grpSpPr>
-      <p:sp>
-        <p:nvSpPr>
-          <p:cNvPr id="329" name="Google Shape;329;g72be0e060f_0_11:notes"/>
-          <p:cNvSpPr>
-            <a:spLocks noGrp="1" noRot="1" noChangeAspect="1"/>
-          </p:cNvSpPr>
-          <p:nvPr>
-            <p:ph type="sldImg" idx="2"/>
-          </p:nvPr>
-        </p:nvSpPr>
-        <p:spPr>
-          <a:xfrm>
-            <a:off x="381000" y="685800"/>
-            <a:ext cx="6096000" cy="3429000"/>
-          </a:xfrm>
-          <a:custGeom>
-            <a:avLst/>
-            <a:gdLst/>
-            <a:ahLst/>
-            <a:cxnLst/>
-            <a:rect l="l" t="t" r="r" b="b"/>
-            <a:pathLst>
-              <a:path w="120000" h="120000" extrusionOk="0">
-                <a:moveTo>
-                  <a:pt x="0" y="0"/>
-                </a:moveTo>
-                <a:lnTo>
-                  <a:pt x="120000" y="0"/>
-                </a:lnTo>
-                <a:lnTo>
-                  <a:pt x="120000" y="120000"/>
-                </a:lnTo>
-                <a:lnTo>
-                  <a:pt x="0" y="120000"/>
-                </a:lnTo>
-                <a:close/>
-              </a:path>
-            </a:pathLst>
-          </a:custGeom>
-        </p:spPr>
-      </p:sp>
-      <p:sp>
-        <p:nvSpPr>
-          <p:cNvPr id="330" name="Google Shape;330;g72be0e060f_0_11:notes"/>
           <p:cNvSpPr txBox="1">
             <a:spLocks noGrp="1"/>
           </p:cNvSpPr>
@@ -12555,9 +12455,12 @@
             </a:pPr>
             <a:r>
               <a:rPr lang="ru" dirty="0"/>
-              <a:t>100 млн. репозиторіїв - найбільший хостінг у світі</a:t>
-            </a:r>
-            <a:endParaRPr dirty="0"/>
+              <a:t>100 млн. репозиторіїв - найбільший хостінг у </a:t>
+            </a:r>
+            <a:r>
+              <a:rPr lang="ru" dirty="0" smtClean="0"/>
+              <a:t>світі</a:t>
+            </a:r>
           </a:p>
         </p:txBody>
       </p:sp>
@@ -14272,709 +14175,6 @@
   <p:cSld>
     <p:spTree>
       <p:nvGrpSpPr>
-        <p:cNvPr id="1" name="Shape 295"/>
-        <p:cNvGrpSpPr/>
-        <p:nvPr/>
-      </p:nvGrpSpPr>
-      <p:grpSpPr>
-        <a:xfrm>
-          <a:off x="0" y="0"/>
-          <a:ext cx="0" cy="0"/>
-          <a:chOff x="0" y="0"/>
-          <a:chExt cx="0" cy="0"/>
-        </a:xfrm>
-      </p:grpSpPr>
-      <p:sp>
-        <p:nvSpPr>
-          <p:cNvPr id="296" name="Google Shape;296;p31"/>
-          <p:cNvSpPr txBox="1">
-            <a:spLocks noGrp="1"/>
-          </p:cNvSpPr>
-          <p:nvPr>
-            <p:ph type="title"/>
-          </p:nvPr>
-        </p:nvSpPr>
-        <p:spPr>
-          <a:xfrm>
-            <a:off x="1297500" y="393750"/>
-            <a:ext cx="7038900" cy="914100"/>
-          </a:xfrm>
-          <a:prstGeom prst="rect">
-            <a:avLst/>
-          </a:prstGeom>
-        </p:spPr>
-        <p:txBody>
-          <a:bodyPr spcFirstLastPara="1" wrap="square" lIns="91425" tIns="91425" rIns="91425" bIns="91425" anchor="t" anchorCtr="0">
-            <a:noAutofit/>
-          </a:bodyPr>
-          <a:lstStyle/>
-          <a:p>
-            <a:pPr marL="0" lvl="0" indent="0" algn="l" rtl="0">
-              <a:spcBef>
-                <a:spcPts val="0"/>
-              </a:spcBef>
-              <a:spcAft>
-                <a:spcPts val="0"/>
-              </a:spcAft>
-              <a:buNone/>
-            </a:pPr>
-            <a:r>
-              <a:rPr lang="ru" dirty="0"/>
-              <a:t>GitHub: Git на </a:t>
-            </a:r>
-            <a:r>
-              <a:rPr lang="ru" dirty="0" smtClean="0"/>
-              <a:t>сервері</a:t>
-            </a:r>
-            <a:r>
-              <a:rPr lang="en-US" dirty="0" smtClean="0"/>
-              <a:t>.</a:t>
-            </a:r>
-            <a:endParaRPr dirty="0"/>
-          </a:p>
-        </p:txBody>
-      </p:sp>
-      <p:sp>
-        <p:nvSpPr>
-          <p:cNvPr id="297" name="Google Shape;297;p31"/>
-          <p:cNvSpPr txBox="1">
-            <a:spLocks noGrp="1"/>
-          </p:cNvSpPr>
-          <p:nvPr>
-            <p:ph type="body" idx="1"/>
-          </p:nvPr>
-        </p:nvSpPr>
-        <p:spPr>
-          <a:xfrm>
-            <a:off x="311700" y="1152475"/>
-            <a:ext cx="8527500" cy="3416400"/>
-          </a:xfrm>
-          <a:prstGeom prst="rect">
-            <a:avLst/>
-          </a:prstGeom>
-        </p:spPr>
-        <p:txBody>
-          <a:bodyPr spcFirstLastPara="1" wrap="square" lIns="91425" tIns="91425" rIns="91425" bIns="91425" anchor="t" anchorCtr="0">
-            <a:noAutofit/>
-          </a:bodyPr>
-          <a:lstStyle/>
-          <a:p>
-            <a:pPr marL="0" lvl="0" indent="0" algn="l" rtl="0">
-              <a:spcBef>
-                <a:spcPts val="0"/>
-              </a:spcBef>
-              <a:spcAft>
-                <a:spcPts val="0"/>
-              </a:spcAft>
-              <a:buNone/>
-            </a:pPr>
-            <a:r>
-              <a:rPr lang="ru" dirty="0"/>
-              <a:t>Після створення Git-репозиторію на сайті GitHub, можна отримати доступ до нього з ПК за допомогою декількох кроків:</a:t>
-            </a:r>
-            <a:endParaRPr dirty="0"/>
-          </a:p>
-          <a:p>
-            <a:pPr marL="0" lvl="0" indent="0" algn="l" rtl="0">
-              <a:spcBef>
-                <a:spcPts val="1600"/>
-              </a:spcBef>
-              <a:spcAft>
-                <a:spcPts val="0"/>
-              </a:spcAft>
-              <a:buNone/>
-            </a:pPr>
-            <a:r>
-              <a:rPr lang="ru" b="1" i="1" dirty="0"/>
-              <a:t>Крок 1:</a:t>
-            </a:r>
-            <a:r>
-              <a:rPr lang="ru" dirty="0"/>
-              <a:t> Відкрити створений раніше репозитарій та скопіювати URL-адресу поточної сторінки. Приблизний вигляд адреси наступний: </a:t>
-            </a:r>
-            <a:r>
-              <a:rPr lang="ru" sz="1100" u="sng" dirty="0">
-                <a:solidFill>
-                  <a:schemeClr val="hlink"/>
-                </a:solidFill>
-                <a:latin typeface="Arial"/>
-                <a:ea typeface="Arial"/>
-                <a:cs typeface="Arial"/>
-                <a:sym typeface="Arial"/>
-                <a:hlinkClick r:id="rId3"/>
-              </a:rPr>
-              <a:t>https://github.com/MyGitName/</a:t>
-            </a:r>
-            <a:r>
-              <a:rPr lang="ru" sz="1100" u="sng" dirty="0">
-                <a:solidFill>
-                  <a:schemeClr val="accent5"/>
-                </a:solidFill>
-                <a:latin typeface="Arial"/>
-                <a:ea typeface="Arial"/>
-                <a:cs typeface="Arial"/>
-                <a:sym typeface="Arial"/>
-                <a:hlinkClick r:id="rId3"/>
-              </a:rPr>
-              <a:t>MyGitRepository</a:t>
-            </a:r>
-            <a:r>
-              <a:rPr lang="ru" dirty="0"/>
-              <a:t> .</a:t>
-            </a:r>
-            <a:endParaRPr dirty="0"/>
-          </a:p>
-          <a:p>
-            <a:pPr marL="0" lvl="0" indent="0" algn="l" rtl="0">
-              <a:spcBef>
-                <a:spcPts val="1600"/>
-              </a:spcBef>
-              <a:spcAft>
-                <a:spcPts val="0"/>
-              </a:spcAft>
-              <a:buNone/>
-            </a:pPr>
-            <a:r>
-              <a:rPr lang="ru" b="1" i="1" dirty="0"/>
-              <a:t>Крок 2:</a:t>
-            </a:r>
-            <a:r>
-              <a:rPr lang="ru" dirty="0"/>
-              <a:t> Запускаємо клієнт Git Bash та переходимо в необхідну робочу директорію, наприклад, </a:t>
-            </a:r>
-            <a:r>
-              <a:rPr lang="ru" dirty="0">
-                <a:latin typeface="Courier New" panose="02070309020205020404" pitchFamily="49" charset="0"/>
-                <a:cs typeface="Courier New" panose="02070309020205020404" pitchFamily="49" charset="0"/>
-              </a:rPr>
-              <a:t>cd D:/Work_Dir</a:t>
-            </a:r>
-            <a:r>
-              <a:rPr lang="ru" dirty="0"/>
-              <a:t>.</a:t>
-            </a:r>
-            <a:endParaRPr dirty="0"/>
-          </a:p>
-          <a:p>
-            <a:pPr marL="0" lvl="0" indent="0" algn="l" rtl="0">
-              <a:spcBef>
-                <a:spcPts val="1600"/>
-              </a:spcBef>
-              <a:spcAft>
-                <a:spcPts val="0"/>
-              </a:spcAft>
-              <a:buNone/>
-            </a:pPr>
-            <a:r>
-              <a:rPr lang="ru" b="1" i="1" dirty="0"/>
-              <a:t>Крок 3:</a:t>
-            </a:r>
-            <a:r>
-              <a:rPr lang="ru" dirty="0"/>
-              <a:t> Копіюємо створений репозиторій на комп’ютер командою:</a:t>
-            </a:r>
-            <a:br>
-              <a:rPr lang="ru" dirty="0"/>
-            </a:br>
-            <a:r>
-              <a:rPr lang="ru" dirty="0"/>
-              <a:t>     </a:t>
-            </a:r>
-            <a:r>
-              <a:rPr lang="ru" sz="1100" dirty="0">
-                <a:solidFill>
-                  <a:schemeClr val="bg1"/>
-                </a:solidFill>
-                <a:latin typeface="Courier New"/>
-                <a:ea typeface="Courier New"/>
-                <a:cs typeface="Courier New"/>
-                <a:sym typeface="Courier New"/>
-              </a:rPr>
-              <a:t>git clone </a:t>
-            </a:r>
-            <a:r>
-              <a:rPr lang="ru" sz="1100" dirty="0">
-                <a:ln>
-                  <a:solidFill>
-                    <a:schemeClr val="bg1"/>
-                  </a:solidFill>
-                </a:ln>
-                <a:solidFill>
-                  <a:schemeClr val="bg1"/>
-                </a:solidFill>
-                <a:uFill>
-                  <a:noFill/>
-                </a:uFill>
-                <a:latin typeface="Courier New"/>
-                <a:ea typeface="Courier New"/>
-                <a:cs typeface="Courier New"/>
-                <a:sym typeface="Courier New"/>
-              </a:rPr>
-              <a:t>https://github.com/MyGitName/MyGitRepository</a:t>
-            </a:r>
-            <a:endParaRPr sz="1100" dirty="0">
-              <a:ln>
-                <a:solidFill>
-                  <a:schemeClr val="bg1"/>
-                </a:solidFill>
-              </a:ln>
-              <a:solidFill>
-                <a:schemeClr val="bg1"/>
-              </a:solidFill>
-              <a:latin typeface="Courier New"/>
-              <a:ea typeface="Courier New"/>
-              <a:cs typeface="Courier New"/>
-              <a:sym typeface="Courier New"/>
-            </a:endParaRPr>
-          </a:p>
-          <a:p>
-            <a:pPr marL="0" lvl="0" indent="0" algn="l" rtl="0">
-              <a:spcBef>
-                <a:spcPts val="1600"/>
-              </a:spcBef>
-              <a:spcAft>
-                <a:spcPts val="1600"/>
-              </a:spcAft>
-              <a:buNone/>
-            </a:pPr>
-            <a:r>
-              <a:rPr lang="ru" sz="1100" dirty="0">
-                <a:latin typeface="Courier New"/>
-                <a:ea typeface="Courier New"/>
-                <a:cs typeface="Courier New"/>
-                <a:sym typeface="Courier New"/>
-              </a:rPr>
-              <a:t>За необхідності відправляємо на сервер файли за допомогою команди:</a:t>
-            </a:r>
-            <a:br>
-              <a:rPr lang="ru" sz="1100" dirty="0">
-                <a:latin typeface="Courier New"/>
-                <a:ea typeface="Courier New"/>
-                <a:cs typeface="Courier New"/>
-                <a:sym typeface="Courier New"/>
-              </a:rPr>
-            </a:br>
-            <a:r>
-              <a:rPr lang="ru" dirty="0"/>
-              <a:t>     </a:t>
-            </a:r>
-            <a:r>
-              <a:rPr lang="ru" sz="1100" dirty="0">
-                <a:latin typeface="Courier New"/>
-                <a:ea typeface="Courier New"/>
-                <a:cs typeface="Courier New"/>
-                <a:sym typeface="Courier New"/>
-              </a:rPr>
-              <a:t>git push</a:t>
-            </a:r>
-            <a:endParaRPr sz="1100" dirty="0">
-              <a:latin typeface="Courier New"/>
-              <a:ea typeface="Courier New"/>
-              <a:cs typeface="Courier New"/>
-              <a:sym typeface="Courier New"/>
-            </a:endParaRPr>
-          </a:p>
-        </p:txBody>
-      </p:sp>
-      <p:sp>
-        <p:nvSpPr>
-          <p:cNvPr id="5" name="Google Shape;180;p18"/>
-          <p:cNvSpPr txBox="1">
-            <a:spLocks noGrp="1"/>
-          </p:cNvSpPr>
-          <p:nvPr>
-            <p:ph type="sldNum" idx="12"/>
-          </p:nvPr>
-        </p:nvSpPr>
-        <p:spPr>
-          <a:xfrm>
-            <a:off x="7926375" y="180000"/>
-            <a:ext cx="1094725" cy="568200"/>
-          </a:xfrm>
-          <a:prstGeom prst="rect">
-            <a:avLst/>
-          </a:prstGeom>
-        </p:spPr>
-        <p:txBody>
-          <a:bodyPr spcFirstLastPara="1" wrap="square" lIns="91425" tIns="91425" rIns="91425" bIns="91425" anchor="ctr" anchorCtr="0">
-            <a:noAutofit/>
-          </a:bodyPr>
-          <a:lstStyle/>
-          <a:p>
-            <a:pPr marL="0" lvl="0" indent="0" algn="r" rtl="0">
-              <a:spcBef>
-                <a:spcPts val="0"/>
-              </a:spcBef>
-              <a:spcAft>
-                <a:spcPts val="0"/>
-              </a:spcAft>
-              <a:buNone/>
-            </a:pPr>
-            <a:fld id="{00000000-1234-1234-1234-123412341234}" type="slidenum">
-              <a:rPr lang="ru" sz="2500" smtClean="0">
-                <a:solidFill>
-                  <a:schemeClr val="lt1"/>
-                </a:solidFill>
-              </a:rPr>
-              <a:t>14</a:t>
-            </a:fld>
-            <a:r>
-              <a:rPr lang="ru" sz="2500" dirty="0" smtClean="0"/>
-              <a:t>/20</a:t>
-            </a:r>
-            <a:endParaRPr sz="2500" dirty="0">
-              <a:solidFill>
-                <a:schemeClr val="lt1"/>
-              </a:solidFill>
-            </a:endParaRPr>
-          </a:p>
-        </p:txBody>
-      </p:sp>
-    </p:spTree>
-  </p:cSld>
-  <p:clrMapOvr>
-    <a:masterClrMapping/>
-  </p:clrMapOvr>
-  <p:timing>
-    <p:tnLst>
-      <p:par>
-        <p:cTn id="1" dur="indefinite" restart="never" nodeType="tmRoot">
-          <p:childTnLst>
-            <p:seq concurrent="1" nextAc="seek">
-              <p:cTn id="2" dur="indefinite" nodeType="mainSeq">
-                <p:childTnLst>
-                  <p:par>
-                    <p:cTn id="3" fill="hold">
-                      <p:stCondLst>
-                        <p:cond delay="indefinite"/>
-                        <p:cond evt="onBegin" delay="0">
-                          <p:tn val="2"/>
-                        </p:cond>
-                      </p:stCondLst>
-                      <p:childTnLst>
-                        <p:par>
-                          <p:cTn id="4" fill="hold">
-                            <p:stCondLst>
-                              <p:cond delay="0"/>
-                            </p:stCondLst>
-                            <p:childTnLst>
-                              <p:par>
-                                <p:cTn id="5" presetID="22" presetClass="entr" presetSubtype="8" fill="hold" grpId="0" nodeType="afterEffect">
-                                  <p:stCondLst>
-                                    <p:cond delay="0"/>
-                                  </p:stCondLst>
-                                  <p:childTnLst>
-                                    <p:set>
-                                      <p:cBhvr>
-                                        <p:cTn id="6" dur="1" fill="hold">
-                                          <p:stCondLst>
-                                            <p:cond delay="0"/>
-                                          </p:stCondLst>
-                                        </p:cTn>
-                                        <p:tgtEl>
-                                          <p:spTgt spid="297">
-                                            <p:txEl>
-                                              <p:pRg st="0" end="0"/>
-                                            </p:txEl>
-                                          </p:spTgt>
-                                        </p:tgtEl>
-                                        <p:attrNameLst>
-                                          <p:attrName>style.visibility</p:attrName>
-                                        </p:attrNameLst>
-                                      </p:cBhvr>
-                                      <p:to>
-                                        <p:strVal val="visible"/>
-                                      </p:to>
-                                    </p:set>
-                                    <p:animEffect transition="in" filter="wipe(left)">
-                                      <p:cBhvr>
-                                        <p:cTn id="7" dur="500"/>
-                                        <p:tgtEl>
-                                          <p:spTgt spid="297">
-                                            <p:txEl>
-                                              <p:pRg st="0" end="0"/>
-                                            </p:txEl>
-                                          </p:spTgt>
-                                        </p:tgtEl>
-                                      </p:cBhvr>
-                                    </p:animEffect>
-                                  </p:childTnLst>
-                                </p:cTn>
-                              </p:par>
-                            </p:childTnLst>
-                          </p:cTn>
-                        </p:par>
-                      </p:childTnLst>
-                    </p:cTn>
-                  </p:par>
-                  <p:par>
-                    <p:cTn id="8" fill="hold">
-                      <p:stCondLst>
-                        <p:cond delay="indefinite"/>
-                      </p:stCondLst>
-                      <p:childTnLst>
-                        <p:par>
-                          <p:cTn id="9" fill="hold">
-                            <p:stCondLst>
-                              <p:cond delay="0"/>
-                            </p:stCondLst>
-                            <p:childTnLst>
-                              <p:par>
-                                <p:cTn id="10" presetID="22" presetClass="entr" presetSubtype="8" fill="hold" grpId="0" nodeType="clickEffect">
-                                  <p:stCondLst>
-                                    <p:cond delay="0"/>
-                                  </p:stCondLst>
-                                  <p:childTnLst>
-                                    <p:set>
-                                      <p:cBhvr>
-                                        <p:cTn id="11" dur="1" fill="hold">
-                                          <p:stCondLst>
-                                            <p:cond delay="0"/>
-                                          </p:stCondLst>
-                                        </p:cTn>
-                                        <p:tgtEl>
-                                          <p:spTgt spid="297">
-                                            <p:txEl>
-                                              <p:pRg st="1" end="1"/>
-                                            </p:txEl>
-                                          </p:spTgt>
-                                        </p:tgtEl>
-                                        <p:attrNameLst>
-                                          <p:attrName>style.visibility</p:attrName>
-                                        </p:attrNameLst>
-                                      </p:cBhvr>
-                                      <p:to>
-                                        <p:strVal val="visible"/>
-                                      </p:to>
-                                    </p:set>
-                                    <p:animEffect transition="in" filter="wipe(left)">
-                                      <p:cBhvr>
-                                        <p:cTn id="12" dur="500"/>
-                                        <p:tgtEl>
-                                          <p:spTgt spid="297">
-                                            <p:txEl>
-                                              <p:pRg st="1" end="1"/>
-                                            </p:txEl>
-                                          </p:spTgt>
-                                        </p:tgtEl>
-                                      </p:cBhvr>
-                                    </p:animEffect>
-                                  </p:childTnLst>
-                                </p:cTn>
-                              </p:par>
-                            </p:childTnLst>
-                          </p:cTn>
-                        </p:par>
-                      </p:childTnLst>
-                    </p:cTn>
-                  </p:par>
-                  <p:par>
-                    <p:cTn id="13" fill="hold">
-                      <p:stCondLst>
-                        <p:cond delay="indefinite"/>
-                      </p:stCondLst>
-                      <p:childTnLst>
-                        <p:par>
-                          <p:cTn id="14" fill="hold">
-                            <p:stCondLst>
-                              <p:cond delay="0"/>
-                            </p:stCondLst>
-                            <p:childTnLst>
-                              <p:par>
-                                <p:cTn id="15" presetID="22" presetClass="entr" presetSubtype="8" fill="hold" grpId="0" nodeType="clickEffect">
-                                  <p:stCondLst>
-                                    <p:cond delay="0"/>
-                                  </p:stCondLst>
-                                  <p:childTnLst>
-                                    <p:set>
-                                      <p:cBhvr>
-                                        <p:cTn id="16" dur="1" fill="hold">
-                                          <p:stCondLst>
-                                            <p:cond delay="0"/>
-                                          </p:stCondLst>
-                                        </p:cTn>
-                                        <p:tgtEl>
-                                          <p:spTgt spid="297">
-                                            <p:txEl>
-                                              <p:pRg st="2" end="2"/>
-                                            </p:txEl>
-                                          </p:spTgt>
-                                        </p:tgtEl>
-                                        <p:attrNameLst>
-                                          <p:attrName>style.visibility</p:attrName>
-                                        </p:attrNameLst>
-                                      </p:cBhvr>
-                                      <p:to>
-                                        <p:strVal val="visible"/>
-                                      </p:to>
-                                    </p:set>
-                                    <p:animEffect transition="in" filter="wipe(left)">
-                                      <p:cBhvr>
-                                        <p:cTn id="17" dur="500"/>
-                                        <p:tgtEl>
-                                          <p:spTgt spid="297">
-                                            <p:txEl>
-                                              <p:pRg st="2" end="2"/>
-                                            </p:txEl>
-                                          </p:spTgt>
-                                        </p:tgtEl>
-                                      </p:cBhvr>
-                                    </p:animEffect>
-                                  </p:childTnLst>
-                                </p:cTn>
-                              </p:par>
-                            </p:childTnLst>
-                          </p:cTn>
-                        </p:par>
-                      </p:childTnLst>
-                    </p:cTn>
-                  </p:par>
-                  <p:par>
-                    <p:cTn id="18" fill="hold">
-                      <p:stCondLst>
-                        <p:cond delay="indefinite"/>
-                      </p:stCondLst>
-                      <p:childTnLst>
-                        <p:par>
-                          <p:cTn id="19" fill="hold">
-                            <p:stCondLst>
-                              <p:cond delay="0"/>
-                            </p:stCondLst>
-                            <p:childTnLst>
-                              <p:par>
-                                <p:cTn id="20" presetID="22" presetClass="entr" presetSubtype="8" fill="hold" grpId="0" nodeType="clickEffect">
-                                  <p:stCondLst>
-                                    <p:cond delay="0"/>
-                                  </p:stCondLst>
-                                  <p:childTnLst>
-                                    <p:set>
-                                      <p:cBhvr>
-                                        <p:cTn id="21" dur="1" fill="hold">
-                                          <p:stCondLst>
-                                            <p:cond delay="0"/>
-                                          </p:stCondLst>
-                                        </p:cTn>
-                                        <p:tgtEl>
-                                          <p:spTgt spid="297">
-                                            <p:txEl>
-                                              <p:pRg st="3" end="3"/>
-                                            </p:txEl>
-                                          </p:spTgt>
-                                        </p:tgtEl>
-                                        <p:attrNameLst>
-                                          <p:attrName>style.visibility</p:attrName>
-                                        </p:attrNameLst>
-                                      </p:cBhvr>
-                                      <p:to>
-                                        <p:strVal val="visible"/>
-                                      </p:to>
-                                    </p:set>
-                                    <p:animEffect transition="in" filter="wipe(left)">
-                                      <p:cBhvr>
-                                        <p:cTn id="22" dur="500"/>
-                                        <p:tgtEl>
-                                          <p:spTgt spid="297">
-                                            <p:txEl>
-                                              <p:pRg st="3" end="3"/>
-                                            </p:txEl>
-                                          </p:spTgt>
-                                        </p:tgtEl>
-                                      </p:cBhvr>
-                                    </p:animEffect>
-                                  </p:childTnLst>
-                                </p:cTn>
-                              </p:par>
-                            </p:childTnLst>
-                          </p:cTn>
-                        </p:par>
-                        <p:par>
-                          <p:cTn id="23" fill="hold">
-                            <p:stCondLst>
-                              <p:cond delay="500"/>
-                            </p:stCondLst>
-                            <p:childTnLst>
-                              <p:par>
-                                <p:cTn id="24" presetID="22" presetClass="entr" presetSubtype="8" fill="hold" grpId="0" nodeType="afterEffect">
-                                  <p:stCondLst>
-                                    <p:cond delay="750"/>
-                                  </p:stCondLst>
-                                  <p:childTnLst>
-                                    <p:set>
-                                      <p:cBhvr>
-                                        <p:cTn id="25" dur="1" fill="hold">
-                                          <p:stCondLst>
-                                            <p:cond delay="0"/>
-                                          </p:stCondLst>
-                                        </p:cTn>
-                                        <p:tgtEl>
-                                          <p:spTgt spid="297">
-                                            <p:txEl>
-                                              <p:pRg st="4" end="4"/>
-                                            </p:txEl>
-                                          </p:spTgt>
-                                        </p:tgtEl>
-                                        <p:attrNameLst>
-                                          <p:attrName>style.visibility</p:attrName>
-                                        </p:attrNameLst>
-                                      </p:cBhvr>
-                                      <p:to>
-                                        <p:strVal val="visible"/>
-                                      </p:to>
-                                    </p:set>
-                                    <p:animEffect transition="in" filter="wipe(left)">
-                                      <p:cBhvr>
-                                        <p:cTn id="26" dur="500"/>
-                                        <p:tgtEl>
-                                          <p:spTgt spid="297">
-                                            <p:txEl>
-                                              <p:pRg st="4" end="4"/>
-                                            </p:txEl>
-                                          </p:spTgt>
-                                        </p:tgtEl>
-                                      </p:cBhvr>
-                                    </p:animEffect>
-                                  </p:childTnLst>
-                                </p:cTn>
-                              </p:par>
-                            </p:childTnLst>
-                          </p:cTn>
-                        </p:par>
-                      </p:childTnLst>
-                    </p:cTn>
-                  </p:par>
-                </p:childTnLst>
-              </p:cTn>
-              <p:prevCondLst>
-                <p:cond evt="onPrev" delay="0">
-                  <p:tgtEl>
-                    <p:sldTgt/>
-                  </p:tgtEl>
-                </p:cond>
-              </p:prevCondLst>
-              <p:nextCondLst>
-                <p:cond evt="onNext" delay="0">
-                  <p:tgtEl>
-                    <p:sldTgt/>
-                  </p:tgtEl>
-                </p:cond>
-              </p:nextCondLst>
-            </p:seq>
-          </p:childTnLst>
-        </p:cTn>
-      </p:par>
-    </p:tnLst>
-    <p:bldLst>
-      <p:bldP spid="297" grpId="0" uiExpand="1" build="p"/>
-    </p:bldLst>
-  </p:timing>
-</p:sld>
-</file>
-
-<file path=ppt/slides/slide15.xml><?xml version="1.0" encoding="utf-8"?>
-<p:sld xmlns:a="http://schemas.openxmlformats.org/drawingml/2006/main" xmlns:r="http://schemas.openxmlformats.org/officeDocument/2006/relationships" xmlns:p="http://schemas.openxmlformats.org/presentationml/2006/main" showMasterSp="0">
-  <p:cSld>
-    <p:spTree>
-      <p:nvGrpSpPr>
         <p:cNvPr id="1" name="Shape 286"/>
         <p:cNvGrpSpPr/>
         <p:nvPr/>
@@ -15251,7 +14451,7 @@
                   <a:schemeClr val="lt1"/>
                 </a:solidFill>
               </a:rPr>
-              <a:t>15</a:t>
+              <a:t>14</a:t>
             </a:fld>
             <a:r>
               <a:rPr lang="ru" sz="2500" dirty="0" smtClean="0"/>
@@ -15787,7 +14987,7 @@
 </p:sld>
 </file>
 
-<file path=ppt/slides/slide16.xml><?xml version="1.0" encoding="utf-8"?>
+<file path=ppt/slides/slide15.xml><?xml version="1.0" encoding="utf-8"?>
 <p:sld xmlns:a="http://schemas.openxmlformats.org/drawingml/2006/main" xmlns:r="http://schemas.openxmlformats.org/officeDocument/2006/relationships" xmlns:p="http://schemas.openxmlformats.org/presentationml/2006/main" showMasterSp="0">
   <p:cSld>
     <p:spTree>
@@ -15858,8 +15058,8 @@
         </p:nvSpPr>
         <p:spPr>
           <a:xfrm>
-            <a:off x="1297500" y="1567550"/>
-            <a:ext cx="7038900" cy="2911200"/>
+            <a:off x="391978" y="1056781"/>
+            <a:ext cx="4455230" cy="2911200"/>
           </a:xfrm>
           <a:prstGeom prst="rect">
             <a:avLst/>
@@ -15948,8 +15148,24 @@
             </a:pPr>
             <a:r>
               <a:rPr lang="ru" dirty="0"/>
-              <a:t>Головні команди для роботи з віддаленим репозиторієм:</a:t>
-            </a:r>
+              <a:t>Головні команди для роботи з віддаленим репозиторієм</a:t>
+            </a:r>
+            <a:r>
+              <a:rPr lang="ru" dirty="0" smtClean="0"/>
+              <a:t>:</a:t>
+            </a:r>
+            <a:endParaRPr lang="en-US" dirty="0" smtClean="0"/>
+          </a:p>
+          <a:p>
+            <a:pPr marL="0" lvl="0" indent="0" algn="l" rtl="0">
+              <a:spcBef>
+                <a:spcPts val="0"/>
+              </a:spcBef>
+              <a:spcAft>
+                <a:spcPts val="0"/>
+              </a:spcAft>
+              <a:buNone/>
+            </a:pPr>
             <a:endParaRPr dirty="0"/>
           </a:p>
           <a:p>
@@ -16047,7 +15263,7 @@
                   <a:schemeClr val="lt1"/>
                 </a:solidFill>
               </a:rPr>
-              <a:t>16</a:t>
+              <a:t>15</a:t>
             </a:fld>
             <a:r>
               <a:rPr lang="ru" sz="2500" dirty="0" smtClean="0"/>
@@ -16061,6 +15277,134 @@
           </a:p>
         </p:txBody>
       </p:sp>
+      <p:pic>
+        <p:nvPicPr>
+          <p:cNvPr id="1026" name="Picture 2"/>
+          <p:cNvPicPr>
+            <a:picLocks noChangeAspect="1" noChangeArrowheads="1"/>
+          </p:cNvPicPr>
+          <p:nvPr/>
+        </p:nvPicPr>
+        <p:blipFill>
+          <a:blip r:embed="rId3">
+            <a:extLst>
+              <a:ext uri="{28A0092B-C50C-407E-A947-70E740481C1C}">
+                <a14:useLocalDpi xmlns:a14="http://schemas.microsoft.com/office/drawing/2010/main" val="0"/>
+              </a:ext>
+            </a:extLst>
+          </a:blip>
+          <a:srcRect/>
+          <a:stretch>
+            <a:fillRect/>
+          </a:stretch>
+        </p:blipFill>
+        <p:spPr bwMode="auto">
+          <a:xfrm>
+            <a:off x="5684253" y="1446090"/>
+            <a:ext cx="3190875" cy="600075"/>
+          </a:xfrm>
+          <a:prstGeom prst="rect">
+            <a:avLst/>
+          </a:prstGeom>
+          <a:noFill/>
+          <a:ln>
+            <a:noFill/>
+          </a:ln>
+          <a:effectLst/>
+          <a:extLst>
+            <a:ext uri="{909E8E84-426E-40DD-AFC4-6F175D3DCCD1}">
+              <a14:hiddenFill xmlns:a14="http://schemas.microsoft.com/office/drawing/2010/main">
+                <a:solidFill>
+                  <a:schemeClr val="accent1"/>
+                </a:solidFill>
+              </a14:hiddenFill>
+            </a:ext>
+            <a:ext uri="{91240B29-F687-4F45-9708-019B960494DF}">
+              <a14:hiddenLine xmlns:a14="http://schemas.microsoft.com/office/drawing/2010/main" w="9525">
+                <a:solidFill>
+                  <a:schemeClr val="tx1"/>
+                </a:solidFill>
+                <a:miter lim="800000"/>
+                <a:headEnd/>
+                <a:tailEnd/>
+              </a14:hiddenLine>
+            </a:ext>
+            <a:ext uri="{AF507438-7753-43E0-B8FC-AC1667EBCBE1}">
+              <a14:hiddenEffects xmlns:a14="http://schemas.microsoft.com/office/drawing/2010/main">
+                <a:effectLst>
+                  <a:outerShdw dist="35921" dir="2700000" algn="ctr" rotWithShape="0">
+                    <a:schemeClr val="bg2"/>
+                  </a:outerShdw>
+                </a:effectLst>
+              </a14:hiddenEffects>
+            </a:ext>
+          </a:extLst>
+        </p:spPr>
+      </p:pic>
+      <p:pic>
+        <p:nvPicPr>
+          <p:cNvPr id="1027" name="Picture 3"/>
+          <p:cNvPicPr>
+            <a:picLocks noChangeAspect="1" noChangeArrowheads="1"/>
+          </p:cNvPicPr>
+          <p:nvPr/>
+        </p:nvPicPr>
+        <p:blipFill>
+          <a:blip r:embed="rId4">
+            <a:extLst>
+              <a:ext uri="{28A0092B-C50C-407E-A947-70E740481C1C}">
+                <a14:useLocalDpi xmlns:a14="http://schemas.microsoft.com/office/drawing/2010/main" val="0"/>
+              </a:ext>
+            </a:extLst>
+          </a:blip>
+          <a:srcRect/>
+          <a:stretch>
+            <a:fillRect/>
+          </a:stretch>
+        </p:blipFill>
+        <p:spPr bwMode="auto">
+          <a:xfrm>
+            <a:off x="5684253" y="2512381"/>
+            <a:ext cx="3333983" cy="1771420"/>
+          </a:xfrm>
+          <a:prstGeom prst="rect">
+            <a:avLst/>
+          </a:prstGeom>
+          <a:noFill/>
+          <a:ln>
+            <a:noFill/>
+          </a:ln>
+          <a:effectLst/>
+          <a:extLst>
+            <a:ext uri="{909E8E84-426E-40DD-AFC4-6F175D3DCCD1}">
+              <a14:hiddenFill xmlns:a14="http://schemas.microsoft.com/office/drawing/2010/main">
+                <a:solidFill>
+                  <a:schemeClr val="accent1"/>
+                </a:solidFill>
+              </a14:hiddenFill>
+            </a:ext>
+            <a:ext uri="{91240B29-F687-4F45-9708-019B960494DF}">
+              <a14:hiddenLine xmlns:a14="http://schemas.microsoft.com/office/drawing/2010/main" w="9525">
+                <a:solidFill>
+                  <a:schemeClr val="tx1"/>
+                </a:solidFill>
+                <a:miter lim="800000"/>
+                <a:headEnd/>
+                <a:tailEnd/>
+              </a14:hiddenLine>
+            </a:ext>
+            <a:ext uri="{AF507438-7753-43E0-B8FC-AC1667EBCBE1}">
+              <a14:hiddenEffects xmlns:a14="http://schemas.microsoft.com/office/drawing/2010/main">
+                <a:effectLst>
+                  <a:outerShdw dist="35921" dir="2700000" algn="ctr" rotWithShape="0">
+                    <a:schemeClr val="bg2"/>
+                  </a:outerShdw>
+                </a:effectLst>
+              </a14:hiddenEffects>
+            </a:ext>
+          </a:extLst>
+        </p:spPr>
+      </p:pic>
     </p:spTree>
   </p:cSld>
   <p:clrMapOvr>
@@ -16069,14 +15413,219 @@
   <p:timing>
     <p:tnLst>
       <p:par>
-        <p:cTn id="1" dur="indefinite" restart="never" nodeType="tmRoot"/>
+        <p:cTn id="1" dur="indefinite" restart="never" nodeType="tmRoot">
+          <p:childTnLst>
+            <p:seq concurrent="1" nextAc="seek">
+              <p:cTn id="2" dur="indefinite" nodeType="mainSeq">
+                <p:childTnLst>
+                  <p:par>
+                    <p:cTn id="3" fill="hold">
+                      <p:stCondLst>
+                        <p:cond delay="indefinite"/>
+                      </p:stCondLst>
+                      <p:childTnLst>
+                        <p:par>
+                          <p:cTn id="4" fill="hold">
+                            <p:stCondLst>
+                              <p:cond delay="0"/>
+                            </p:stCondLst>
+                            <p:childTnLst>
+                              <p:par>
+                                <p:cTn id="5" presetID="2" presetClass="entr" presetSubtype="4" fill="hold" nodeType="clickEffect">
+                                  <p:stCondLst>
+                                    <p:cond delay="0"/>
+                                  </p:stCondLst>
+                                  <p:childTnLst>
+                                    <p:set>
+                                      <p:cBhvr>
+                                        <p:cTn id="6" dur="1" fill="hold">
+                                          <p:stCondLst>
+                                            <p:cond delay="0"/>
+                                          </p:stCondLst>
+                                        </p:cTn>
+                                        <p:tgtEl>
+                                          <p:spTgt spid="1026"/>
+                                        </p:tgtEl>
+                                        <p:attrNameLst>
+                                          <p:attrName>style.visibility</p:attrName>
+                                        </p:attrNameLst>
+                                      </p:cBhvr>
+                                      <p:to>
+                                        <p:strVal val="visible"/>
+                                      </p:to>
+                                    </p:set>
+                                    <p:anim calcmode="lin" valueType="num">
+                                      <p:cBhvr additive="base">
+                                        <p:cTn id="7" dur="500" fill="hold"/>
+                                        <p:tgtEl>
+                                          <p:spTgt spid="1026"/>
+                                        </p:tgtEl>
+                                        <p:attrNameLst>
+                                          <p:attrName>ppt_x</p:attrName>
+                                        </p:attrNameLst>
+                                      </p:cBhvr>
+                                      <p:tavLst>
+                                        <p:tav tm="0">
+                                          <p:val>
+                                            <p:strVal val="#ppt_x"/>
+                                          </p:val>
+                                        </p:tav>
+                                        <p:tav tm="100000">
+                                          <p:val>
+                                            <p:strVal val="#ppt_x"/>
+                                          </p:val>
+                                        </p:tav>
+                                      </p:tavLst>
+                                    </p:anim>
+                                    <p:anim calcmode="lin" valueType="num">
+                                      <p:cBhvr additive="base">
+                                        <p:cTn id="8" dur="500" fill="hold"/>
+                                        <p:tgtEl>
+                                          <p:spTgt spid="1026"/>
+                                        </p:tgtEl>
+                                        <p:attrNameLst>
+                                          <p:attrName>ppt_y</p:attrName>
+                                        </p:attrNameLst>
+                                      </p:cBhvr>
+                                      <p:tavLst>
+                                        <p:tav tm="0">
+                                          <p:val>
+                                            <p:strVal val="1+#ppt_h/2"/>
+                                          </p:val>
+                                        </p:tav>
+                                        <p:tav tm="100000">
+                                          <p:val>
+                                            <p:strVal val="#ppt_y"/>
+                                          </p:val>
+                                        </p:tav>
+                                      </p:tavLst>
+                                    </p:anim>
+                                  </p:childTnLst>
+                                </p:cTn>
+                              </p:par>
+                            </p:childTnLst>
+                          </p:cTn>
+                        </p:par>
+                      </p:childTnLst>
+                    </p:cTn>
+                  </p:par>
+                  <p:par>
+                    <p:cTn id="9" fill="hold">
+                      <p:stCondLst>
+                        <p:cond delay="indefinite"/>
+                      </p:stCondLst>
+                      <p:childTnLst>
+                        <p:par>
+                          <p:cTn id="10" fill="hold">
+                            <p:stCondLst>
+                              <p:cond delay="0"/>
+                            </p:stCondLst>
+                            <p:childTnLst>
+                              <p:par>
+                                <p:cTn id="11" presetID="2" presetClass="entr" presetSubtype="4" fill="hold" nodeType="clickEffect">
+                                  <p:stCondLst>
+                                    <p:cond delay="0"/>
+                                  </p:stCondLst>
+                                  <p:childTnLst>
+                                    <p:set>
+                                      <p:cBhvr>
+                                        <p:cTn id="12" dur="1" fill="hold">
+                                          <p:stCondLst>
+                                            <p:cond delay="0"/>
+                                          </p:stCondLst>
+                                        </p:cTn>
+                                        <p:tgtEl>
+                                          <p:spTgt spid="1027"/>
+                                        </p:tgtEl>
+                                        <p:attrNameLst>
+                                          <p:attrName>style.visibility</p:attrName>
+                                        </p:attrNameLst>
+                                      </p:cBhvr>
+                                      <p:to>
+                                        <p:strVal val="visible"/>
+                                      </p:to>
+                                    </p:set>
+                                    <p:anim calcmode="lin" valueType="num">
+                                      <p:cBhvr additive="base">
+                                        <p:cTn id="13" dur="500" fill="hold"/>
+                                        <p:tgtEl>
+                                          <p:spTgt spid="1027"/>
+                                        </p:tgtEl>
+                                        <p:attrNameLst>
+                                          <p:attrName>ppt_x</p:attrName>
+                                        </p:attrNameLst>
+                                      </p:cBhvr>
+                                      <p:tavLst>
+                                        <p:tav tm="0">
+                                          <p:val>
+                                            <p:strVal val="#ppt_x"/>
+                                          </p:val>
+                                        </p:tav>
+                                        <p:tav tm="100000">
+                                          <p:val>
+                                            <p:strVal val="#ppt_x"/>
+                                          </p:val>
+                                        </p:tav>
+                                      </p:tavLst>
+                                    </p:anim>
+                                    <p:anim calcmode="lin" valueType="num">
+                                      <p:cBhvr additive="base">
+                                        <p:cTn id="14" dur="500" fill="hold"/>
+                                        <p:tgtEl>
+                                          <p:spTgt spid="1027"/>
+                                        </p:tgtEl>
+                                        <p:attrNameLst>
+                                          <p:attrName>ppt_y</p:attrName>
+                                        </p:attrNameLst>
+                                      </p:cBhvr>
+                                      <p:tavLst>
+                                        <p:tav tm="0">
+                                          <p:val>
+                                            <p:strVal val="1+#ppt_h/2"/>
+                                          </p:val>
+                                        </p:tav>
+                                        <p:tav tm="100000">
+                                          <p:val>
+                                            <p:strVal val="#ppt_y"/>
+                                          </p:val>
+                                        </p:tav>
+                                      </p:tavLst>
+                                    </p:anim>
+                                  </p:childTnLst>
+                                </p:cTn>
+                              </p:par>
+                            </p:childTnLst>
+                          </p:cTn>
+                        </p:par>
+                      </p:childTnLst>
+                    </p:cTn>
+                  </p:par>
+                </p:childTnLst>
+              </p:cTn>
+              <p:prevCondLst>
+                <p:cond evt="onPrev" delay="0">
+                  <p:tgtEl>
+                    <p:sldTgt/>
+                  </p:tgtEl>
+                </p:cond>
+              </p:prevCondLst>
+              <p:nextCondLst>
+                <p:cond evt="onNext" delay="0">
+                  <p:tgtEl>
+                    <p:sldTgt/>
+                  </p:tgtEl>
+                </p:cond>
+              </p:nextCondLst>
+            </p:seq>
+          </p:childTnLst>
+        </p:cTn>
       </p:par>
     </p:tnLst>
   </p:timing>
 </p:sld>
 </file>
 
-<file path=ppt/slides/slide17.xml><?xml version="1.0" encoding="utf-8"?>
+<file path=ppt/slides/slide16.xml><?xml version="1.0" encoding="utf-8"?>
 <p:sld xmlns:a="http://schemas.openxmlformats.org/drawingml/2006/main" xmlns:r="http://schemas.openxmlformats.org/officeDocument/2006/relationships" xmlns:p="http://schemas.openxmlformats.org/presentationml/2006/main" showMasterSp="0">
   <p:cSld>
     <p:spTree>
@@ -16171,14 +15720,14 @@
               <a:buAutoNum type="arabicPeriod"/>
             </a:pPr>
             <a:r>
-              <a:rPr lang="ru" b="1"/>
+              <a:rPr lang="ru" sz="1600" b="1" dirty="0"/>
               <a:t>Pull request</a:t>
             </a:r>
             <a:r>
-              <a:rPr lang="ru"/>
+              <a:rPr lang="ru" sz="1600" dirty="0"/>
               <a:t> - організація додавання змін у гілку (коментарі, code review)</a:t>
             </a:r>
-            <a:endParaRPr/>
+            <a:endParaRPr sz="1600" dirty="0"/>
           </a:p>
           <a:p>
             <a:pPr marL="457200" lvl="0" indent="-311150" algn="l" rtl="0">
@@ -16192,14 +15741,14 @@
               <a:buAutoNum type="arabicPeriod"/>
             </a:pPr>
             <a:r>
-              <a:rPr lang="ru" b="1"/>
+              <a:rPr lang="ru" sz="1600" b="1" dirty="0"/>
               <a:t>Приватні/публічні репозиторії</a:t>
             </a:r>
             <a:r>
-              <a:rPr lang="ru"/>
+              <a:rPr lang="ru" sz="1600" dirty="0"/>
               <a:t> - можливість створювати комерційні проекти віддалено на закритому (приватному) хостінгу або, навпаки, створювати опенсорсні проекти та залучати величезну ІТ-команду зі всього світу.</a:t>
             </a:r>
-            <a:endParaRPr/>
+            <a:endParaRPr sz="1600" dirty="0"/>
           </a:p>
           <a:p>
             <a:pPr marL="457200" lvl="0" indent="-311150" algn="l" rtl="0">
@@ -16213,14 +15762,14 @@
               <a:buAutoNum type="arabicPeriod"/>
             </a:pPr>
             <a:r>
-              <a:rPr lang="ru" b="1"/>
+              <a:rPr lang="ru" sz="1600" b="1" dirty="0"/>
               <a:t>Організації </a:t>
             </a:r>
             <a:r>
-              <a:rPr lang="ru"/>
+              <a:rPr lang="ru" sz="1600" dirty="0"/>
               <a:t>- створення великої команду проекту, яка складатиметься з окремих спеціалізацій (розробників, фронтенд, бекенд, ...), зайнятими своїми мікропроектами, та налагоджувати зв’язки між ними.</a:t>
             </a:r>
-            <a:endParaRPr/>
+            <a:endParaRPr sz="1600" dirty="0"/>
           </a:p>
           <a:p>
             <a:pPr marL="457200" lvl="0" indent="-311150" algn="l" rtl="0">
@@ -16234,14 +15783,14 @@
               <a:buAutoNum type="arabicPeriod"/>
             </a:pPr>
             <a:r>
-              <a:rPr lang="ru" b="1"/>
+              <a:rPr lang="ru" sz="1600" b="1" dirty="0"/>
               <a:t>Wiki </a:t>
             </a:r>
             <a:r>
-              <a:rPr lang="ru"/>
+              <a:rPr lang="ru" sz="1600" dirty="0"/>
               <a:t>- публікація детальної документації щодо проекту (окремо від readme).</a:t>
             </a:r>
-            <a:endParaRPr/>
+            <a:endParaRPr sz="1600" dirty="0"/>
           </a:p>
           <a:p>
             <a:pPr marL="457200" lvl="0" indent="-311150" algn="l" rtl="0">
@@ -16255,14 +15804,14 @@
               <a:buAutoNum type="arabicPeriod"/>
             </a:pPr>
             <a:r>
-              <a:rPr lang="ru" b="1"/>
+              <a:rPr lang="ru" sz="1600" b="1" dirty="0"/>
               <a:t>Issue tracking</a:t>
             </a:r>
             <a:r>
-              <a:rPr lang="ru"/>
+              <a:rPr lang="ru" sz="1600" dirty="0"/>
               <a:t> - додавання звіту про виявленні проблеми в коді або в користуванні (аналог форуму).</a:t>
             </a:r>
-            <a:endParaRPr/>
+            <a:endParaRPr sz="1600" dirty="0"/>
           </a:p>
           <a:p>
             <a:pPr marL="457200" lvl="0" indent="-311150" algn="l" rtl="0">
@@ -16276,14 +15825,14 @@
               <a:buAutoNum type="arabicPeriod"/>
             </a:pPr>
             <a:r>
-              <a:rPr lang="ru" b="1"/>
+              <a:rPr lang="ru" sz="1600" b="1" dirty="0"/>
               <a:t>Коментарі </a:t>
             </a:r>
             <a:r>
-              <a:rPr lang="ru"/>
+              <a:rPr lang="ru" sz="1600" dirty="0"/>
               <a:t>- Github практично всюди дозволяє залишати коментарі.</a:t>
             </a:r>
-            <a:endParaRPr/>
+            <a:endParaRPr sz="1600" dirty="0"/>
           </a:p>
         </p:txBody>
       </p:sp>
@@ -16327,7 +15876,7 @@
                   <a:schemeClr val="lt1"/>
                 </a:solidFill>
               </a:rPr>
-              <a:t>17</a:t>
+              <a:t>16</a:t>
             </a:fld>
             <a:r>
               <a:rPr lang="ru" sz="2500" dirty="0" smtClean="0"/>
@@ -16356,7 +15905,7 @@
 </p:sld>
 </file>
 
-<file path=ppt/slides/slide18.xml><?xml version="1.0" encoding="utf-8"?>
+<file path=ppt/slides/slide17.xml><?xml version="1.0" encoding="utf-8"?>
 <p:sld xmlns:a="http://schemas.openxmlformats.org/drawingml/2006/main" xmlns:r="http://schemas.openxmlformats.org/officeDocument/2006/relationships" xmlns:p="http://schemas.openxmlformats.org/presentationml/2006/main" showMasterSp="0">
   <p:cSld>
     <p:spTree>
@@ -16450,10 +15999,10 @@
               <a:buNone/>
             </a:pPr>
             <a:r>
-              <a:rPr lang="ru" dirty="0"/>
+              <a:rPr lang="ru" sz="1600" dirty="0"/>
               <a:t>Атрибути соцмережі:</a:t>
             </a:r>
-            <a:endParaRPr dirty="0"/>
+            <a:endParaRPr sz="1600" dirty="0"/>
           </a:p>
           <a:p>
             <a:pPr marL="457200" lvl="0" indent="-311150" algn="l" rtl="0">
@@ -16467,10 +16016,10 @@
               <a:buChar char="-"/>
             </a:pPr>
             <a:r>
-              <a:rPr lang="ru" dirty="0"/>
+              <a:rPr lang="ru" sz="1600" dirty="0"/>
               <a:t>підписка;</a:t>
             </a:r>
-            <a:endParaRPr dirty="0"/>
+            <a:endParaRPr sz="1600" dirty="0"/>
           </a:p>
           <a:p>
             <a:pPr marL="457200" lvl="0" indent="-311150" algn="l" rtl="0">
@@ -16484,10 +16033,10 @@
               <a:buChar char="-"/>
             </a:pPr>
             <a:r>
-              <a:rPr lang="ru" dirty="0"/>
+              <a:rPr lang="ru" sz="1600" dirty="0"/>
               <a:t>стрічка новин і трендів;</a:t>
             </a:r>
-            <a:endParaRPr dirty="0"/>
+            <a:endParaRPr sz="1600" dirty="0"/>
           </a:p>
           <a:p>
             <a:pPr marL="457200" lvl="0" indent="-311150" algn="l" rtl="0">
@@ -16501,10 +16050,10 @@
               <a:buChar char="-"/>
             </a:pPr>
             <a:r>
-              <a:rPr lang="ru" dirty="0"/>
+              <a:rPr lang="ru" sz="1600" dirty="0"/>
               <a:t>коментарі;</a:t>
             </a:r>
-            <a:endParaRPr dirty="0"/>
+            <a:endParaRPr sz="1600" dirty="0"/>
           </a:p>
           <a:p>
             <a:pPr marL="457200" lvl="0" indent="-311150" algn="l" rtl="0">
@@ -16518,10 +16067,10 @@
               <a:buChar char="-"/>
             </a:pPr>
             <a:r>
-              <a:rPr lang="ru" dirty="0"/>
+              <a:rPr lang="ru" sz="1600" dirty="0"/>
               <a:t>спілкування</a:t>
             </a:r>
-            <a:endParaRPr dirty="0"/>
+            <a:endParaRPr sz="1600" dirty="0"/>
           </a:p>
           <a:p>
             <a:pPr marL="457200" lvl="0" indent="-311150" algn="l" rtl="0">
@@ -16535,10 +16084,10 @@
               <a:buChar char="-"/>
             </a:pPr>
             <a:r>
-              <a:rPr lang="ru" dirty="0"/>
+              <a:rPr lang="ru" sz="1600" dirty="0"/>
               <a:t>рейтинги репозиторіїв.</a:t>
             </a:r>
-            <a:endParaRPr dirty="0"/>
+            <a:endParaRPr sz="1600" dirty="0"/>
           </a:p>
         </p:txBody>
       </p:sp>
@@ -16610,7 +16159,7 @@
                   <a:schemeClr val="lt1"/>
                 </a:solidFill>
               </a:rPr>
-              <a:t>18</a:t>
+              <a:t>17</a:t>
             </a:fld>
             <a:r>
               <a:rPr lang="ru" sz="2500" dirty="0" smtClean="0"/>
@@ -16639,7 +16188,7 @@
 </p:sld>
 </file>
 
-<file path=ppt/slides/slide19.xml><?xml version="1.0" encoding="utf-8"?>
+<file path=ppt/slides/slide18.xml><?xml version="1.0" encoding="utf-8"?>
 <p:sld xmlns:a="http://schemas.openxmlformats.org/drawingml/2006/main" xmlns:r="http://schemas.openxmlformats.org/officeDocument/2006/relationships" xmlns:p="http://schemas.openxmlformats.org/presentationml/2006/main" showMasterSp="0">
   <p:cSld>
     <p:spTree>
@@ -16803,7 +16352,23 @@
             </a:pPr>
             <a:r>
               <a:rPr lang="ru" sz="1800" dirty="0"/>
-              <a:t>Github - це чудовий інструмент для володіння особливо початківцям в IT, що дозволяє безкоштовно публікувати свої пет-проекти, які можна зазначити в своєму резюме (CV) як підтвердження свого досвіду.</a:t>
+              <a:t>Github - це </a:t>
+            </a:r>
+            <a:r>
+              <a:rPr lang="ru" sz="1800" dirty="0" smtClean="0"/>
+              <a:t>чудовий </a:t>
+            </a:r>
+            <a:r>
+              <a:rPr lang="uk-UA" sz="1800" dirty="0" smtClean="0"/>
+              <a:t>Інтернет-ресурс, </a:t>
+            </a:r>
+            <a:r>
+              <a:rPr lang="ru" sz="1800" dirty="0" smtClean="0"/>
+              <a:t>особливо </a:t>
+            </a:r>
+            <a:r>
+              <a:rPr lang="ru" sz="1800" dirty="0"/>
+              <a:t>початківцям в IT, що дозволяє безкоштовно публікувати свої пет-проекти, які можна зазначити в своєму резюме (CV) як підтвердження свого досвіду.</a:t>
             </a:r>
             <a:endParaRPr sz="1800" dirty="0"/>
           </a:p>
@@ -16812,6 +16377,375 @@
       <p:sp>
         <p:nvSpPr>
           <p:cNvPr id="5" name="Google Shape;180;p18"/>
+          <p:cNvSpPr txBox="1">
+            <a:spLocks noGrp="1"/>
+          </p:cNvSpPr>
+          <p:nvPr>
+            <p:ph type="sldNum" idx="12"/>
+          </p:nvPr>
+        </p:nvSpPr>
+        <p:spPr>
+          <a:xfrm>
+            <a:off x="7926375" y="180000"/>
+            <a:ext cx="1094725" cy="568200"/>
+          </a:xfrm>
+          <a:prstGeom prst="rect">
+            <a:avLst/>
+          </a:prstGeom>
+        </p:spPr>
+        <p:txBody>
+          <a:bodyPr spcFirstLastPara="1" wrap="square" lIns="91425" tIns="91425" rIns="91425" bIns="91425" anchor="ctr" anchorCtr="0">
+            <a:noAutofit/>
+          </a:bodyPr>
+          <a:lstStyle/>
+          <a:p>
+            <a:pPr marL="0" lvl="0" indent="0" algn="r" rtl="0">
+              <a:spcBef>
+                <a:spcPts val="0"/>
+              </a:spcBef>
+              <a:spcAft>
+                <a:spcPts val="0"/>
+              </a:spcAft>
+              <a:buNone/>
+            </a:pPr>
+            <a:fld id="{00000000-1234-1234-1234-123412341234}" type="slidenum">
+              <a:rPr lang="ru" sz="2500" smtClean="0">
+                <a:solidFill>
+                  <a:schemeClr val="lt1"/>
+                </a:solidFill>
+              </a:rPr>
+              <a:t>18</a:t>
+            </a:fld>
+            <a:r>
+              <a:rPr lang="ru" sz="2500" dirty="0" smtClean="0"/>
+              <a:t>/20</a:t>
+            </a:r>
+            <a:endParaRPr sz="2500" dirty="0">
+              <a:solidFill>
+                <a:schemeClr val="lt1"/>
+              </a:solidFill>
+            </a:endParaRPr>
+          </a:p>
+        </p:txBody>
+      </p:sp>
+    </p:spTree>
+  </p:cSld>
+  <p:clrMapOvr>
+    <a:masterClrMapping/>
+  </p:clrMapOvr>
+  <p:timing>
+    <p:tnLst>
+      <p:par>
+        <p:cTn id="1" dur="indefinite" restart="never" nodeType="tmRoot"/>
+      </p:par>
+    </p:tnLst>
+  </p:timing>
+</p:sld>
+</file>
+
+<file path=ppt/slides/slide19.xml><?xml version="1.0" encoding="utf-8"?>
+<p:sld xmlns:a="http://schemas.openxmlformats.org/drawingml/2006/main" xmlns:r="http://schemas.openxmlformats.org/officeDocument/2006/relationships" xmlns:p="http://schemas.openxmlformats.org/presentationml/2006/main" showMasterSp="0">
+  <p:cSld>
+    <p:spTree>
+      <p:nvGrpSpPr>
+        <p:cNvPr id="1" name="Shape 331"/>
+        <p:cNvGrpSpPr/>
+        <p:nvPr/>
+      </p:nvGrpSpPr>
+      <p:grpSpPr>
+        <a:xfrm>
+          <a:off x="0" y="0"/>
+          <a:ext cx="0" cy="0"/>
+          <a:chOff x="0" y="0"/>
+          <a:chExt cx="0" cy="0"/>
+        </a:xfrm>
+      </p:grpSpPr>
+      <p:sp>
+        <p:nvSpPr>
+          <p:cNvPr id="332" name="Google Shape;332;p36"/>
+          <p:cNvSpPr txBox="1">
+            <a:spLocks noGrp="1"/>
+          </p:cNvSpPr>
+          <p:nvPr>
+            <p:ph type="title"/>
+          </p:nvPr>
+        </p:nvSpPr>
+        <p:spPr>
+          <a:xfrm>
+            <a:off x="1297500" y="393750"/>
+            <a:ext cx="7038900" cy="914100"/>
+          </a:xfrm>
+          <a:prstGeom prst="rect">
+            <a:avLst/>
+          </a:prstGeom>
+        </p:spPr>
+        <p:txBody>
+          <a:bodyPr spcFirstLastPara="1" wrap="square" lIns="91425" tIns="91425" rIns="91425" bIns="91425" anchor="t" anchorCtr="0">
+            <a:noAutofit/>
+          </a:bodyPr>
+          <a:lstStyle/>
+          <a:p>
+            <a:pPr marL="0" lvl="0" indent="0" algn="l" rtl="0">
+              <a:spcBef>
+                <a:spcPts val="0"/>
+              </a:spcBef>
+              <a:spcAft>
+                <a:spcPts val="0"/>
+              </a:spcAft>
+              <a:buNone/>
+            </a:pPr>
+            <a:r>
+              <a:rPr lang="ru"/>
+              <a:t>Список використаних джерел</a:t>
+            </a:r>
+            <a:endParaRPr/>
+          </a:p>
+        </p:txBody>
+      </p:sp>
+      <p:sp>
+        <p:nvSpPr>
+          <p:cNvPr id="333" name="Google Shape;333;p36"/>
+          <p:cNvSpPr txBox="1">
+            <a:spLocks noGrp="1"/>
+          </p:cNvSpPr>
+          <p:nvPr>
+            <p:ph type="body" idx="1"/>
+          </p:nvPr>
+        </p:nvSpPr>
+        <p:spPr>
+          <a:xfrm>
+            <a:off x="311700" y="1152475"/>
+            <a:ext cx="5729700" cy="3416400"/>
+          </a:xfrm>
+          <a:prstGeom prst="rect">
+            <a:avLst/>
+          </a:prstGeom>
+        </p:spPr>
+        <p:txBody>
+          <a:bodyPr spcFirstLastPara="1" wrap="square" lIns="91425" tIns="91425" rIns="91425" bIns="91425" anchor="t" anchorCtr="0">
+            <a:noAutofit/>
+          </a:bodyPr>
+          <a:lstStyle/>
+          <a:p>
+            <a:pPr lvl="0">
+              <a:buAutoNum type="arabicPeriod"/>
+            </a:pPr>
+            <a:r>
+              <a:rPr lang="ru" u="sng" dirty="0">
+                <a:solidFill>
+                  <a:schemeClr val="hlink"/>
+                </a:solidFill>
+                <a:hlinkClick r:id="rId3"/>
+              </a:rPr>
+              <a:t>https://</a:t>
+            </a:r>
+            <a:r>
+              <a:rPr lang="ru" u="sng" dirty="0" smtClean="0">
+                <a:solidFill>
+                  <a:schemeClr val="hlink"/>
+                </a:solidFill>
+                <a:hlinkClick r:id="rId3"/>
+              </a:rPr>
+              <a:t>git-scm.com/book/ru/v2/</a:t>
+            </a:r>
+            <a:r>
+              <a:rPr lang="ru" u="sng" dirty="0" smtClean="0">
+                <a:solidFill>
+                  <a:schemeClr val="hlink"/>
+                </a:solidFill>
+              </a:rPr>
+              <a:t> </a:t>
+            </a:r>
+            <a:r>
+              <a:rPr lang="ru" b="1" dirty="0">
+                <a:solidFill>
+                  <a:schemeClr val="bg1"/>
+                </a:solidFill>
+              </a:rPr>
+              <a:t>.</a:t>
+            </a:r>
+            <a:endParaRPr lang="ru" u="sng" dirty="0" smtClean="0">
+              <a:solidFill>
+                <a:schemeClr val="hlink"/>
+              </a:solidFill>
+            </a:endParaRPr>
+          </a:p>
+          <a:p>
+            <a:pPr lvl="0">
+              <a:buAutoNum type="arabicPeriod"/>
+            </a:pPr>
+            <a:r>
+              <a:rPr lang="ru" u="sng" dirty="0">
+                <a:solidFill>
+                  <a:schemeClr val="hlink"/>
+                </a:solidFill>
+                <a:hlinkClick r:id="rId4"/>
+              </a:rPr>
+              <a:t>https://youtu.be/ykyERvz17LE/</a:t>
+            </a:r>
+            <a:r>
+              <a:rPr lang="ru" b="1" dirty="0" smtClean="0">
+                <a:solidFill>
+                  <a:schemeClr val="bg1"/>
+                </a:solidFill>
+              </a:rPr>
+              <a:t> .</a:t>
+            </a:r>
+          </a:p>
+          <a:p>
+            <a:pPr lvl="0">
+              <a:buAutoNum type="arabicPeriod"/>
+            </a:pPr>
+            <a:r>
+              <a:rPr lang="ru" u="sng" dirty="0">
+                <a:solidFill>
+                  <a:schemeClr val="hlink"/>
+                </a:solidFill>
+                <a:hlinkClick r:id="rId5"/>
+              </a:rPr>
+              <a:t>https://habr.com/ru/post/125799/</a:t>
+            </a:r>
+            <a:r>
+              <a:rPr lang="ru" b="1" dirty="0" smtClean="0">
+                <a:solidFill>
+                  <a:schemeClr val="bg1"/>
+                </a:solidFill>
+              </a:rPr>
+              <a:t> .</a:t>
+            </a:r>
+          </a:p>
+          <a:p>
+            <a:pPr lvl="0">
+              <a:buAutoNum type="arabicPeriod"/>
+            </a:pPr>
+            <a:r>
+              <a:rPr lang="ru" u="sng" dirty="0">
+                <a:solidFill>
+                  <a:schemeClr val="hlink"/>
+                </a:solidFill>
+                <a:hlinkClick r:id="rId6"/>
+              </a:rPr>
+              <a:t>https://habr.com/ru/post/106912/</a:t>
+            </a:r>
+            <a:r>
+              <a:rPr lang="ru" b="1" dirty="0" smtClean="0">
+                <a:solidFill>
+                  <a:schemeClr val="bg1"/>
+                </a:solidFill>
+              </a:rPr>
+              <a:t> .</a:t>
+            </a:r>
+          </a:p>
+          <a:p>
+            <a:pPr lvl="0">
+              <a:buAutoNum type="arabicPeriod"/>
+            </a:pPr>
+            <a:r>
+              <a:rPr lang="ru" u="sng" dirty="0">
+                <a:solidFill>
+                  <a:schemeClr val="hlink"/>
+                </a:solidFill>
+                <a:hlinkClick r:id="rId7"/>
+              </a:rPr>
+              <a:t>https://htmlacademy.ru/blog/99-github-as-hostin/</a:t>
+            </a:r>
+            <a:r>
+              <a:rPr lang="ru" b="1" dirty="0" smtClean="0">
+                <a:solidFill>
+                  <a:schemeClr val="bg1"/>
+                </a:solidFill>
+              </a:rPr>
+              <a:t> .</a:t>
+            </a:r>
+          </a:p>
+          <a:p>
+            <a:pPr lvl="0">
+              <a:buAutoNum type="arabicPeriod"/>
+            </a:pPr>
+            <a:r>
+              <a:rPr lang="ru" u="sng" dirty="0">
+                <a:solidFill>
+                  <a:schemeClr val="hlink"/>
+                </a:solidFill>
+                <a:hlinkClick r:id="rId8"/>
+              </a:rPr>
+              <a:t>https://git.wiki.kernel.org/</a:t>
+            </a:r>
+            <a:r>
+              <a:rPr lang="ru" b="1" dirty="0" smtClean="0">
+                <a:solidFill>
+                  <a:schemeClr val="bg1"/>
+                </a:solidFill>
+              </a:rPr>
+              <a:t> .</a:t>
+            </a:r>
+          </a:p>
+          <a:p>
+            <a:pPr lvl="0">
+              <a:buAutoNum type="arabicPeriod"/>
+            </a:pPr>
+            <a:r>
+              <a:rPr lang="ru" u="sng" dirty="0">
+                <a:solidFill>
+                  <a:schemeClr val="hlink"/>
+                </a:solidFill>
+                <a:hlinkClick r:id="rId9"/>
+              </a:rPr>
+              <a:t>https://github.com/github/gitignore/</a:t>
+            </a:r>
+            <a:r>
+              <a:rPr lang="ru" b="1" dirty="0" smtClean="0">
+                <a:solidFill>
+                  <a:schemeClr val="bg1"/>
+                </a:solidFill>
+              </a:rPr>
+              <a:t> .</a:t>
+            </a:r>
+            <a:r>
+              <a:rPr lang="ru" dirty="0" smtClean="0"/>
+              <a:t> </a:t>
+            </a:r>
+            <a:endParaRPr dirty="0">
+              <a:solidFill>
+                <a:srgbClr val="000000"/>
+              </a:solidFill>
+              <a:highlight>
+                <a:srgbClr val="FFFFFF"/>
+              </a:highlight>
+            </a:endParaRPr>
+          </a:p>
+        </p:txBody>
+      </p:sp>
+      <p:pic>
+        <p:nvPicPr>
+          <p:cNvPr id="334" name="Google Shape;334;p36"/>
+          <p:cNvPicPr preferRelativeResize="0"/>
+          <p:nvPr/>
+        </p:nvPicPr>
+        <p:blipFill rotWithShape="1">
+          <a:blip r:embed="rId10">
+            <a:alphaModFix/>
+          </a:blip>
+          <a:srcRect l="29062" r="29895"/>
+          <a:stretch/>
+        </p:blipFill>
+        <p:spPr>
+          <a:xfrm>
+            <a:off x="6181724" y="847879"/>
+            <a:ext cx="2814638" cy="3855670"/>
+          </a:xfrm>
+          <a:prstGeom prst="rect">
+            <a:avLst/>
+          </a:prstGeom>
+          <a:noFill/>
+          <a:ln>
+            <a:noFill/>
+          </a:ln>
+        </p:spPr>
+      </p:pic>
+      <p:sp>
+        <p:nvSpPr>
+          <p:cNvPr id="6" name="Google Shape;180;p18"/>
           <p:cNvSpPr txBox="1">
             <a:spLocks noGrp="1"/>
           </p:cNvSpPr>
@@ -17990,375 +17924,6 @@
 </p:sld>
 </file>
 
-<file path=ppt/slides/slide20.xml><?xml version="1.0" encoding="utf-8"?>
-<p:sld xmlns:a="http://schemas.openxmlformats.org/drawingml/2006/main" xmlns:r="http://schemas.openxmlformats.org/officeDocument/2006/relationships" xmlns:p="http://schemas.openxmlformats.org/presentationml/2006/main" showMasterSp="0">
-  <p:cSld>
-    <p:spTree>
-      <p:nvGrpSpPr>
-        <p:cNvPr id="1" name="Shape 331"/>
-        <p:cNvGrpSpPr/>
-        <p:nvPr/>
-      </p:nvGrpSpPr>
-      <p:grpSpPr>
-        <a:xfrm>
-          <a:off x="0" y="0"/>
-          <a:ext cx="0" cy="0"/>
-          <a:chOff x="0" y="0"/>
-          <a:chExt cx="0" cy="0"/>
-        </a:xfrm>
-      </p:grpSpPr>
-      <p:sp>
-        <p:nvSpPr>
-          <p:cNvPr id="332" name="Google Shape;332;p36"/>
-          <p:cNvSpPr txBox="1">
-            <a:spLocks noGrp="1"/>
-          </p:cNvSpPr>
-          <p:nvPr>
-            <p:ph type="title"/>
-          </p:nvPr>
-        </p:nvSpPr>
-        <p:spPr>
-          <a:xfrm>
-            <a:off x="1297500" y="393750"/>
-            <a:ext cx="7038900" cy="914100"/>
-          </a:xfrm>
-          <a:prstGeom prst="rect">
-            <a:avLst/>
-          </a:prstGeom>
-        </p:spPr>
-        <p:txBody>
-          <a:bodyPr spcFirstLastPara="1" wrap="square" lIns="91425" tIns="91425" rIns="91425" bIns="91425" anchor="t" anchorCtr="0">
-            <a:noAutofit/>
-          </a:bodyPr>
-          <a:lstStyle/>
-          <a:p>
-            <a:pPr marL="0" lvl="0" indent="0" algn="l" rtl="0">
-              <a:spcBef>
-                <a:spcPts val="0"/>
-              </a:spcBef>
-              <a:spcAft>
-                <a:spcPts val="0"/>
-              </a:spcAft>
-              <a:buNone/>
-            </a:pPr>
-            <a:r>
-              <a:rPr lang="ru"/>
-              <a:t>Список використаних джерел</a:t>
-            </a:r>
-            <a:endParaRPr/>
-          </a:p>
-        </p:txBody>
-      </p:sp>
-      <p:sp>
-        <p:nvSpPr>
-          <p:cNvPr id="333" name="Google Shape;333;p36"/>
-          <p:cNvSpPr txBox="1">
-            <a:spLocks noGrp="1"/>
-          </p:cNvSpPr>
-          <p:nvPr>
-            <p:ph type="body" idx="1"/>
-          </p:nvPr>
-        </p:nvSpPr>
-        <p:spPr>
-          <a:xfrm>
-            <a:off x="311700" y="1152475"/>
-            <a:ext cx="5729700" cy="3416400"/>
-          </a:xfrm>
-          <a:prstGeom prst="rect">
-            <a:avLst/>
-          </a:prstGeom>
-        </p:spPr>
-        <p:txBody>
-          <a:bodyPr spcFirstLastPara="1" wrap="square" lIns="91425" tIns="91425" rIns="91425" bIns="91425" anchor="t" anchorCtr="0">
-            <a:noAutofit/>
-          </a:bodyPr>
-          <a:lstStyle/>
-          <a:p>
-            <a:pPr lvl="0">
-              <a:buAutoNum type="arabicPeriod"/>
-            </a:pPr>
-            <a:r>
-              <a:rPr lang="ru" u="sng" dirty="0">
-                <a:solidFill>
-                  <a:schemeClr val="hlink"/>
-                </a:solidFill>
-                <a:hlinkClick r:id="rId3"/>
-              </a:rPr>
-              <a:t>https://</a:t>
-            </a:r>
-            <a:r>
-              <a:rPr lang="ru" u="sng" dirty="0" smtClean="0">
-                <a:solidFill>
-                  <a:schemeClr val="hlink"/>
-                </a:solidFill>
-                <a:hlinkClick r:id="rId3"/>
-              </a:rPr>
-              <a:t>git-scm.com/book/ru/v2/</a:t>
-            </a:r>
-            <a:r>
-              <a:rPr lang="ru" u="sng" dirty="0" smtClean="0">
-                <a:solidFill>
-                  <a:schemeClr val="hlink"/>
-                </a:solidFill>
-              </a:rPr>
-              <a:t> </a:t>
-            </a:r>
-            <a:r>
-              <a:rPr lang="ru" b="1" dirty="0">
-                <a:solidFill>
-                  <a:schemeClr val="bg1"/>
-                </a:solidFill>
-              </a:rPr>
-              <a:t>.</a:t>
-            </a:r>
-            <a:endParaRPr lang="ru" u="sng" dirty="0" smtClean="0">
-              <a:solidFill>
-                <a:schemeClr val="hlink"/>
-              </a:solidFill>
-            </a:endParaRPr>
-          </a:p>
-          <a:p>
-            <a:pPr lvl="0">
-              <a:buAutoNum type="arabicPeriod"/>
-            </a:pPr>
-            <a:r>
-              <a:rPr lang="ru" u="sng" dirty="0">
-                <a:solidFill>
-                  <a:schemeClr val="hlink"/>
-                </a:solidFill>
-                <a:hlinkClick r:id="rId4"/>
-              </a:rPr>
-              <a:t>https://youtu.be/ykyERvz17LE/</a:t>
-            </a:r>
-            <a:r>
-              <a:rPr lang="ru" b="1" dirty="0" smtClean="0">
-                <a:solidFill>
-                  <a:schemeClr val="bg1"/>
-                </a:solidFill>
-              </a:rPr>
-              <a:t> .</a:t>
-            </a:r>
-          </a:p>
-          <a:p>
-            <a:pPr lvl="0">
-              <a:buAutoNum type="arabicPeriod"/>
-            </a:pPr>
-            <a:r>
-              <a:rPr lang="ru" u="sng" dirty="0">
-                <a:solidFill>
-                  <a:schemeClr val="hlink"/>
-                </a:solidFill>
-                <a:hlinkClick r:id="rId5"/>
-              </a:rPr>
-              <a:t>https://habr.com/ru/post/125799/</a:t>
-            </a:r>
-            <a:r>
-              <a:rPr lang="ru" b="1" dirty="0" smtClean="0">
-                <a:solidFill>
-                  <a:schemeClr val="bg1"/>
-                </a:solidFill>
-              </a:rPr>
-              <a:t> .</a:t>
-            </a:r>
-          </a:p>
-          <a:p>
-            <a:pPr lvl="0">
-              <a:buAutoNum type="arabicPeriod"/>
-            </a:pPr>
-            <a:r>
-              <a:rPr lang="ru" u="sng" dirty="0">
-                <a:solidFill>
-                  <a:schemeClr val="hlink"/>
-                </a:solidFill>
-                <a:hlinkClick r:id="rId6"/>
-              </a:rPr>
-              <a:t>https://habr.com/ru/post/106912/</a:t>
-            </a:r>
-            <a:r>
-              <a:rPr lang="ru" b="1" dirty="0" smtClean="0">
-                <a:solidFill>
-                  <a:schemeClr val="bg1"/>
-                </a:solidFill>
-              </a:rPr>
-              <a:t> .</a:t>
-            </a:r>
-          </a:p>
-          <a:p>
-            <a:pPr lvl="0">
-              <a:buAutoNum type="arabicPeriod"/>
-            </a:pPr>
-            <a:r>
-              <a:rPr lang="ru" u="sng" dirty="0">
-                <a:solidFill>
-                  <a:schemeClr val="hlink"/>
-                </a:solidFill>
-                <a:hlinkClick r:id="rId7"/>
-              </a:rPr>
-              <a:t>https://htmlacademy.ru/blog/99-github-as-hostin/</a:t>
-            </a:r>
-            <a:r>
-              <a:rPr lang="ru" b="1" dirty="0" smtClean="0">
-                <a:solidFill>
-                  <a:schemeClr val="bg1"/>
-                </a:solidFill>
-              </a:rPr>
-              <a:t> .</a:t>
-            </a:r>
-          </a:p>
-          <a:p>
-            <a:pPr lvl="0">
-              <a:buAutoNum type="arabicPeriod"/>
-            </a:pPr>
-            <a:r>
-              <a:rPr lang="ru" u="sng" dirty="0">
-                <a:solidFill>
-                  <a:schemeClr val="hlink"/>
-                </a:solidFill>
-                <a:hlinkClick r:id="rId8"/>
-              </a:rPr>
-              <a:t>https://git.wiki.kernel.org/</a:t>
-            </a:r>
-            <a:r>
-              <a:rPr lang="ru" b="1" dirty="0" smtClean="0">
-                <a:solidFill>
-                  <a:schemeClr val="bg1"/>
-                </a:solidFill>
-              </a:rPr>
-              <a:t> .</a:t>
-            </a:r>
-          </a:p>
-          <a:p>
-            <a:pPr lvl="0">
-              <a:buAutoNum type="arabicPeriod"/>
-            </a:pPr>
-            <a:r>
-              <a:rPr lang="ru" u="sng" dirty="0">
-                <a:solidFill>
-                  <a:schemeClr val="hlink"/>
-                </a:solidFill>
-                <a:hlinkClick r:id="rId9"/>
-              </a:rPr>
-              <a:t>https://github.com/github/gitignore/</a:t>
-            </a:r>
-            <a:r>
-              <a:rPr lang="ru" b="1" dirty="0" smtClean="0">
-                <a:solidFill>
-                  <a:schemeClr val="bg1"/>
-                </a:solidFill>
-              </a:rPr>
-              <a:t> .</a:t>
-            </a:r>
-            <a:r>
-              <a:rPr lang="ru" dirty="0" smtClean="0"/>
-              <a:t> </a:t>
-            </a:r>
-            <a:endParaRPr dirty="0">
-              <a:solidFill>
-                <a:srgbClr val="000000"/>
-              </a:solidFill>
-              <a:highlight>
-                <a:srgbClr val="FFFFFF"/>
-              </a:highlight>
-            </a:endParaRPr>
-          </a:p>
-        </p:txBody>
-      </p:sp>
-      <p:pic>
-        <p:nvPicPr>
-          <p:cNvPr id="334" name="Google Shape;334;p36"/>
-          <p:cNvPicPr preferRelativeResize="0"/>
-          <p:nvPr/>
-        </p:nvPicPr>
-        <p:blipFill rotWithShape="1">
-          <a:blip r:embed="rId10">
-            <a:alphaModFix/>
-          </a:blip>
-          <a:srcRect l="29062" r="29895"/>
-          <a:stretch/>
-        </p:blipFill>
-        <p:spPr>
-          <a:xfrm>
-            <a:off x="6181724" y="847879"/>
-            <a:ext cx="2814638" cy="3855670"/>
-          </a:xfrm>
-          <a:prstGeom prst="rect">
-            <a:avLst/>
-          </a:prstGeom>
-          <a:noFill/>
-          <a:ln>
-            <a:noFill/>
-          </a:ln>
-        </p:spPr>
-      </p:pic>
-      <p:sp>
-        <p:nvSpPr>
-          <p:cNvPr id="6" name="Google Shape;180;p18"/>
-          <p:cNvSpPr txBox="1">
-            <a:spLocks noGrp="1"/>
-          </p:cNvSpPr>
-          <p:nvPr>
-            <p:ph type="sldNum" idx="12"/>
-          </p:nvPr>
-        </p:nvSpPr>
-        <p:spPr>
-          <a:xfrm>
-            <a:off x="7926375" y="180000"/>
-            <a:ext cx="1094725" cy="568200"/>
-          </a:xfrm>
-          <a:prstGeom prst="rect">
-            <a:avLst/>
-          </a:prstGeom>
-        </p:spPr>
-        <p:txBody>
-          <a:bodyPr spcFirstLastPara="1" wrap="square" lIns="91425" tIns="91425" rIns="91425" bIns="91425" anchor="ctr" anchorCtr="0">
-            <a:noAutofit/>
-          </a:bodyPr>
-          <a:lstStyle/>
-          <a:p>
-            <a:pPr marL="0" lvl="0" indent="0" algn="r" rtl="0">
-              <a:spcBef>
-                <a:spcPts val="0"/>
-              </a:spcBef>
-              <a:spcAft>
-                <a:spcPts val="0"/>
-              </a:spcAft>
-              <a:buNone/>
-            </a:pPr>
-            <a:fld id="{00000000-1234-1234-1234-123412341234}" type="slidenum">
-              <a:rPr lang="ru" sz="2500" smtClean="0">
-                <a:solidFill>
-                  <a:schemeClr val="lt1"/>
-                </a:solidFill>
-              </a:rPr>
-              <a:t>20</a:t>
-            </a:fld>
-            <a:r>
-              <a:rPr lang="ru" sz="2500" dirty="0" smtClean="0"/>
-              <a:t>/20</a:t>
-            </a:r>
-            <a:endParaRPr sz="2500" dirty="0">
-              <a:solidFill>
-                <a:schemeClr val="lt1"/>
-              </a:solidFill>
-            </a:endParaRPr>
-          </a:p>
-        </p:txBody>
-      </p:sp>
-    </p:spTree>
-  </p:cSld>
-  <p:clrMapOvr>
-    <a:masterClrMapping/>
-  </p:clrMapOvr>
-  <p:timing>
-    <p:tnLst>
-      <p:par>
-        <p:cTn id="1" dur="indefinite" restart="never" nodeType="tmRoot"/>
-      </p:par>
-    </p:tnLst>
-  </p:timing>
-</p:sld>
-</file>
-
 <file path=ppt/slides/slide3.xml><?xml version="1.0" encoding="utf-8"?>
 <p:sld xmlns:a="http://schemas.openxmlformats.org/drawingml/2006/main" xmlns:r="http://schemas.openxmlformats.org/officeDocument/2006/relationships" xmlns:p="http://schemas.openxmlformats.org/presentationml/2006/main" showMasterSp="0">
   <p:cSld>
@@ -18470,7 +18035,15 @@
             </a:pPr>
             <a:r>
               <a:rPr lang="ru" dirty="0"/>
-              <a:t>Інтерфейс: CMD</a:t>
+              <a:t>Інтерфейс: </a:t>
+            </a:r>
+            <a:r>
+              <a:rPr lang="ru" dirty="0" smtClean="0"/>
+              <a:t>консольний (</a:t>
+            </a:r>
+            <a:r>
+              <a:rPr lang="en-US" dirty="0" smtClean="0"/>
+              <a:t>CMD, Bash)</a:t>
             </a:r>
             <a:endParaRPr dirty="0"/>
           </a:p>
@@ -18814,430 +18387,6 @@
                 <a:schemeClr val="lt1"/>
               </a:solidFill>
             </a:endParaRPr>
-          </a:p>
-        </p:txBody>
-      </p:sp>
-      <p:sp>
-        <p:nvSpPr>
-          <p:cNvPr id="11" name="Google Shape;186;p19"/>
-          <p:cNvSpPr txBox="1">
-            <a:spLocks/>
-          </p:cNvSpPr>
-          <p:nvPr/>
-        </p:nvSpPr>
-        <p:spPr>
-          <a:xfrm>
-            <a:off x="612800" y="933606"/>
-            <a:ext cx="7723600" cy="505148"/>
-          </a:xfrm>
-          <a:prstGeom prst="rect">
-            <a:avLst/>
-          </a:prstGeom>
-          <a:noFill/>
-          <a:ln>
-            <a:noFill/>
-          </a:ln>
-        </p:spPr>
-        <p:txBody>
-          <a:bodyPr spcFirstLastPara="1" wrap="square" lIns="91425" tIns="91425" rIns="91425" bIns="91425" anchor="ctr" anchorCtr="0">
-            <a:noAutofit/>
-          </a:bodyPr>
-          <a:lstStyle>
-            <a:defPPr marR="0" lvl="0" algn="l" rtl="0">
-              <a:lnSpc>
-                <a:spcPct val="100000"/>
-              </a:lnSpc>
-              <a:spcBef>
-                <a:spcPts val="0"/>
-              </a:spcBef>
-              <a:spcAft>
-                <a:spcPts val="0"/>
-              </a:spcAft>
-            </a:defPPr>
-            <a:lvl1pPr marL="457200" marR="0" lvl="0" indent="-311150" algn="l" rtl="0">
-              <a:lnSpc>
-                <a:spcPct val="115000"/>
-              </a:lnSpc>
-              <a:spcBef>
-                <a:spcPts val="0"/>
-              </a:spcBef>
-              <a:spcAft>
-                <a:spcPts val="0"/>
-              </a:spcAft>
-              <a:buClr>
-                <a:schemeClr val="lt1"/>
-              </a:buClr>
-              <a:buSzPts val="1300"/>
-              <a:buFont typeface="Lato"/>
-              <a:buChar char="●"/>
-              <a:defRPr sz="1300" b="0" i="0" u="none" strike="noStrike" cap="none">
-                <a:solidFill>
-                  <a:schemeClr val="lt1"/>
-                </a:solidFill>
-                <a:latin typeface="Lato"/>
-                <a:ea typeface="Lato"/>
-                <a:cs typeface="Lato"/>
-                <a:sym typeface="Lato"/>
-              </a:defRPr>
-            </a:lvl1pPr>
-            <a:lvl2pPr marL="914400" marR="0" lvl="1" indent="-298450" algn="l" rtl="0">
-              <a:lnSpc>
-                <a:spcPct val="115000"/>
-              </a:lnSpc>
-              <a:spcBef>
-                <a:spcPts val="1600"/>
-              </a:spcBef>
-              <a:spcAft>
-                <a:spcPts val="0"/>
-              </a:spcAft>
-              <a:buClr>
-                <a:schemeClr val="lt1"/>
-              </a:buClr>
-              <a:buSzPts val="1100"/>
-              <a:buFont typeface="Lato"/>
-              <a:buChar char="○"/>
-              <a:defRPr sz="1100" b="0" i="0" u="none" strike="noStrike" cap="none">
-                <a:solidFill>
-                  <a:schemeClr val="lt1"/>
-                </a:solidFill>
-                <a:latin typeface="Lato"/>
-                <a:ea typeface="Lato"/>
-                <a:cs typeface="Lato"/>
-                <a:sym typeface="Lato"/>
-              </a:defRPr>
-            </a:lvl2pPr>
-            <a:lvl3pPr marL="1371600" marR="0" lvl="2" indent="-298450" algn="l" rtl="0">
-              <a:lnSpc>
-                <a:spcPct val="115000"/>
-              </a:lnSpc>
-              <a:spcBef>
-                <a:spcPts val="1600"/>
-              </a:spcBef>
-              <a:spcAft>
-                <a:spcPts val="0"/>
-              </a:spcAft>
-              <a:buClr>
-                <a:schemeClr val="lt1"/>
-              </a:buClr>
-              <a:buSzPts val="1100"/>
-              <a:buFont typeface="Lato"/>
-              <a:buChar char="■"/>
-              <a:defRPr sz="1100" b="0" i="0" u="none" strike="noStrike" cap="none">
-                <a:solidFill>
-                  <a:schemeClr val="lt1"/>
-                </a:solidFill>
-                <a:latin typeface="Lato"/>
-                <a:ea typeface="Lato"/>
-                <a:cs typeface="Lato"/>
-                <a:sym typeface="Lato"/>
-              </a:defRPr>
-            </a:lvl3pPr>
-            <a:lvl4pPr marL="1828800" marR="0" lvl="3" indent="-298450" algn="l" rtl="0">
-              <a:lnSpc>
-                <a:spcPct val="115000"/>
-              </a:lnSpc>
-              <a:spcBef>
-                <a:spcPts val="1600"/>
-              </a:spcBef>
-              <a:spcAft>
-                <a:spcPts val="0"/>
-              </a:spcAft>
-              <a:buClr>
-                <a:schemeClr val="lt1"/>
-              </a:buClr>
-              <a:buSzPts val="1100"/>
-              <a:buFont typeface="Lato"/>
-              <a:buChar char="●"/>
-              <a:defRPr sz="1100" b="0" i="0" u="none" strike="noStrike" cap="none">
-                <a:solidFill>
-                  <a:schemeClr val="lt1"/>
-                </a:solidFill>
-                <a:latin typeface="Lato"/>
-                <a:ea typeface="Lato"/>
-                <a:cs typeface="Lato"/>
-                <a:sym typeface="Lato"/>
-              </a:defRPr>
-            </a:lvl4pPr>
-            <a:lvl5pPr marL="2286000" marR="0" lvl="4" indent="-298450" algn="l" rtl="0">
-              <a:lnSpc>
-                <a:spcPct val="115000"/>
-              </a:lnSpc>
-              <a:spcBef>
-                <a:spcPts val="1600"/>
-              </a:spcBef>
-              <a:spcAft>
-                <a:spcPts val="0"/>
-              </a:spcAft>
-              <a:buClr>
-                <a:schemeClr val="lt1"/>
-              </a:buClr>
-              <a:buSzPts val="1100"/>
-              <a:buFont typeface="Lato"/>
-              <a:buChar char="○"/>
-              <a:defRPr sz="1100" b="0" i="0" u="none" strike="noStrike" cap="none">
-                <a:solidFill>
-                  <a:schemeClr val="lt1"/>
-                </a:solidFill>
-                <a:latin typeface="Lato"/>
-                <a:ea typeface="Lato"/>
-                <a:cs typeface="Lato"/>
-                <a:sym typeface="Lato"/>
-              </a:defRPr>
-            </a:lvl5pPr>
-            <a:lvl6pPr marL="2743200" marR="0" lvl="5" indent="-298450" algn="l" rtl="0">
-              <a:lnSpc>
-                <a:spcPct val="115000"/>
-              </a:lnSpc>
-              <a:spcBef>
-                <a:spcPts val="1600"/>
-              </a:spcBef>
-              <a:spcAft>
-                <a:spcPts val="0"/>
-              </a:spcAft>
-              <a:buClr>
-                <a:schemeClr val="lt1"/>
-              </a:buClr>
-              <a:buSzPts val="1100"/>
-              <a:buFont typeface="Lato"/>
-              <a:buChar char="■"/>
-              <a:defRPr sz="1100" b="0" i="0" u="none" strike="noStrike" cap="none">
-                <a:solidFill>
-                  <a:schemeClr val="lt1"/>
-                </a:solidFill>
-                <a:latin typeface="Lato"/>
-                <a:ea typeface="Lato"/>
-                <a:cs typeface="Lato"/>
-                <a:sym typeface="Lato"/>
-              </a:defRPr>
-            </a:lvl6pPr>
-            <a:lvl7pPr marL="3200400" marR="0" lvl="6" indent="-298450" algn="l" rtl="0">
-              <a:lnSpc>
-                <a:spcPct val="115000"/>
-              </a:lnSpc>
-              <a:spcBef>
-                <a:spcPts val="1600"/>
-              </a:spcBef>
-              <a:spcAft>
-                <a:spcPts val="0"/>
-              </a:spcAft>
-              <a:buClr>
-                <a:schemeClr val="lt1"/>
-              </a:buClr>
-              <a:buSzPts val="1100"/>
-              <a:buFont typeface="Lato"/>
-              <a:buChar char="●"/>
-              <a:defRPr sz="1100" b="0" i="0" u="none" strike="noStrike" cap="none">
-                <a:solidFill>
-                  <a:schemeClr val="lt1"/>
-                </a:solidFill>
-                <a:latin typeface="Lato"/>
-                <a:ea typeface="Lato"/>
-                <a:cs typeface="Lato"/>
-                <a:sym typeface="Lato"/>
-              </a:defRPr>
-            </a:lvl7pPr>
-            <a:lvl8pPr marL="3657600" marR="0" lvl="7" indent="-298450" algn="l" rtl="0">
-              <a:lnSpc>
-                <a:spcPct val="115000"/>
-              </a:lnSpc>
-              <a:spcBef>
-                <a:spcPts val="1600"/>
-              </a:spcBef>
-              <a:spcAft>
-                <a:spcPts val="0"/>
-              </a:spcAft>
-              <a:buClr>
-                <a:schemeClr val="lt1"/>
-              </a:buClr>
-              <a:buSzPts val="1100"/>
-              <a:buFont typeface="Lato"/>
-              <a:buChar char="○"/>
-              <a:defRPr sz="1100" b="0" i="0" u="none" strike="noStrike" cap="none">
-                <a:solidFill>
-                  <a:schemeClr val="lt1"/>
-                </a:solidFill>
-                <a:latin typeface="Lato"/>
-                <a:ea typeface="Lato"/>
-                <a:cs typeface="Lato"/>
-                <a:sym typeface="Lato"/>
-              </a:defRPr>
-            </a:lvl8pPr>
-            <a:lvl9pPr marL="4114800" marR="0" lvl="8" indent="-298450" algn="l" rtl="0">
-              <a:lnSpc>
-                <a:spcPct val="115000"/>
-              </a:lnSpc>
-              <a:spcBef>
-                <a:spcPts val="1600"/>
-              </a:spcBef>
-              <a:spcAft>
-                <a:spcPts val="1600"/>
-              </a:spcAft>
-              <a:buClr>
-                <a:schemeClr val="lt1"/>
-              </a:buClr>
-              <a:buSzPts val="1100"/>
-              <a:buFont typeface="Lato"/>
-              <a:buChar char="■"/>
-              <a:defRPr sz="1100" b="0" i="0" u="none" strike="noStrike" cap="none">
-                <a:solidFill>
-                  <a:schemeClr val="lt1"/>
-                </a:solidFill>
-                <a:latin typeface="Lato"/>
-                <a:ea typeface="Lato"/>
-                <a:cs typeface="Lato"/>
-                <a:sym typeface="Lato"/>
-              </a:defRPr>
-            </a:lvl9pPr>
-          </a:lstStyle>
-          <a:p>
-            <a:pPr marL="0" indent="0" algn="ctr">
-              <a:buFont typeface="Lato"/>
-              <a:buNone/>
-            </a:pPr>
-            <a:r>
-              <a:rPr lang="uk-UA" b="1" dirty="0" smtClean="0"/>
-              <a:t>!!! Усі приклади в презентації на ведено з використанням Оригінального клієнту</a:t>
-            </a:r>
-            <a:r>
-              <a:rPr lang="en-US" b="1" dirty="0" smtClean="0"/>
-              <a:t> </a:t>
-            </a:r>
-            <a:r>
-              <a:rPr lang="en-US" b="1" dirty="0" err="1" smtClean="0"/>
-              <a:t>Git</a:t>
-            </a:r>
-            <a:r>
-              <a:rPr lang="en-US" b="1" dirty="0" smtClean="0"/>
-              <a:t> Bash</a:t>
-            </a:r>
-            <a:r>
-              <a:rPr lang="uk-UA" b="1" dirty="0"/>
-              <a:t> </a:t>
-            </a:r>
-            <a:r>
-              <a:rPr lang="uk-UA" b="1" dirty="0" smtClean="0"/>
-              <a:t>для </a:t>
-            </a:r>
-            <a:r>
-              <a:rPr lang="en-US" b="1" dirty="0" smtClean="0"/>
-              <a:t>Windows</a:t>
-            </a:r>
-            <a:endParaRPr lang="en-US" dirty="0"/>
-          </a:p>
-        </p:txBody>
-      </p:sp>
-      <p:sp>
-        <p:nvSpPr>
-          <p:cNvPr id="3" name="Полилиния 2"/>
-          <p:cNvSpPr/>
-          <p:nvPr/>
-        </p:nvSpPr>
-        <p:spPr>
-          <a:xfrm>
-            <a:off x="259297" y="1106744"/>
-            <a:ext cx="761429" cy="1133182"/>
-          </a:xfrm>
-          <a:custGeom>
-            <a:avLst/>
-            <a:gdLst>
-              <a:gd name="connsiteX0" fmla="*/ 513336 w 761429"/>
-              <a:gd name="connsiteY0" fmla="*/ 91191 h 1133182"/>
-              <a:gd name="connsiteX1" fmla="*/ 222712 w 761429"/>
-              <a:gd name="connsiteY1" fmla="*/ 6130 h 1133182"/>
-              <a:gd name="connsiteX2" fmla="*/ 286508 w 761429"/>
-              <a:gd name="connsiteY2" fmla="*/ 240047 h 1133182"/>
-              <a:gd name="connsiteX3" fmla="*/ 24238 w 761429"/>
-              <a:gd name="connsiteY3" fmla="*/ 318019 h 1133182"/>
-              <a:gd name="connsiteX4" fmla="*/ 95122 w 761429"/>
-              <a:gd name="connsiteY4" fmla="*/ 700791 h 1133182"/>
-              <a:gd name="connsiteX5" fmla="*/ 761429 w 761429"/>
-              <a:gd name="connsiteY5" fmla="*/ 1133182 h 1133182"/>
-            </a:gdLst>
-            <a:ahLst/>
-            <a:cxnLst>
-              <a:cxn ang="0">
-                <a:pos x="connsiteX0" y="connsiteY0"/>
-              </a:cxn>
-              <a:cxn ang="0">
-                <a:pos x="connsiteX1" y="connsiteY1"/>
-              </a:cxn>
-              <a:cxn ang="0">
-                <a:pos x="connsiteX2" y="connsiteY2"/>
-              </a:cxn>
-              <a:cxn ang="0">
-                <a:pos x="connsiteX3" y="connsiteY3"/>
-              </a:cxn>
-              <a:cxn ang="0">
-                <a:pos x="connsiteX4" y="connsiteY4"/>
-              </a:cxn>
-              <a:cxn ang="0">
-                <a:pos x="connsiteX5" y="connsiteY5"/>
-              </a:cxn>
-            </a:cxnLst>
-            <a:rect l="l" t="t" r="r" b="b"/>
-            <a:pathLst>
-              <a:path w="761429" h="1133182">
-                <a:moveTo>
-                  <a:pt x="513336" y="91191"/>
-                </a:moveTo>
-                <a:cubicBezTo>
-                  <a:pt x="386926" y="36256"/>
-                  <a:pt x="260517" y="-18679"/>
-                  <a:pt x="222712" y="6130"/>
-                </a:cubicBezTo>
-                <a:cubicBezTo>
-                  <a:pt x="184907" y="30939"/>
-                  <a:pt x="319587" y="188066"/>
-                  <a:pt x="286508" y="240047"/>
-                </a:cubicBezTo>
-                <a:cubicBezTo>
-                  <a:pt x="253429" y="292028"/>
-                  <a:pt x="56136" y="241228"/>
-                  <a:pt x="24238" y="318019"/>
-                </a:cubicBezTo>
-                <a:cubicBezTo>
-                  <a:pt x="-7660" y="394810"/>
-                  <a:pt x="-27743" y="564931"/>
-                  <a:pt x="95122" y="700791"/>
-                </a:cubicBezTo>
-                <a:cubicBezTo>
-                  <a:pt x="217987" y="836651"/>
-                  <a:pt x="489708" y="984916"/>
-                  <a:pt x="761429" y="1133182"/>
-                </a:cubicBezTo>
-              </a:path>
-            </a:pathLst>
-          </a:custGeom>
-          <a:noFill/>
-          <a:ln w="38100">
-            <a:solidFill>
-              <a:srgbClr val="D9D9D9"/>
-            </a:solidFill>
-            <a:tailEnd type="stealth"/>
-          </a:ln>
-        </p:spPr>
-        <p:style>
-          <a:lnRef idx="2">
-            <a:schemeClr val="accent1">
-              <a:shade val="50000"/>
-            </a:schemeClr>
-          </a:lnRef>
-          <a:fillRef idx="1">
-            <a:schemeClr val="accent1"/>
-          </a:fillRef>
-          <a:effectRef idx="0">
-            <a:schemeClr val="accent1"/>
-          </a:effectRef>
-          <a:fontRef idx="minor">
-            <a:schemeClr val="lt1"/>
-          </a:fontRef>
-        </p:style>
-        <p:txBody>
-          <a:bodyPr rtlCol="0" anchor="ctr"/>
-          <a:lstStyle/>
-          <a:p>
-            <a:pPr algn="ctr"/>
-            <a:endParaRPr lang="ru-RU"/>
           </a:p>
         </p:txBody>
       </p:sp>
@@ -19881,111 +19030,6 @@
                       </p:childTnLst>
                     </p:cTn>
                   </p:par>
-                  <p:par>
-                    <p:cTn id="54" fill="hold">
-                      <p:stCondLst>
-                        <p:cond delay="indefinite"/>
-                      </p:stCondLst>
-                      <p:childTnLst>
-                        <p:par>
-                          <p:cTn id="55" fill="hold">
-                            <p:stCondLst>
-                              <p:cond delay="0"/>
-                            </p:stCondLst>
-                            <p:childTnLst>
-                              <p:par>
-                                <p:cTn id="56" presetID="22" presetClass="entr" presetSubtype="8" fill="hold" grpId="0" nodeType="clickEffect">
-                                  <p:stCondLst>
-                                    <p:cond delay="0"/>
-                                  </p:stCondLst>
-                                  <p:childTnLst>
-                                    <p:set>
-                                      <p:cBhvr>
-                                        <p:cTn id="57" dur="1" fill="hold">
-                                          <p:stCondLst>
-                                            <p:cond delay="0"/>
-                                          </p:stCondLst>
-                                        </p:cTn>
-                                        <p:tgtEl>
-                                          <p:spTgt spid="11">
-                                            <p:txEl>
-                                              <p:pRg st="0" end="0"/>
-                                            </p:txEl>
-                                          </p:spTgt>
-                                        </p:tgtEl>
-                                        <p:attrNameLst>
-                                          <p:attrName>style.visibility</p:attrName>
-                                        </p:attrNameLst>
-                                      </p:cBhvr>
-                                      <p:to>
-                                        <p:strVal val="visible"/>
-                                      </p:to>
-                                    </p:set>
-                                    <p:animEffect transition="in" filter="wipe(left)">
-                                      <p:cBhvr>
-                                        <p:cTn id="58" dur="500"/>
-                                        <p:tgtEl>
-                                          <p:spTgt spid="11">
-                                            <p:txEl>
-                                              <p:pRg st="0" end="0"/>
-                                            </p:txEl>
-                                          </p:spTgt>
-                                        </p:tgtEl>
-                                      </p:cBhvr>
-                                    </p:animEffect>
-                                  </p:childTnLst>
-                                </p:cTn>
-                              </p:par>
-                            </p:childTnLst>
-                          </p:cTn>
-                        </p:par>
-                        <p:par>
-                          <p:cTn id="59" fill="hold">
-                            <p:stCondLst>
-                              <p:cond delay="500"/>
-                            </p:stCondLst>
-                            <p:childTnLst>
-                              <p:par>
-                                <p:cTn id="60" presetID="22" presetClass="entr" presetSubtype="1" fill="hold" grpId="0" nodeType="afterEffect">
-                                  <p:stCondLst>
-                                    <p:cond delay="0"/>
-                                  </p:stCondLst>
-                                  <p:childTnLst>
-                                    <p:set>
-                                      <p:cBhvr>
-                                        <p:cTn id="61" dur="1" fill="hold">
-                                          <p:stCondLst>
-                                            <p:cond delay="0"/>
-                                          </p:stCondLst>
-                                        </p:cTn>
-                                        <p:tgtEl>
-                                          <p:spTgt spid="3"/>
-                                        </p:tgtEl>
-                                        <p:attrNameLst>
-                                          <p:attrName>style.visibility</p:attrName>
-                                        </p:attrNameLst>
-                                      </p:cBhvr>
-                                      <p:to>
-                                        <p:strVal val="visible"/>
-                                      </p:to>
-                                    </p:set>
-                                    <p:animEffect transition="in" filter="wipe(up)">
-                                      <p:cBhvr>
-                                        <p:cTn id="62" dur="500"/>
-                                        <p:tgtEl>
-                                          <p:spTgt spid="3"/>
-                                        </p:tgtEl>
-                                      </p:cBhvr>
-                                    </p:animEffect>
-                                  </p:childTnLst>
-                                </p:cTn>
-                              </p:par>
-                            </p:childTnLst>
-                          </p:cTn>
-                        </p:par>
-                      </p:childTnLst>
-                    </p:cTn>
-                  </p:par>
                 </p:childTnLst>
               </p:cTn>
               <p:prevCondLst>
@@ -20011,8 +19055,6 @@
       <p:bldP spid="186" grpId="0" uiExpand="1" build="p"/>
       <p:bldP spid="187" grpId="0" uiExpand="1" build="p"/>
       <p:bldP spid="188" grpId="0" uiExpand="1" build="p"/>
-      <p:bldP spid="11" grpId="0" uiExpand="1" build="p"/>
-      <p:bldP spid="3" grpId="0" animBg="1"/>
     </p:bldLst>
   </p:timing>
 </p:sld>

</xml_diff>

<commit_message>
Slides #3,12,18,19 were edited
</commit_message>
<xml_diff>
--- a/Seminar1_Github_v02.pptx
+++ b/Seminar1_Github_v02.pptx
@@ -5,7 +5,7 @@
     <p:sldMasterId id="2147483659" r:id="rId1"/>
   </p:sldMasterIdLst>
   <p:notesMasterIdLst>
-    <p:notesMasterId r:id="rId21"/>
+    <p:notesMasterId r:id="rId22"/>
   </p:notesMasterIdLst>
   <p:sldIdLst>
     <p:sldId id="256" r:id="rId2"/>
@@ -26,24 +26,25 @@
     <p:sldId id="276" r:id="rId17"/>
     <p:sldId id="277" r:id="rId18"/>
     <p:sldId id="278" r:id="rId19"/>
-    <p:sldId id="279" r:id="rId20"/>
+    <p:sldId id="280" r:id="rId20"/>
+    <p:sldId id="279" r:id="rId21"/>
   </p:sldIdLst>
   <p:sldSz cx="9144000" cy="5143500" type="screen16x9"/>
   <p:notesSz cx="6858000" cy="9144000"/>
   <p:embeddedFontLst>
     <p:embeddedFont>
-      <p:font typeface="Montserrat" charset="-52"/>
-      <p:regular r:id="rId22"/>
-      <p:bold r:id="rId23"/>
-      <p:italic r:id="rId24"/>
-      <p:boldItalic r:id="rId25"/>
+      <p:font typeface="Lato" charset="0"/>
+      <p:regular r:id="rId23"/>
+      <p:bold r:id="rId24"/>
+      <p:italic r:id="rId25"/>
+      <p:boldItalic r:id="rId26"/>
     </p:embeddedFont>
     <p:embeddedFont>
-      <p:font typeface="Lato" charset="0"/>
-      <p:regular r:id="rId26"/>
-      <p:bold r:id="rId27"/>
-      <p:italic r:id="rId28"/>
-      <p:boldItalic r:id="rId29"/>
+      <p:font typeface="Montserrat" charset="-52"/>
+      <p:regular r:id="rId27"/>
+      <p:bold r:id="rId28"/>
+      <p:italic r:id="rId29"/>
+      <p:boldItalic r:id="rId30"/>
     </p:embeddedFont>
   </p:embeddedFontLst>
   <p:defaultTextStyle>
@@ -12380,8 +12381,8 @@
         </p:nvSpPr>
         <p:spPr>
           <a:xfrm>
-            <a:off x="835000" y="1567550"/>
-            <a:ext cx="3737100" cy="2911200"/>
+            <a:off x="835000" y="1132375"/>
+            <a:ext cx="3728122" cy="3346375"/>
           </a:xfrm>
           <a:prstGeom prst="rect">
             <a:avLst/>
@@ -12393,7 +12394,7 @@
           </a:bodyPr>
           <a:lstStyle/>
           <a:p>
-            <a:pPr marL="0" lvl="0" indent="0" algn="l" rtl="0">
+            <a:pPr marL="0" lvl="0" indent="0" algn="just" rtl="0">
               <a:spcBef>
                 <a:spcPts val="0"/>
               </a:spcBef>
@@ -12403,15 +12404,19 @@
               <a:buNone/>
             </a:pPr>
             <a:r>
-              <a:rPr lang="ru" dirty="0"/>
-              <a:t>Github - глобальний веб-сервіс для спільної розробки програмних проектів, заснований за принципами Git, а також  хостінг (сховище) програмного коду. Це:</a:t>
-            </a:r>
-            <a:endParaRPr dirty="0"/>
+              <a:rPr lang="ru" sz="1400" dirty="0"/>
+              <a:t>Github - глобальний веб-сервіс для спільної розробки програмних проектів, заснований за принципами Git, а також  хостінг (сховище) програмного коду. </a:t>
+            </a:r>
+            <a:r>
+              <a:rPr lang="ru" sz="1400" dirty="0" smtClean="0"/>
+              <a:t>Це:</a:t>
+            </a:r>
+            <a:endParaRPr sz="1400" dirty="0" smtClean="0"/>
           </a:p>
           <a:p>
-            <a:pPr marL="457200" lvl="0" indent="-311150" algn="l" rtl="0">
-              <a:spcBef>
-                <a:spcPts val="1600"/>
+            <a:pPr marL="457200" lvl="0" indent="-311150" algn="just" rtl="0">
+              <a:spcBef>
+                <a:spcPts val="0"/>
               </a:spcBef>
               <a:spcAft>
                 <a:spcPts val="0"/>
@@ -12420,47 +12425,110 @@
               <a:buChar char="-"/>
             </a:pPr>
             <a:r>
-              <a:rPr lang="ru" dirty="0"/>
-              <a:t>частина Microsoft</a:t>
-            </a:r>
-            <a:endParaRPr dirty="0"/>
+              <a:rPr lang="ru" sz="1400" dirty="0" smtClean="0"/>
+              <a:t>40 млн. користувачів з усього світу;</a:t>
+            </a:r>
+            <a:endParaRPr sz="1400" dirty="0" smtClean="0"/>
           </a:p>
           <a:p>
-            <a:pPr marL="457200" lvl="0" indent="-311150" algn="l" rtl="0">
-              <a:spcBef>
-                <a:spcPts val="0"/>
-              </a:spcBef>
-              <a:spcAft>
-                <a:spcPts val="0"/>
-              </a:spcAft>
-              <a:buSzPts val="1300"/>
+            <a:pPr algn="just">
+              <a:buFont typeface="Lato"/>
               <a:buChar char="-"/>
             </a:pPr>
             <a:r>
-              <a:rPr lang="ru" dirty="0"/>
-              <a:t>40 млн. користувачів з усього світу</a:t>
-            </a:r>
-            <a:endParaRPr dirty="0"/>
+              <a:rPr lang="ru" sz="1400" dirty="0" smtClean="0"/>
+              <a:t>100 </a:t>
+            </a:r>
+            <a:r>
+              <a:rPr lang="ru" sz="1400" dirty="0"/>
+              <a:t>млн. репозиторіїв - найбільший хостінг у </a:t>
+            </a:r>
+            <a:r>
+              <a:rPr lang="ru" sz="1400" dirty="0" smtClean="0"/>
+              <a:t>світі;</a:t>
+            </a:r>
+            <a:r>
+              <a:rPr lang="ru-RU" sz="1400" dirty="0"/>
+              <a:t> </a:t>
+            </a:r>
+            <a:endParaRPr lang="ru-RU" sz="1400" dirty="0" smtClean="0"/>
           </a:p>
           <a:p>
-            <a:pPr marL="457200" lvl="0" indent="-311150" algn="l" rtl="0">
-              <a:spcBef>
-                <a:spcPts val="0"/>
-              </a:spcBef>
-              <a:spcAft>
-                <a:spcPts val="0"/>
-              </a:spcAft>
-              <a:buSzPts val="1300"/>
+            <a:pPr algn="just">
+              <a:buFont typeface="Lato"/>
               <a:buChar char="-"/>
             </a:pPr>
             <a:r>
-              <a:rPr lang="ru" dirty="0"/>
-              <a:t>100 млн. репозиторіїв - найбільший хостінг у </a:t>
-            </a:r>
-            <a:r>
-              <a:rPr lang="ru" dirty="0" smtClean="0"/>
-              <a:t>світі</a:t>
-            </a:r>
+              <a:rPr lang="ru-RU" sz="1400" dirty="0" smtClean="0"/>
+              <a:t>337 </a:t>
+            </a:r>
+            <a:r>
+              <a:rPr lang="ru-RU" sz="1400" dirty="0" err="1"/>
+              <a:t>мов</a:t>
+            </a:r>
+            <a:r>
+              <a:rPr lang="ru-RU" sz="1400" dirty="0"/>
+              <a:t> </a:t>
+            </a:r>
+            <a:r>
+              <a:rPr lang="ru-RU" sz="1400" dirty="0" err="1"/>
+              <a:t>програмування</a:t>
+            </a:r>
+            <a:r>
+              <a:rPr lang="ru-RU" sz="1400" dirty="0"/>
+              <a:t>, </a:t>
+            </a:r>
+            <a:r>
+              <a:rPr lang="ru-RU" sz="1400" dirty="0" err="1"/>
+              <a:t>серед</a:t>
+            </a:r>
+            <a:r>
+              <a:rPr lang="ru-RU" sz="1400" dirty="0"/>
+              <a:t> них </a:t>
+            </a:r>
+            <a:r>
+              <a:rPr lang="ru-RU" sz="1400" dirty="0" err="1"/>
+              <a:t>JavaScript</a:t>
+            </a:r>
+            <a:r>
+              <a:rPr lang="ru-RU" sz="1400" dirty="0"/>
+              <a:t> </a:t>
+            </a:r>
+            <a:r>
+              <a:rPr lang="ru-RU" sz="1400" dirty="0" err="1" smtClean="0"/>
+              <a:t>найпопулярніш</a:t>
+            </a:r>
+            <a:r>
+              <a:rPr lang="uk-UA" sz="1400" dirty="0" err="1" smtClean="0"/>
+              <a:t>ою</a:t>
+            </a:r>
+            <a:r>
+              <a:rPr lang="ru-RU" sz="1400" dirty="0" smtClean="0"/>
+              <a:t>;</a:t>
+            </a:r>
+          </a:p>
+          <a:p>
+            <a:pPr algn="just">
+              <a:buFont typeface="Lato"/>
+              <a:buChar char="-"/>
+            </a:pPr>
+            <a:r>
+              <a:rPr lang="uk-UA" sz="1400" dirty="0" smtClean="0"/>
+              <a:t>Серед проектів найбільш рейтинговим є </a:t>
+            </a:r>
+            <a:r>
+              <a:rPr lang="en-US" sz="1400" dirty="0" smtClean="0"/>
+              <a:t>Bootstrap, </a:t>
+            </a:r>
+            <a:r>
+              <a:rPr lang="uk-UA" sz="1400" dirty="0" smtClean="0"/>
+              <a:t>за ним йде </a:t>
+            </a:r>
+            <a:r>
+              <a:rPr lang="en-US" sz="1400" dirty="0" err="1" smtClean="0"/>
+              <a:t>TensorFlow</a:t>
+            </a:r>
+            <a:endParaRPr lang="ru-RU" sz="1400" dirty="0"/>
           </a:p>
         </p:txBody>
       </p:sp>
@@ -12672,21 +12740,30 @@
                             </p:childTnLst>
                           </p:cTn>
                         </p:par>
+                      </p:childTnLst>
+                    </p:cTn>
+                  </p:par>
+                  <p:par>
+                    <p:cTn id="12" fill="hold">
+                      <p:stCondLst>
+                        <p:cond delay="indefinite"/>
+                      </p:stCondLst>
+                      <p:childTnLst>
                         <p:par>
-                          <p:cTn id="12" fill="hold">
+                          <p:cTn id="13" fill="hold">
                             <p:stCondLst>
-                              <p:cond delay="1000"/>
+                              <p:cond delay="0"/>
                             </p:stCondLst>
                             <p:childTnLst>
                               <p:par>
-                                <p:cTn id="13" presetID="22" presetClass="entr" presetSubtype="8" fill="hold" grpId="0" nodeType="afterEffect">
+                                <p:cTn id="14" presetID="22" presetClass="entr" presetSubtype="8" fill="hold" grpId="0" nodeType="clickEffect">
                                   <p:stCondLst>
                                     <p:cond delay="0"/>
                                   </p:stCondLst>
                                   <p:childTnLst>
                                     <p:set>
                                       <p:cBhvr>
-                                        <p:cTn id="14" dur="1" fill="hold">
+                                        <p:cTn id="15" dur="1" fill="hold">
                                           <p:stCondLst>
                                             <p:cond delay="0"/>
                                           </p:stCondLst>
@@ -12708,7 +12785,7 @@
                                     </p:set>
                                     <p:animEffect transition="in" filter="wipe(left)">
                                       <p:cBhvr>
-                                        <p:cTn id="15" dur="500"/>
+                                        <p:cTn id="16" dur="500"/>
                                         <p:tgtEl>
                                           <p:spTgt spid="265">
                                             <p:txEl>
@@ -12724,21 +12801,30 @@
                             </p:childTnLst>
                           </p:cTn>
                         </p:par>
+                      </p:childTnLst>
+                    </p:cTn>
+                  </p:par>
+                  <p:par>
+                    <p:cTn id="17" fill="hold">
+                      <p:stCondLst>
+                        <p:cond delay="indefinite"/>
+                      </p:stCondLst>
+                      <p:childTnLst>
                         <p:par>
-                          <p:cTn id="16" fill="hold">
+                          <p:cTn id="18" fill="hold">
                             <p:stCondLst>
-                              <p:cond delay="1500"/>
+                              <p:cond delay="0"/>
                             </p:stCondLst>
                             <p:childTnLst>
                               <p:par>
-                                <p:cTn id="17" presetID="22" presetClass="entr" presetSubtype="8" fill="hold" grpId="0" nodeType="afterEffect">
+                                <p:cTn id="19" presetID="22" presetClass="entr" presetSubtype="8" fill="hold" grpId="0" nodeType="clickEffect">
                                   <p:stCondLst>
                                     <p:cond delay="0"/>
                                   </p:stCondLst>
                                   <p:childTnLst>
                                     <p:set>
                                       <p:cBhvr>
-                                        <p:cTn id="18" dur="1" fill="hold">
+                                        <p:cTn id="20" dur="1" fill="hold">
                                           <p:stCondLst>
                                             <p:cond delay="0"/>
                                           </p:stCondLst>
@@ -12760,7 +12846,7 @@
                                     </p:set>
                                     <p:animEffect transition="in" filter="wipe(left)">
                                       <p:cBhvr>
-                                        <p:cTn id="19" dur="500"/>
+                                        <p:cTn id="21" dur="500"/>
                                         <p:tgtEl>
                                           <p:spTgt spid="265">
                                             <p:txEl>
@@ -12776,21 +12862,82 @@
                             </p:childTnLst>
                           </p:cTn>
                         </p:par>
+                      </p:childTnLst>
+                    </p:cTn>
+                  </p:par>
+                  <p:par>
+                    <p:cTn id="22" fill="hold">
+                      <p:stCondLst>
+                        <p:cond delay="indefinite"/>
+                      </p:stCondLst>
+                      <p:childTnLst>
                         <p:par>
-                          <p:cTn id="20" fill="hold">
+                          <p:cTn id="23" fill="hold">
                             <p:stCondLst>
-                              <p:cond delay="2000"/>
+                              <p:cond delay="0"/>
                             </p:stCondLst>
                             <p:childTnLst>
                               <p:par>
-                                <p:cTn id="21" presetID="22" presetClass="entr" presetSubtype="1" fill="hold" nodeType="afterEffect">
+                                <p:cTn id="24" presetID="22" presetClass="entr" presetSubtype="8" fill="hold" grpId="0" nodeType="clickEffect">
                                   <p:stCondLst>
                                     <p:cond delay="0"/>
                                   </p:stCondLst>
                                   <p:childTnLst>
                                     <p:set>
                                       <p:cBhvr>
-                                        <p:cTn id="22" dur="1" fill="hold">
+                                        <p:cTn id="25" dur="1" fill="hold">
+                                          <p:stCondLst>
+                                            <p:cond delay="0"/>
+                                          </p:stCondLst>
+                                        </p:cTn>
+                                        <p:tgtEl>
+                                          <p:spTgt spid="265">
+                                            <p:txEl>
+                                              <p:pRg st="4" end="4"/>
+                                            </p:txEl>
+                                          </p:spTgt>
+                                        </p:tgtEl>
+                                        <p:attrNameLst>
+                                          <p:attrName>style.visibility</p:attrName>
+                                        </p:attrNameLst>
+                                      </p:cBhvr>
+                                      <p:to>
+                                        <p:strVal val="visible"/>
+                                      </p:to>
+                                    </p:set>
+                                    <p:animEffect transition="in" filter="wipe(left)">
+                                      <p:cBhvr>
+                                        <p:cTn id="26" dur="500"/>
+                                        <p:tgtEl>
+                                          <p:spTgt spid="265">
+                                            <p:txEl>
+                                              <p:pRg st="4" end="4"/>
+                                            </p:txEl>
+                                          </p:spTgt>
+                                        </p:tgtEl>
+                                      </p:cBhvr>
+                                    </p:animEffect>
+                                  </p:childTnLst>
+                                </p:cTn>
+                              </p:par>
+                            </p:childTnLst>
+                          </p:cTn>
+                        </p:par>
+                        <p:par>
+                          <p:cTn id="27" fill="hold">
+                            <p:stCondLst>
+                              <p:cond delay="500"/>
+                            </p:stCondLst>
+                            <p:childTnLst>
+                              <p:par>
+                                <p:cTn id="28" presetID="22" presetClass="entr" presetSubtype="1" fill="hold" nodeType="afterEffect">
+                                  <p:stCondLst>
+                                    <p:cond delay="0"/>
+                                  </p:stCondLst>
+                                  <p:childTnLst>
+                                    <p:set>
+                                      <p:cBhvr>
+                                        <p:cTn id="29" dur="1" fill="hold">
                                           <p:stCondLst>
                                             <p:cond delay="0"/>
                                           </p:stCondLst>
@@ -12808,7 +12955,7 @@
                                     </p:set>
                                     <p:animEffect transition="in" filter="wipe(up)">
                                       <p:cBhvr>
-                                        <p:cTn id="23" dur="500"/>
+                                        <p:cTn id="30" dur="500"/>
                                         <p:tgtEl>
                                           <p:spTgt spid="267"/>
                                         </p:tgtEl>
@@ -14270,7 +14417,7 @@
         <p:spPr>
           <a:xfrm>
             <a:off x="232699" y="1567550"/>
-            <a:ext cx="4542525" cy="2911200"/>
+            <a:ext cx="4459803" cy="2911200"/>
           </a:xfrm>
           <a:prstGeom prst="rect">
             <a:avLst/>
@@ -14282,7 +14429,7 @@
           </a:bodyPr>
           <a:lstStyle/>
           <a:p>
-            <a:pPr marL="146050" lvl="0" indent="0" algn="l" rtl="0">
+            <a:pPr marL="146050" lvl="0" indent="0" algn="just" rtl="0">
               <a:spcBef>
                 <a:spcPts val="0"/>
               </a:spcBef>
@@ -14310,7 +14457,7 @@
             </a:r>
           </a:p>
           <a:p>
-            <a:pPr marL="146050" lvl="0" indent="0" algn="l" rtl="0">
+            <a:pPr marL="146050" lvl="0" indent="0" algn="just" rtl="0">
               <a:spcBef>
                 <a:spcPts val="0"/>
               </a:spcBef>
@@ -14327,7 +14474,7 @@
             <a:endParaRPr dirty="0" smtClean="0"/>
           </a:p>
           <a:p>
-            <a:pPr marL="146050" lvl="0" indent="0" algn="l" rtl="0">
+            <a:pPr marL="146050" lvl="0" indent="0" algn="just" rtl="0">
               <a:spcBef>
                 <a:spcPts val="0"/>
               </a:spcBef>
@@ -14340,7 +14487,7 @@
             <a:endParaRPr lang="ru" b="1" i="1" dirty="0" smtClean="0"/>
           </a:p>
           <a:p>
-            <a:pPr marL="146050" lvl="0" indent="0" algn="l" rtl="0">
+            <a:pPr marL="146050" lvl="0" indent="0" algn="just" rtl="0">
               <a:spcBef>
                 <a:spcPts val="0"/>
               </a:spcBef>
@@ -14360,7 +14507,7 @@
             </a:r>
           </a:p>
           <a:p>
-            <a:pPr marL="146050" lvl="0" indent="0" algn="l" rtl="0">
+            <a:pPr marL="146050" lvl="0" indent="0" algn="just" rtl="0">
               <a:spcBef>
                 <a:spcPts val="0"/>
               </a:spcBef>
@@ -14385,7 +14532,7 @@
             <a:endParaRPr dirty="0" smtClean="0"/>
           </a:p>
           <a:p>
-            <a:pPr marL="146050" lvl="0" indent="0" algn="l" rtl="0">
+            <a:pPr marL="146050" lvl="0" indent="0" algn="just" rtl="0">
               <a:spcBef>
                 <a:spcPts val="1600"/>
               </a:spcBef>
@@ -15071,7 +15218,7 @@
           </a:bodyPr>
           <a:lstStyle/>
           <a:p>
-            <a:pPr marL="0" lvl="0" indent="0" algn="l" rtl="0">
+            <a:pPr marL="0" lvl="0" indent="0" algn="just" rtl="0">
               <a:spcBef>
                 <a:spcPts val="0"/>
               </a:spcBef>
@@ -15087,7 +15234,7 @@
             <a:endParaRPr dirty="0"/>
           </a:p>
           <a:p>
-            <a:pPr marL="457200" lvl="0" indent="-311150" algn="l" rtl="0">
+            <a:pPr marL="457200" lvl="0" indent="-311150" algn="just" rtl="0">
               <a:spcBef>
                 <a:spcPts val="0"/>
               </a:spcBef>
@@ -15104,7 +15251,7 @@
             <a:endParaRPr dirty="0"/>
           </a:p>
           <a:p>
-            <a:pPr marL="457200" lvl="0" indent="-311150" algn="l" rtl="0">
+            <a:pPr marL="457200" lvl="0" indent="-311150" algn="just" rtl="0">
               <a:spcBef>
                 <a:spcPts val="0"/>
               </a:spcBef>
@@ -15121,7 +15268,7 @@
             <a:endParaRPr dirty="0"/>
           </a:p>
           <a:p>
-            <a:pPr marL="457200" lvl="0" indent="0" algn="l" rtl="0">
+            <a:pPr marL="457200" lvl="0" indent="0" algn="just" rtl="0">
               <a:spcBef>
                 <a:spcPts val="0"/>
               </a:spcBef>
@@ -15137,7 +15284,7 @@
             <a:endParaRPr dirty="0"/>
           </a:p>
           <a:p>
-            <a:pPr marL="0" lvl="0" indent="0" algn="l" rtl="0">
+            <a:pPr marL="0" lvl="0" indent="0" algn="just" rtl="0">
               <a:spcBef>
                 <a:spcPts val="0"/>
               </a:spcBef>
@@ -15157,7 +15304,7 @@
             <a:endParaRPr lang="en-US" dirty="0" smtClean="0"/>
           </a:p>
           <a:p>
-            <a:pPr marL="0" lvl="0" indent="0" algn="l" rtl="0">
+            <a:pPr marL="0" lvl="0" indent="0" algn="just" rtl="0">
               <a:spcBef>
                 <a:spcPts val="0"/>
               </a:spcBef>
@@ -15169,7 +15316,7 @@
             <a:endParaRPr dirty="0"/>
           </a:p>
           <a:p>
-            <a:pPr marL="0" lvl="0" indent="0" algn="l" rtl="0">
+            <a:pPr marL="0" lvl="0" indent="0" algn="just" rtl="0">
               <a:spcBef>
                 <a:spcPts val="0"/>
               </a:spcBef>
@@ -15185,7 +15332,7 @@
             <a:endParaRPr dirty="0"/>
           </a:p>
           <a:p>
-            <a:pPr marL="0" lvl="0" indent="0" algn="l" rtl="0">
+            <a:pPr marL="0" lvl="0" indent="0" algn="just" rtl="0">
               <a:spcBef>
                 <a:spcPts val="0"/>
               </a:spcBef>
@@ -15206,7 +15353,7 @@
             <a:endParaRPr dirty="0"/>
           </a:p>
           <a:p>
-            <a:pPr marL="0" lvl="0" indent="0" algn="l" rtl="0">
+            <a:pPr marL="0" lvl="0" indent="0" algn="just" rtl="0">
               <a:spcBef>
                 <a:spcPts val="0"/>
               </a:spcBef>
@@ -15709,7 +15856,7 @@
           </a:bodyPr>
           <a:lstStyle/>
           <a:p>
-            <a:pPr marL="457200" lvl="0" indent="-311150" algn="l" rtl="0">
+            <a:pPr marL="457200" lvl="0" indent="-311150" algn="just" rtl="0">
               <a:spcBef>
                 <a:spcPts val="0"/>
               </a:spcBef>
@@ -15730,7 +15877,7 @@
             <a:endParaRPr sz="1600" dirty="0"/>
           </a:p>
           <a:p>
-            <a:pPr marL="457200" lvl="0" indent="-311150" algn="l" rtl="0">
+            <a:pPr marL="457200" lvl="0" indent="-311150" algn="just" rtl="0">
               <a:spcBef>
                 <a:spcPts val="0"/>
               </a:spcBef>
@@ -15751,7 +15898,7 @@
             <a:endParaRPr sz="1600" dirty="0"/>
           </a:p>
           <a:p>
-            <a:pPr marL="457200" lvl="0" indent="-311150" algn="l" rtl="0">
+            <a:pPr marL="457200" lvl="0" indent="-311150" algn="just" rtl="0">
               <a:spcBef>
                 <a:spcPts val="0"/>
               </a:spcBef>
@@ -15772,7 +15919,7 @@
             <a:endParaRPr sz="1600" dirty="0"/>
           </a:p>
           <a:p>
-            <a:pPr marL="457200" lvl="0" indent="-311150" algn="l" rtl="0">
+            <a:pPr marL="457200" lvl="0" indent="-311150" algn="just" rtl="0">
               <a:spcBef>
                 <a:spcPts val="0"/>
               </a:spcBef>
@@ -15793,7 +15940,7 @@
             <a:endParaRPr sz="1600" dirty="0"/>
           </a:p>
           <a:p>
-            <a:pPr marL="457200" lvl="0" indent="-311150" algn="l" rtl="0">
+            <a:pPr marL="457200" lvl="0" indent="-311150" algn="just" rtl="0">
               <a:spcBef>
                 <a:spcPts val="0"/>
               </a:spcBef>
@@ -15814,7 +15961,7 @@
             <a:endParaRPr sz="1600" dirty="0"/>
           </a:p>
           <a:p>
-            <a:pPr marL="457200" lvl="0" indent="-311150" algn="l" rtl="0">
+            <a:pPr marL="457200" lvl="0" indent="-311150" algn="just" rtl="0">
               <a:spcBef>
                 <a:spcPts val="0"/>
               </a:spcBef>
@@ -16272,7 +16419,7 @@
           </a:bodyPr>
           <a:lstStyle/>
           <a:p>
-            <a:pPr marL="457200" lvl="0" indent="-311150" algn="l" rtl="0">
+            <a:pPr marL="457200" lvl="0" indent="-311150" algn="just" rtl="0">
               <a:spcBef>
                 <a:spcPts val="0"/>
               </a:spcBef>
@@ -16289,7 +16436,7 @@
             <a:endParaRPr sz="1800" dirty="0"/>
           </a:p>
           <a:p>
-            <a:pPr marL="457200" lvl="0" indent="-311150" algn="l" rtl="0">
+            <a:pPr marL="457200" lvl="0" indent="-311150" algn="just" rtl="0">
               <a:spcBef>
                 <a:spcPts val="0"/>
               </a:spcBef>
@@ -16306,7 +16453,7 @@
             <a:endParaRPr sz="1800" dirty="0"/>
           </a:p>
           <a:p>
-            <a:pPr marL="457200" lvl="0" indent="-311150" algn="l" rtl="0">
+            <a:pPr marL="457200" lvl="0" indent="-311150" algn="just" rtl="0">
               <a:spcBef>
                 <a:spcPts val="0"/>
               </a:spcBef>
@@ -16323,7 +16470,7 @@
             <a:endParaRPr sz="1800" dirty="0"/>
           </a:p>
           <a:p>
-            <a:pPr marL="457200" lvl="0" indent="-311150" algn="l" rtl="0">
+            <a:pPr marL="457200" lvl="0" indent="-311150" algn="just" rtl="0">
               <a:spcBef>
                 <a:spcPts val="0"/>
               </a:spcBef>
@@ -16340,7 +16487,7 @@
             <a:endParaRPr sz="1800" dirty="0"/>
           </a:p>
           <a:p>
-            <a:pPr marL="457200" lvl="0" indent="-311150" algn="l" rtl="0">
+            <a:pPr marL="457200" lvl="0" indent="-311150" algn="just" rtl="0">
               <a:spcBef>
                 <a:spcPts val="0"/>
               </a:spcBef>
@@ -16448,7 +16595,7 @@
   <p:cSld>
     <p:spTree>
       <p:nvGrpSpPr>
-        <p:cNvPr id="1" name="Shape 331"/>
+        <p:cNvPr id="1" name=""/>
         <p:cNvGrpSpPr/>
         <p:nvPr/>
       </p:nvGrpSpPr>
@@ -16462,342 +16609,396 @@
       </p:grpSpPr>
       <p:sp>
         <p:nvSpPr>
-          <p:cNvPr id="332" name="Google Shape;332;p36"/>
-          <p:cNvSpPr txBox="1">
+          <p:cNvPr id="2" name="Заголовок 1"/>
+          <p:cNvSpPr>
             <a:spLocks noGrp="1"/>
           </p:cNvSpPr>
           <p:nvPr>
             <p:ph type="title"/>
           </p:nvPr>
         </p:nvSpPr>
+        <p:spPr/>
+        <p:txBody>
+          <a:bodyPr/>
+          <a:lstStyle/>
+          <a:p>
+            <a:endParaRPr lang="ru-RU"/>
+          </a:p>
+        </p:txBody>
+      </p:sp>
+      <p:sp>
+        <p:nvSpPr>
+          <p:cNvPr id="3" name="Текст 2"/>
+          <p:cNvSpPr>
+            <a:spLocks noGrp="1"/>
+          </p:cNvSpPr>
+          <p:nvPr>
+            <p:ph type="body" idx="1"/>
+          </p:nvPr>
+        </p:nvSpPr>
+        <p:spPr/>
+        <p:txBody>
+          <a:bodyPr/>
+          <a:lstStyle/>
+          <a:p>
+            <a:endParaRPr lang="ru-RU" dirty="0"/>
+          </a:p>
+        </p:txBody>
+      </p:sp>
+      <p:sp>
+        <p:nvSpPr>
+          <p:cNvPr id="4" name="Номер слайда 3"/>
+          <p:cNvSpPr>
+            <a:spLocks noGrp="1"/>
+          </p:cNvSpPr>
+          <p:nvPr>
+            <p:ph type="sldNum" idx="12"/>
+          </p:nvPr>
+        </p:nvSpPr>
+        <p:spPr/>
+        <p:txBody>
+          <a:bodyPr/>
+          <a:lstStyle/>
+          <a:p>
+            <a:pPr marL="0" lvl="0" indent="0" algn="r" rtl="0">
+              <a:spcBef>
+                <a:spcPts val="0"/>
+              </a:spcBef>
+              <a:spcAft>
+                <a:spcPts val="0"/>
+              </a:spcAft>
+              <a:buNone/>
+            </a:pPr>
+            <a:fld id="{00000000-1234-1234-1234-123412341234}" type="slidenum">
+              <a:rPr lang="ru" smtClean="0"/>
+              <a:t>19</a:t>
+            </a:fld>
+            <a:endParaRPr lang="ru"/>
+          </a:p>
+        </p:txBody>
+      </p:sp>
+      <p:sp>
+        <p:nvSpPr>
+          <p:cNvPr id="5" name="Прямоугольник 4"/>
+          <p:cNvSpPr/>
+          <p:nvPr/>
+        </p:nvSpPr>
         <p:spPr>
           <a:xfrm>
-            <a:off x="1297500" y="393750"/>
-            <a:ext cx="7038900" cy="914100"/>
+            <a:off x="1020387" y="2110085"/>
+            <a:ext cx="7103228" cy="923330"/>
+          </a:xfrm>
+          <a:prstGeom prst="rect">
+            <a:avLst/>
+          </a:prstGeom>
+          <a:noFill/>
+        </p:spPr>
+        <p:txBody>
+          <a:bodyPr wrap="none" lIns="91440" tIns="45720" rIns="91440" bIns="45720">
+            <a:spAutoFit/>
+          </a:bodyPr>
+          <a:lstStyle/>
+          <a:p>
+            <a:pPr algn="ctr"/>
+            <a:r>
+              <a:rPr lang="ru-RU" sz="5400" b="1" i="1" cap="none" spc="300" dirty="0" err="1" smtClean="0">
+                <a:ln w="11430" cmpd="sng">
+                  <a:solidFill>
+                    <a:schemeClr val="accent1">
+                      <a:tint val="10000"/>
+                    </a:schemeClr>
+                  </a:solidFill>
+                  <a:prstDash val="solid"/>
+                  <a:miter lim="800000"/>
+                </a:ln>
+                <a:gradFill>
+                  <a:gsLst>
+                    <a:gs pos="10000">
+                      <a:schemeClr val="accent1">
+                        <a:tint val="83000"/>
+                        <a:shade val="100000"/>
+                        <a:satMod val="200000"/>
+                      </a:schemeClr>
+                    </a:gs>
+                    <a:gs pos="75000">
+                      <a:schemeClr val="accent1">
+                        <a:tint val="100000"/>
+                        <a:shade val="50000"/>
+                        <a:satMod val="150000"/>
+                      </a:schemeClr>
+                    </a:gs>
+                  </a:gsLst>
+                  <a:lin ang="5400000"/>
+                </a:gradFill>
+                <a:effectLst>
+                  <a:glow rad="45500">
+                    <a:schemeClr val="accent1">
+                      <a:satMod val="220000"/>
+                      <a:alpha val="35000"/>
+                    </a:schemeClr>
+                  </a:glow>
+                </a:effectLst>
+              </a:rPr>
+              <a:t>Дяку</a:t>
+            </a:r>
+            <a:r>
+              <a:rPr lang="uk-UA" sz="5400" b="1" i="1" cap="none" spc="300" dirty="0" err="1" smtClean="0">
+                <a:ln w="11430" cmpd="sng">
+                  <a:solidFill>
+                    <a:schemeClr val="accent1">
+                      <a:tint val="10000"/>
+                    </a:schemeClr>
+                  </a:solidFill>
+                  <a:prstDash val="solid"/>
+                  <a:miter lim="800000"/>
+                </a:ln>
+                <a:gradFill>
+                  <a:gsLst>
+                    <a:gs pos="10000">
+                      <a:schemeClr val="accent1">
+                        <a:tint val="83000"/>
+                        <a:shade val="100000"/>
+                        <a:satMod val="200000"/>
+                      </a:schemeClr>
+                    </a:gs>
+                    <a:gs pos="75000">
+                      <a:schemeClr val="accent1">
+                        <a:tint val="100000"/>
+                        <a:shade val="50000"/>
+                        <a:satMod val="150000"/>
+                      </a:schemeClr>
+                    </a:gs>
+                  </a:gsLst>
+                  <a:lin ang="5400000"/>
+                </a:gradFill>
+                <a:effectLst>
+                  <a:glow rad="45500">
+                    <a:schemeClr val="accent1">
+                      <a:satMod val="220000"/>
+                      <a:alpha val="35000"/>
+                    </a:schemeClr>
+                  </a:glow>
+                </a:effectLst>
+              </a:rPr>
+              <a:t>ємо</a:t>
+            </a:r>
+            <a:r>
+              <a:rPr lang="ru-RU" sz="5400" b="1" i="1" cap="none" spc="300" dirty="0" smtClean="0">
+                <a:ln w="11430" cmpd="sng">
+                  <a:solidFill>
+                    <a:schemeClr val="accent1">
+                      <a:tint val="10000"/>
+                    </a:schemeClr>
+                  </a:solidFill>
+                  <a:prstDash val="solid"/>
+                  <a:miter lim="800000"/>
+                </a:ln>
+                <a:gradFill>
+                  <a:gsLst>
+                    <a:gs pos="10000">
+                      <a:schemeClr val="accent1">
+                        <a:tint val="83000"/>
+                        <a:shade val="100000"/>
+                        <a:satMod val="200000"/>
+                      </a:schemeClr>
+                    </a:gs>
+                    <a:gs pos="75000">
+                      <a:schemeClr val="accent1">
+                        <a:tint val="100000"/>
+                        <a:shade val="50000"/>
+                        <a:satMod val="150000"/>
+                      </a:schemeClr>
+                    </a:gs>
+                  </a:gsLst>
+                  <a:lin ang="5400000"/>
+                </a:gradFill>
+                <a:effectLst>
+                  <a:glow rad="45500">
+                    <a:schemeClr val="accent1">
+                      <a:satMod val="220000"/>
+                      <a:alpha val="35000"/>
+                    </a:schemeClr>
+                  </a:glow>
+                </a:effectLst>
+              </a:rPr>
+              <a:t> за </a:t>
+            </a:r>
+            <a:r>
+              <a:rPr lang="ru-RU" sz="5400" b="1" i="1" cap="none" spc="300" dirty="0" err="1" smtClean="0">
+                <a:ln w="11430" cmpd="sng">
+                  <a:solidFill>
+                    <a:schemeClr val="accent1">
+                      <a:tint val="10000"/>
+                    </a:schemeClr>
+                  </a:solidFill>
+                  <a:prstDash val="solid"/>
+                  <a:miter lim="800000"/>
+                </a:ln>
+                <a:gradFill>
+                  <a:gsLst>
+                    <a:gs pos="10000">
+                      <a:schemeClr val="accent1">
+                        <a:tint val="83000"/>
+                        <a:shade val="100000"/>
+                        <a:satMod val="200000"/>
+                      </a:schemeClr>
+                    </a:gs>
+                    <a:gs pos="75000">
+                      <a:schemeClr val="accent1">
+                        <a:tint val="100000"/>
+                        <a:shade val="50000"/>
+                        <a:satMod val="150000"/>
+                      </a:schemeClr>
+                    </a:gs>
+                  </a:gsLst>
+                  <a:lin ang="5400000"/>
+                </a:gradFill>
+                <a:effectLst>
+                  <a:glow rad="45500">
+                    <a:schemeClr val="accent1">
+                      <a:satMod val="220000"/>
+                      <a:alpha val="35000"/>
+                    </a:schemeClr>
+                  </a:glow>
+                </a:effectLst>
+              </a:rPr>
+              <a:t>увагу</a:t>
+            </a:r>
+            <a:r>
+              <a:rPr lang="ru-RU" sz="5400" b="1" i="1" cap="none" spc="300" dirty="0" smtClean="0">
+                <a:ln w="11430" cmpd="sng">
+                  <a:solidFill>
+                    <a:schemeClr val="accent1">
+                      <a:tint val="10000"/>
+                    </a:schemeClr>
+                  </a:solidFill>
+                  <a:prstDash val="solid"/>
+                  <a:miter lim="800000"/>
+                </a:ln>
+                <a:gradFill>
+                  <a:gsLst>
+                    <a:gs pos="10000">
+                      <a:schemeClr val="accent1">
+                        <a:tint val="83000"/>
+                        <a:shade val="100000"/>
+                        <a:satMod val="200000"/>
+                      </a:schemeClr>
+                    </a:gs>
+                    <a:gs pos="75000">
+                      <a:schemeClr val="accent1">
+                        <a:tint val="100000"/>
+                        <a:shade val="50000"/>
+                        <a:satMod val="150000"/>
+                      </a:schemeClr>
+                    </a:gs>
+                  </a:gsLst>
+                  <a:lin ang="5400000"/>
+                </a:gradFill>
+                <a:effectLst>
+                  <a:glow rad="45500">
+                    <a:schemeClr val="accent1">
+                      <a:satMod val="220000"/>
+                      <a:alpha val="35000"/>
+                    </a:schemeClr>
+                  </a:glow>
+                </a:effectLst>
+              </a:rPr>
+              <a:t>!</a:t>
+            </a:r>
+            <a:endParaRPr lang="ru-RU" sz="5400" b="1" i="1" cap="none" spc="300" dirty="0">
+              <a:ln w="11430" cmpd="sng">
+                <a:solidFill>
+                  <a:schemeClr val="accent1">
+                    <a:tint val="10000"/>
+                  </a:schemeClr>
+                </a:solidFill>
+                <a:prstDash val="solid"/>
+                <a:miter lim="800000"/>
+              </a:ln>
+              <a:gradFill>
+                <a:gsLst>
+                  <a:gs pos="10000">
+                    <a:schemeClr val="accent1">
+                      <a:tint val="83000"/>
+                      <a:shade val="100000"/>
+                      <a:satMod val="200000"/>
+                    </a:schemeClr>
+                  </a:gs>
+                  <a:gs pos="75000">
+                    <a:schemeClr val="accent1">
+                      <a:tint val="100000"/>
+                      <a:shade val="50000"/>
+                      <a:satMod val="150000"/>
+                    </a:schemeClr>
+                  </a:gs>
+                </a:gsLst>
+                <a:lin ang="5400000"/>
+              </a:gradFill>
+              <a:effectLst>
+                <a:glow rad="45500">
+                  <a:schemeClr val="accent1">
+                    <a:satMod val="220000"/>
+                    <a:alpha val="35000"/>
+                  </a:schemeClr>
+                </a:glow>
+              </a:effectLst>
+            </a:endParaRPr>
+          </a:p>
+        </p:txBody>
+      </p:sp>
+      <p:sp>
+        <p:nvSpPr>
+          <p:cNvPr id="6" name="Прямоугольник 5"/>
+          <p:cNvSpPr/>
+          <p:nvPr/>
+        </p:nvSpPr>
+        <p:spPr>
+          <a:xfrm>
+            <a:off x="7967759" y="225079"/>
+            <a:ext cx="986167" cy="477054"/>
           </a:xfrm>
           <a:prstGeom prst="rect">
             <a:avLst/>
           </a:prstGeom>
         </p:spPr>
         <p:txBody>
-          <a:bodyPr spcFirstLastPara="1" wrap="square" lIns="91425" tIns="91425" rIns="91425" bIns="91425" anchor="t" anchorCtr="0">
-            <a:noAutofit/>
+          <a:bodyPr wrap="none">
+            <a:spAutoFit/>
           </a:bodyPr>
           <a:lstStyle/>
           <a:p>
-            <a:pPr marL="0" lvl="0" indent="0" algn="l" rtl="0">
-              <a:spcBef>
-                <a:spcPts val="0"/>
-              </a:spcBef>
-              <a:spcAft>
-                <a:spcPts val="0"/>
-              </a:spcAft>
-              <a:buNone/>
-            </a:pPr>
-            <a:r>
-              <a:rPr lang="ru"/>
-              <a:t>Список використаних джерел</a:t>
-            </a:r>
-            <a:endParaRPr/>
-          </a:p>
-        </p:txBody>
-      </p:sp>
-      <p:sp>
-        <p:nvSpPr>
-          <p:cNvPr id="333" name="Google Shape;333;p36"/>
-          <p:cNvSpPr txBox="1">
-            <a:spLocks noGrp="1"/>
-          </p:cNvSpPr>
-          <p:nvPr>
-            <p:ph type="body" idx="1"/>
-          </p:nvPr>
-        </p:nvSpPr>
-        <p:spPr>
-          <a:xfrm>
-            <a:off x="311700" y="1152475"/>
-            <a:ext cx="5729700" cy="3416400"/>
-          </a:xfrm>
-          <a:prstGeom prst="rect">
-            <a:avLst/>
-          </a:prstGeom>
-        </p:spPr>
-        <p:txBody>
-          <a:bodyPr spcFirstLastPara="1" wrap="square" lIns="91425" tIns="91425" rIns="91425" bIns="91425" anchor="t" anchorCtr="0">
-            <a:noAutofit/>
-          </a:bodyPr>
-          <a:lstStyle/>
-          <a:p>
-            <a:pPr lvl="0">
-              <a:buAutoNum type="arabicPeriod"/>
-            </a:pPr>
-            <a:r>
-              <a:rPr lang="ru" u="sng" dirty="0">
-                <a:solidFill>
-                  <a:schemeClr val="hlink"/>
-                </a:solidFill>
-                <a:hlinkClick r:id="rId3"/>
-              </a:rPr>
-              <a:t>https://</a:t>
-            </a:r>
-            <a:r>
-              <a:rPr lang="ru" u="sng" dirty="0" smtClean="0">
-                <a:solidFill>
-                  <a:schemeClr val="hlink"/>
-                </a:solidFill>
-                <a:hlinkClick r:id="rId3"/>
-              </a:rPr>
-              <a:t>git-scm.com/book/ru/v2/</a:t>
-            </a:r>
-            <a:r>
-              <a:rPr lang="ru" u="sng" dirty="0" smtClean="0">
-                <a:solidFill>
-                  <a:schemeClr val="hlink"/>
-                </a:solidFill>
-              </a:rPr>
-              <a:t> </a:t>
-            </a:r>
-            <a:r>
-              <a:rPr lang="ru" b="1" dirty="0">
+            <a:pPr lvl="0" algn="r"/>
+            <a:fld id="{00000000-1234-1234-1234-123412341234}" type="slidenum">
+              <a:rPr lang="ru" sz="2500">
                 <a:solidFill>
                   <a:schemeClr val="bg1"/>
                 </a:solidFill>
               </a:rPr>
-              <a:t>.</a:t>
-            </a:r>
-            <a:endParaRPr lang="ru" u="sng" dirty="0" smtClean="0">
-              <a:solidFill>
-                <a:schemeClr val="hlink"/>
-              </a:solidFill>
-            </a:endParaRPr>
-          </a:p>
-          <a:p>
-            <a:pPr lvl="0">
-              <a:buAutoNum type="arabicPeriod"/>
-            </a:pPr>
-            <a:r>
-              <a:rPr lang="ru" u="sng" dirty="0">
-                <a:solidFill>
-                  <a:schemeClr val="hlink"/>
-                </a:solidFill>
-                <a:hlinkClick r:id="rId4"/>
-              </a:rPr>
-              <a:t>https://youtu.be/ykyERvz17LE/</a:t>
-            </a:r>
-            <a:r>
-              <a:rPr lang="ru" b="1" dirty="0" smtClean="0">
+              <a:pPr lvl="0" algn="r"/>
+              <a:t>19</a:t>
+            </a:fld>
+            <a:r>
+              <a:rPr lang="ru" sz="2500" dirty="0">
                 <a:solidFill>
                   <a:schemeClr val="bg1"/>
                 </a:solidFill>
               </a:rPr>
-              <a:t> .</a:t>
-            </a:r>
-          </a:p>
-          <a:p>
-            <a:pPr lvl="0">
-              <a:buAutoNum type="arabicPeriod"/>
-            </a:pPr>
-            <a:r>
-              <a:rPr lang="ru" u="sng" dirty="0">
-                <a:solidFill>
-                  <a:schemeClr val="hlink"/>
-                </a:solidFill>
-                <a:hlinkClick r:id="rId5"/>
-              </a:rPr>
-              <a:t>https://habr.com/ru/post/125799/</a:t>
-            </a:r>
-            <a:r>
-              <a:rPr lang="ru" b="1" dirty="0" smtClean="0">
-                <a:solidFill>
-                  <a:schemeClr val="bg1"/>
-                </a:solidFill>
-              </a:rPr>
-              <a:t> .</a:t>
-            </a:r>
-          </a:p>
-          <a:p>
-            <a:pPr lvl="0">
-              <a:buAutoNum type="arabicPeriod"/>
-            </a:pPr>
-            <a:r>
-              <a:rPr lang="ru" u="sng" dirty="0">
-                <a:solidFill>
-                  <a:schemeClr val="hlink"/>
-                </a:solidFill>
-                <a:hlinkClick r:id="rId6"/>
-              </a:rPr>
-              <a:t>https://habr.com/ru/post/106912/</a:t>
-            </a:r>
-            <a:r>
-              <a:rPr lang="ru" b="1" dirty="0" smtClean="0">
-                <a:solidFill>
-                  <a:schemeClr val="bg1"/>
-                </a:solidFill>
-              </a:rPr>
-              <a:t> .</a:t>
-            </a:r>
-          </a:p>
-          <a:p>
-            <a:pPr lvl="0">
-              <a:buAutoNum type="arabicPeriod"/>
-            </a:pPr>
-            <a:r>
-              <a:rPr lang="ru" u="sng" dirty="0">
-                <a:solidFill>
-                  <a:schemeClr val="hlink"/>
-                </a:solidFill>
-                <a:hlinkClick r:id="rId7"/>
-              </a:rPr>
-              <a:t>https://htmlacademy.ru/blog/99-github-as-hostin/</a:t>
-            </a:r>
-            <a:r>
-              <a:rPr lang="ru" b="1" dirty="0" smtClean="0">
-                <a:solidFill>
-                  <a:schemeClr val="bg1"/>
-                </a:solidFill>
-              </a:rPr>
-              <a:t> .</a:t>
-            </a:r>
-          </a:p>
-          <a:p>
-            <a:pPr lvl="0">
-              <a:buAutoNum type="arabicPeriod"/>
-            </a:pPr>
-            <a:r>
-              <a:rPr lang="ru" u="sng" dirty="0">
-                <a:solidFill>
-                  <a:schemeClr val="hlink"/>
-                </a:solidFill>
-                <a:hlinkClick r:id="rId8"/>
-              </a:rPr>
-              <a:t>https://git.wiki.kernel.org/</a:t>
-            </a:r>
-            <a:r>
-              <a:rPr lang="ru" b="1" dirty="0" smtClean="0">
-                <a:solidFill>
-                  <a:schemeClr val="bg1"/>
-                </a:solidFill>
-              </a:rPr>
-              <a:t> .</a:t>
-            </a:r>
-          </a:p>
-          <a:p>
-            <a:pPr lvl="0">
-              <a:buAutoNum type="arabicPeriod"/>
-            </a:pPr>
-            <a:r>
-              <a:rPr lang="ru" u="sng" dirty="0">
-                <a:solidFill>
-                  <a:schemeClr val="hlink"/>
-                </a:solidFill>
-                <a:hlinkClick r:id="rId9"/>
-              </a:rPr>
-              <a:t>https://github.com/github/gitignore/</a:t>
-            </a:r>
-            <a:r>
-              <a:rPr lang="ru" b="1" dirty="0" smtClean="0">
-                <a:solidFill>
-                  <a:schemeClr val="bg1"/>
-                </a:solidFill>
-              </a:rPr>
-              <a:t> .</a:t>
-            </a:r>
-            <a:r>
-              <a:rPr lang="ru" dirty="0" smtClean="0"/>
-              <a:t> </a:t>
-            </a:r>
-            <a:endParaRPr dirty="0">
+              <a:t>/20</a:t>
+            </a:r>
+            <a:endParaRPr lang="ru" sz="2500" dirty="0">
               <a:solidFill>
-                <a:srgbClr val="000000"/>
-              </a:solidFill>
-              <a:highlight>
-                <a:srgbClr val="FFFFFF"/>
-              </a:highlight>
-            </a:endParaRPr>
-          </a:p>
-        </p:txBody>
-      </p:sp>
-      <p:pic>
-        <p:nvPicPr>
-          <p:cNvPr id="334" name="Google Shape;334;p36"/>
-          <p:cNvPicPr preferRelativeResize="0"/>
-          <p:nvPr/>
-        </p:nvPicPr>
-        <p:blipFill rotWithShape="1">
-          <a:blip r:embed="rId10">
-            <a:alphaModFix/>
-          </a:blip>
-          <a:srcRect l="29062" r="29895"/>
-          <a:stretch/>
-        </p:blipFill>
-        <p:spPr>
-          <a:xfrm>
-            <a:off x="6181724" y="847879"/>
-            <a:ext cx="2814638" cy="3855670"/>
-          </a:xfrm>
-          <a:prstGeom prst="rect">
-            <a:avLst/>
-          </a:prstGeom>
-          <a:noFill/>
-          <a:ln>
-            <a:noFill/>
-          </a:ln>
-        </p:spPr>
-      </p:pic>
-      <p:sp>
-        <p:nvSpPr>
-          <p:cNvPr id="6" name="Google Shape;180;p18"/>
-          <p:cNvSpPr txBox="1">
-            <a:spLocks noGrp="1"/>
-          </p:cNvSpPr>
-          <p:nvPr>
-            <p:ph type="sldNum" idx="12"/>
-          </p:nvPr>
-        </p:nvSpPr>
-        <p:spPr>
-          <a:xfrm>
-            <a:off x="7926375" y="180000"/>
-            <a:ext cx="1094725" cy="568200"/>
-          </a:xfrm>
-          <a:prstGeom prst="rect">
-            <a:avLst/>
-          </a:prstGeom>
-        </p:spPr>
-        <p:txBody>
-          <a:bodyPr spcFirstLastPara="1" wrap="square" lIns="91425" tIns="91425" rIns="91425" bIns="91425" anchor="ctr" anchorCtr="0">
-            <a:noAutofit/>
-          </a:bodyPr>
-          <a:lstStyle/>
-          <a:p>
-            <a:pPr marL="0" lvl="0" indent="0" algn="r" rtl="0">
-              <a:spcBef>
-                <a:spcPts val="0"/>
-              </a:spcBef>
-              <a:spcAft>
-                <a:spcPts val="0"/>
-              </a:spcAft>
-              <a:buNone/>
-            </a:pPr>
-            <a:fld id="{00000000-1234-1234-1234-123412341234}" type="slidenum">
-              <a:rPr lang="ru" sz="2500" smtClean="0">
-                <a:solidFill>
-                  <a:schemeClr val="lt1"/>
-                </a:solidFill>
-              </a:rPr>
-              <a:t>19</a:t>
-            </a:fld>
-            <a:r>
-              <a:rPr lang="ru" sz="2500" dirty="0" smtClean="0"/>
-              <a:t>/20</a:t>
-            </a:r>
-            <a:endParaRPr sz="2500" dirty="0">
-              <a:solidFill>
-                <a:schemeClr val="lt1"/>
+                <a:schemeClr val="bg1"/>
               </a:solidFill>
             </a:endParaRPr>
           </a:p>
         </p:txBody>
       </p:sp>
     </p:spTree>
+    <p:extLst>
+      <p:ext uri="{BB962C8B-B14F-4D97-AF65-F5344CB8AC3E}">
+        <p14:creationId xmlns:p14="http://schemas.microsoft.com/office/powerpoint/2010/main" val="241963851"/>
+      </p:ext>
+    </p:extLst>
   </p:cSld>
   <p:clrMapOvr>
     <a:masterClrMapping/>
@@ -17920,6 +18121,408 @@
     <p:bldLst>
       <p:bldP spid="13" grpId="0" uiExpand="1" build="p"/>
     </p:bldLst>
+  </p:timing>
+</p:sld>
+</file>
+
+<file path=ppt/slides/slide20.xml><?xml version="1.0" encoding="utf-8"?>
+<p:sld xmlns:a="http://schemas.openxmlformats.org/drawingml/2006/main" xmlns:r="http://schemas.openxmlformats.org/officeDocument/2006/relationships" xmlns:p="http://schemas.openxmlformats.org/presentationml/2006/main" showMasterSp="0">
+  <p:cSld>
+    <p:spTree>
+      <p:nvGrpSpPr>
+        <p:cNvPr id="1" name="Shape 331"/>
+        <p:cNvGrpSpPr/>
+        <p:nvPr/>
+      </p:nvGrpSpPr>
+      <p:grpSpPr>
+        <a:xfrm>
+          <a:off x="0" y="0"/>
+          <a:ext cx="0" cy="0"/>
+          <a:chOff x="0" y="0"/>
+          <a:chExt cx="0" cy="0"/>
+        </a:xfrm>
+      </p:grpSpPr>
+      <p:sp>
+        <p:nvSpPr>
+          <p:cNvPr id="332" name="Google Shape;332;p36"/>
+          <p:cNvSpPr txBox="1">
+            <a:spLocks noGrp="1"/>
+          </p:cNvSpPr>
+          <p:nvPr>
+            <p:ph type="title"/>
+          </p:nvPr>
+        </p:nvSpPr>
+        <p:spPr>
+          <a:xfrm>
+            <a:off x="1297500" y="393750"/>
+            <a:ext cx="7038900" cy="914100"/>
+          </a:xfrm>
+          <a:prstGeom prst="rect">
+            <a:avLst/>
+          </a:prstGeom>
+        </p:spPr>
+        <p:txBody>
+          <a:bodyPr spcFirstLastPara="1" wrap="square" lIns="91425" tIns="91425" rIns="91425" bIns="91425" anchor="t" anchorCtr="0">
+            <a:noAutofit/>
+          </a:bodyPr>
+          <a:lstStyle/>
+          <a:p>
+            <a:pPr marL="0" lvl="0" indent="0" algn="l" rtl="0">
+              <a:spcBef>
+                <a:spcPts val="0"/>
+              </a:spcBef>
+              <a:spcAft>
+                <a:spcPts val="0"/>
+              </a:spcAft>
+              <a:buNone/>
+            </a:pPr>
+            <a:r>
+              <a:rPr lang="ru"/>
+              <a:t>Список використаних джерел</a:t>
+            </a:r>
+            <a:endParaRPr/>
+          </a:p>
+        </p:txBody>
+      </p:sp>
+      <p:sp>
+        <p:nvSpPr>
+          <p:cNvPr id="333" name="Google Shape;333;p36"/>
+          <p:cNvSpPr txBox="1">
+            <a:spLocks noGrp="1"/>
+          </p:cNvSpPr>
+          <p:nvPr>
+            <p:ph type="body" idx="1"/>
+          </p:nvPr>
+        </p:nvSpPr>
+        <p:spPr>
+          <a:xfrm>
+            <a:off x="311700" y="1152475"/>
+            <a:ext cx="5729700" cy="3416400"/>
+          </a:xfrm>
+          <a:prstGeom prst="rect">
+            <a:avLst/>
+          </a:prstGeom>
+        </p:spPr>
+        <p:txBody>
+          <a:bodyPr spcFirstLastPara="1" wrap="square" lIns="91425" tIns="91425" rIns="91425" bIns="91425" anchor="t" anchorCtr="0">
+            <a:noAutofit/>
+          </a:bodyPr>
+          <a:lstStyle/>
+          <a:p>
+            <a:pPr lvl="0">
+              <a:buAutoNum type="arabicPeriod"/>
+            </a:pPr>
+            <a:r>
+              <a:rPr lang="ru" u="sng" dirty="0">
+                <a:solidFill>
+                  <a:schemeClr val="hlink"/>
+                </a:solidFill>
+                <a:hlinkClick r:id="rId3"/>
+              </a:rPr>
+              <a:t>https://</a:t>
+            </a:r>
+            <a:r>
+              <a:rPr lang="ru" u="sng" dirty="0" smtClean="0">
+                <a:solidFill>
+                  <a:schemeClr val="hlink"/>
+                </a:solidFill>
+                <a:hlinkClick r:id="rId3"/>
+              </a:rPr>
+              <a:t>git-scm.com/book/ru/v2/</a:t>
+            </a:r>
+            <a:r>
+              <a:rPr lang="ru" u="sng" dirty="0" smtClean="0">
+                <a:solidFill>
+                  <a:schemeClr val="hlink"/>
+                </a:solidFill>
+              </a:rPr>
+              <a:t> </a:t>
+            </a:r>
+            <a:r>
+              <a:rPr lang="ru" b="1" dirty="0">
+                <a:solidFill>
+                  <a:schemeClr val="bg1"/>
+                </a:solidFill>
+              </a:rPr>
+              <a:t>.</a:t>
+            </a:r>
+            <a:endParaRPr lang="ru" u="sng" dirty="0" smtClean="0">
+              <a:solidFill>
+                <a:schemeClr val="hlink"/>
+              </a:solidFill>
+            </a:endParaRPr>
+          </a:p>
+          <a:p>
+            <a:pPr lvl="0">
+              <a:buAutoNum type="arabicPeriod"/>
+            </a:pPr>
+            <a:r>
+              <a:rPr lang="ru" u="sng" dirty="0">
+                <a:solidFill>
+                  <a:schemeClr val="hlink"/>
+                </a:solidFill>
+                <a:hlinkClick r:id="rId4"/>
+              </a:rPr>
+              <a:t>https://youtu.be/ykyERvz17LE/</a:t>
+            </a:r>
+            <a:r>
+              <a:rPr lang="ru" b="1" dirty="0" smtClean="0">
+                <a:solidFill>
+                  <a:schemeClr val="bg1"/>
+                </a:solidFill>
+              </a:rPr>
+              <a:t> .</a:t>
+            </a:r>
+          </a:p>
+          <a:p>
+            <a:pPr lvl="0">
+              <a:buAutoNum type="arabicPeriod"/>
+            </a:pPr>
+            <a:r>
+              <a:rPr lang="ru" u="sng" dirty="0">
+                <a:solidFill>
+                  <a:schemeClr val="hlink"/>
+                </a:solidFill>
+                <a:hlinkClick r:id="rId5"/>
+              </a:rPr>
+              <a:t>https://habr.com/ru/post/125799/</a:t>
+            </a:r>
+            <a:r>
+              <a:rPr lang="ru" b="1" dirty="0" smtClean="0">
+                <a:solidFill>
+                  <a:schemeClr val="bg1"/>
+                </a:solidFill>
+              </a:rPr>
+              <a:t> .</a:t>
+            </a:r>
+          </a:p>
+          <a:p>
+            <a:pPr lvl="0">
+              <a:buAutoNum type="arabicPeriod"/>
+            </a:pPr>
+            <a:r>
+              <a:rPr lang="ru" u="sng" dirty="0">
+                <a:solidFill>
+                  <a:schemeClr val="hlink"/>
+                </a:solidFill>
+                <a:hlinkClick r:id="rId6"/>
+              </a:rPr>
+              <a:t>https://habr.com/ru/post/106912/</a:t>
+            </a:r>
+            <a:r>
+              <a:rPr lang="ru" b="1" dirty="0" smtClean="0">
+                <a:solidFill>
+                  <a:schemeClr val="bg1"/>
+                </a:solidFill>
+              </a:rPr>
+              <a:t> .</a:t>
+            </a:r>
+          </a:p>
+          <a:p>
+            <a:pPr lvl="0">
+              <a:buAutoNum type="arabicPeriod"/>
+            </a:pPr>
+            <a:r>
+              <a:rPr lang="ru" u="sng" dirty="0">
+                <a:solidFill>
+                  <a:schemeClr val="hlink"/>
+                </a:solidFill>
+                <a:hlinkClick r:id="rId7"/>
+              </a:rPr>
+              <a:t>https://htmlacademy.ru/blog/99-github-as-hostin/</a:t>
+            </a:r>
+            <a:r>
+              <a:rPr lang="ru" b="1" dirty="0" smtClean="0">
+                <a:solidFill>
+                  <a:schemeClr val="bg1"/>
+                </a:solidFill>
+              </a:rPr>
+              <a:t> .</a:t>
+            </a:r>
+          </a:p>
+          <a:p>
+            <a:pPr lvl="0">
+              <a:buAutoNum type="arabicPeriod"/>
+            </a:pPr>
+            <a:r>
+              <a:rPr lang="ru" u="sng" dirty="0">
+                <a:solidFill>
+                  <a:schemeClr val="hlink"/>
+                </a:solidFill>
+                <a:hlinkClick r:id="rId8"/>
+              </a:rPr>
+              <a:t>https://git.wiki.kernel.org/</a:t>
+            </a:r>
+            <a:r>
+              <a:rPr lang="ru" b="1" dirty="0" smtClean="0">
+                <a:solidFill>
+                  <a:schemeClr val="bg1"/>
+                </a:solidFill>
+              </a:rPr>
+              <a:t> .</a:t>
+            </a:r>
+          </a:p>
+          <a:p>
+            <a:pPr lvl="0">
+              <a:buAutoNum type="arabicPeriod"/>
+            </a:pPr>
+            <a:r>
+              <a:rPr lang="ru" u="sng" dirty="0">
+                <a:solidFill>
+                  <a:schemeClr val="hlink"/>
+                </a:solidFill>
+                <a:hlinkClick r:id="rId9"/>
+              </a:rPr>
+              <a:t>https://github.com/github/gitignore/</a:t>
+            </a:r>
+            <a:r>
+              <a:rPr lang="ru" b="1" dirty="0" smtClean="0">
+                <a:solidFill>
+                  <a:schemeClr val="bg1"/>
+                </a:solidFill>
+              </a:rPr>
+              <a:t> .</a:t>
+            </a:r>
+            <a:r>
+              <a:rPr lang="ru" dirty="0" smtClean="0"/>
+              <a:t> </a:t>
+            </a:r>
+            <a:endParaRPr lang="en-US" dirty="0" smtClean="0"/>
+          </a:p>
+          <a:p>
+            <a:pPr lvl="0">
+              <a:buAutoNum type="arabicPeriod"/>
+            </a:pPr>
+            <a:r>
+              <a:rPr lang="en-US" u="sng" dirty="0">
+                <a:solidFill>
+                  <a:schemeClr val="hlink"/>
+                </a:solidFill>
+                <a:hlinkClick r:id="rId10"/>
+              </a:rPr>
+              <a:t>https://www.rankred.com/facts-and-statistics-about-github</a:t>
+            </a:r>
+            <a:r>
+              <a:rPr lang="en-US" u="sng" dirty="0" smtClean="0">
+                <a:solidFill>
+                  <a:schemeClr val="hlink"/>
+                </a:solidFill>
+                <a:hlinkClick r:id="rId10"/>
+              </a:rPr>
+              <a:t>/</a:t>
+            </a:r>
+            <a:r>
+              <a:rPr lang="ru" b="1" dirty="0">
+                <a:solidFill>
+                  <a:schemeClr val="bg1"/>
+                </a:solidFill>
+              </a:rPr>
+              <a:t> .</a:t>
+            </a:r>
+            <a:r>
+              <a:rPr lang="ru" dirty="0"/>
+              <a:t> </a:t>
+            </a:r>
+            <a:endParaRPr u="sng" dirty="0">
+              <a:solidFill>
+                <a:schemeClr val="hlink"/>
+              </a:solidFill>
+            </a:endParaRPr>
+          </a:p>
+        </p:txBody>
+      </p:sp>
+      <p:pic>
+        <p:nvPicPr>
+          <p:cNvPr id="334" name="Google Shape;334;p36"/>
+          <p:cNvPicPr preferRelativeResize="0"/>
+          <p:nvPr/>
+        </p:nvPicPr>
+        <p:blipFill rotWithShape="1">
+          <a:blip r:embed="rId11">
+            <a:alphaModFix/>
+          </a:blip>
+          <a:srcRect l="29062" r="29895"/>
+          <a:stretch/>
+        </p:blipFill>
+        <p:spPr>
+          <a:xfrm>
+            <a:off x="6181724" y="847879"/>
+            <a:ext cx="2814638" cy="3855670"/>
+          </a:xfrm>
+          <a:prstGeom prst="rect">
+            <a:avLst/>
+          </a:prstGeom>
+          <a:noFill/>
+          <a:ln>
+            <a:noFill/>
+          </a:ln>
+        </p:spPr>
+      </p:pic>
+      <p:sp>
+        <p:nvSpPr>
+          <p:cNvPr id="6" name="Google Shape;180;p18"/>
+          <p:cNvSpPr txBox="1">
+            <a:spLocks noGrp="1"/>
+          </p:cNvSpPr>
+          <p:nvPr>
+            <p:ph type="sldNum" idx="12"/>
+          </p:nvPr>
+        </p:nvSpPr>
+        <p:spPr>
+          <a:xfrm>
+            <a:off x="7926375" y="180000"/>
+            <a:ext cx="1094725" cy="568200"/>
+          </a:xfrm>
+          <a:prstGeom prst="rect">
+            <a:avLst/>
+          </a:prstGeom>
+        </p:spPr>
+        <p:txBody>
+          <a:bodyPr spcFirstLastPara="1" wrap="square" lIns="91425" tIns="91425" rIns="91425" bIns="91425" anchor="ctr" anchorCtr="0">
+            <a:noAutofit/>
+          </a:bodyPr>
+          <a:lstStyle/>
+          <a:p>
+            <a:pPr marL="0" lvl="0" indent="0" algn="r" rtl="0">
+              <a:spcBef>
+                <a:spcPts val="0"/>
+              </a:spcBef>
+              <a:spcAft>
+                <a:spcPts val="0"/>
+              </a:spcAft>
+              <a:buNone/>
+            </a:pPr>
+            <a:fld id="{00000000-1234-1234-1234-123412341234}" type="slidenum">
+              <a:rPr lang="ru" sz="2500" smtClean="0">
+                <a:solidFill>
+                  <a:schemeClr val="lt1"/>
+                </a:solidFill>
+              </a:rPr>
+              <a:t>20</a:t>
+            </a:fld>
+            <a:r>
+              <a:rPr lang="ru" sz="2500" dirty="0" smtClean="0"/>
+              <a:t>/20</a:t>
+            </a:r>
+            <a:endParaRPr sz="2500" dirty="0">
+              <a:solidFill>
+                <a:schemeClr val="lt1"/>
+              </a:solidFill>
+            </a:endParaRPr>
+          </a:p>
+        </p:txBody>
+      </p:sp>
+    </p:spTree>
+  </p:cSld>
+  <p:clrMapOvr>
+    <a:masterClrMapping/>
+  </p:clrMapOvr>
+  <p:timing>
+    <p:tnLst>
+      <p:par>
+        <p:cTn id="1" dur="indefinite" restart="never" nodeType="tmRoot"/>
+      </p:par>
+    </p:tnLst>
   </p:timing>
 </p:sld>
 </file>
@@ -19102,7 +19705,7 @@
           </a:bodyPr>
           <a:lstStyle/>
           <a:p>
-            <a:pPr marL="457200" lvl="0" indent="-311150" algn="l" rtl="0">
+            <a:pPr marL="457200" lvl="0" indent="-311150" algn="just" rtl="0">
               <a:spcBef>
                 <a:spcPts val="0"/>
               </a:spcBef>
@@ -19131,7 +19734,7 @@
             <a:endParaRPr dirty="0"/>
           </a:p>
           <a:p>
-            <a:pPr marL="914400" lvl="1" indent="-298450" algn="l" rtl="0">
+            <a:pPr marL="914400" lvl="1" indent="-298450" algn="just" rtl="0">
               <a:spcBef>
                 <a:spcPts val="0"/>
               </a:spcBef>
@@ -19160,7 +19763,7 @@
             <a:endParaRPr dirty="0"/>
           </a:p>
           <a:p>
-            <a:pPr marL="914400" lvl="1" indent="-298450" algn="l" rtl="0">
+            <a:pPr marL="914400" lvl="1" indent="-298450" algn="just" rtl="0">
               <a:spcBef>
                 <a:spcPts val="0"/>
               </a:spcBef>
@@ -19205,7 +19808,7 @@
             <a:endParaRPr dirty="0"/>
           </a:p>
           <a:p>
-            <a:pPr marL="457200" lvl="0" indent="-311150" algn="l" rtl="0">
+            <a:pPr marL="457200" lvl="0" indent="-311150" algn="just" rtl="0">
               <a:spcBef>
                 <a:spcPts val="0"/>
               </a:spcBef>
@@ -19230,7 +19833,7 @@
             <a:endParaRPr i="1" dirty="0"/>
           </a:p>
           <a:p>
-            <a:pPr marL="457200" lvl="0" indent="0" algn="l" rtl="0">
+            <a:pPr marL="457200" lvl="0" indent="0" algn="just" rtl="0">
               <a:spcBef>
                 <a:spcPts val="1600"/>
               </a:spcBef>
@@ -19785,7 +20388,7 @@
           </a:bodyPr>
           <a:lstStyle/>
           <a:p>
-            <a:pPr marL="457200" lvl="0" indent="-311150" algn="l" rtl="0">
+            <a:pPr marL="457200" lvl="0" indent="-311150" rtl="0">
               <a:spcBef>
                 <a:spcPts val="0"/>
               </a:spcBef>
@@ -19810,7 +20413,7 @@
             </a:endParaRPr>
           </a:p>
           <a:p>
-            <a:pPr marL="914400" lvl="1" indent="-298450" algn="l" rtl="0">
+            <a:pPr marL="914400" lvl="1" indent="-298450" rtl="0">
               <a:spcBef>
                 <a:spcPts val="0"/>
               </a:spcBef>
@@ -19878,7 +20481,7 @@
             </a:endParaRPr>
           </a:p>
           <a:p>
-            <a:pPr marL="457200" lvl="0" indent="-311150" algn="l" rtl="0">
+            <a:pPr marL="457200" lvl="0" indent="-311150" rtl="0">
               <a:spcBef>
                 <a:spcPts val="0"/>
               </a:spcBef>
@@ -19903,7 +20506,7 @@
             </a:endParaRPr>
           </a:p>
           <a:p>
-            <a:pPr marL="914400" lvl="1" indent="-298450" algn="l" rtl="0">
+            <a:pPr marL="914400" lvl="1" indent="-298450" rtl="0">
               <a:spcBef>
                 <a:spcPts val="0"/>
               </a:spcBef>
@@ -19964,7 +20567,7 @@
             </a:endParaRPr>
           </a:p>
           <a:p>
-            <a:pPr marL="914400" lvl="1" indent="-298450" algn="l" rtl="0">
+            <a:pPr marL="914400" lvl="1" indent="-298450" rtl="0">
               <a:spcBef>
                 <a:spcPts val="0"/>
               </a:spcBef>
@@ -20488,7 +21091,7 @@
           </a:bodyPr>
           <a:lstStyle/>
           <a:p>
-            <a:pPr marL="457200" lvl="0" indent="-311150" algn="l" rtl="0">
+            <a:pPr marL="457200" lvl="0" indent="-311150" algn="just" rtl="0">
               <a:spcBef>
                 <a:spcPts val="0"/>
               </a:spcBef>
@@ -20509,7 +21112,7 @@
             <a:endParaRPr dirty="0"/>
           </a:p>
           <a:p>
-            <a:pPr marL="914400" lvl="1" indent="-298450" algn="l" rtl="0">
+            <a:pPr marL="914400" lvl="1" indent="-298450" algn="just" rtl="0">
               <a:spcBef>
                 <a:spcPts val="0"/>
               </a:spcBef>
@@ -20546,7 +21149,7 @@
             <a:endParaRPr dirty="0"/>
           </a:p>
           <a:p>
-            <a:pPr marL="914400" lvl="1" indent="-298450" algn="l" rtl="0">
+            <a:pPr marL="914400" lvl="1" indent="-298450" algn="just" rtl="0">
               <a:spcBef>
                 <a:spcPts val="0"/>
               </a:spcBef>
@@ -20587,7 +21190,7 @@
             <a:endParaRPr dirty="0"/>
           </a:p>
           <a:p>
-            <a:pPr marL="457200" lvl="0" indent="-311150" algn="l" rtl="0">
+            <a:pPr marL="457200" lvl="0" indent="-311150" algn="just" rtl="0">
               <a:spcBef>
                 <a:spcPts val="0"/>
               </a:spcBef>
@@ -20624,7 +21227,7 @@
             <a:endParaRPr dirty="0"/>
           </a:p>
           <a:p>
-            <a:pPr marL="457200" lvl="0" indent="-311150" algn="l" rtl="0">
+            <a:pPr marL="457200" lvl="0" indent="-311150" algn="just" rtl="0">
               <a:spcBef>
                 <a:spcPts val="0"/>
               </a:spcBef>
@@ -20645,7 +21248,7 @@
             <a:endParaRPr dirty="0"/>
           </a:p>
           <a:p>
-            <a:pPr marL="914400" lvl="1" indent="-298450" algn="l" rtl="0">
+            <a:pPr marL="914400" lvl="1" indent="-298450" algn="just" rtl="0">
               <a:spcBef>
                 <a:spcPts val="0"/>
               </a:spcBef>
@@ -20703,7 +21306,7 @@
             <a:endParaRPr dirty="0"/>
           </a:p>
           <a:p>
-            <a:pPr marL="914400" lvl="1" indent="-298450" algn="l" rtl="0">
+            <a:pPr marL="914400" lvl="1" indent="-298450" algn="just" rtl="0">
               <a:spcBef>
                 <a:spcPts val="0"/>
               </a:spcBef>
@@ -21239,7 +21842,7 @@
           </a:bodyPr>
           <a:lstStyle/>
           <a:p>
-            <a:pPr marL="0" lvl="0" indent="0" algn="l" rtl="0">
+            <a:pPr marL="0" lvl="0" indent="0" rtl="0">
               <a:spcBef>
                 <a:spcPts val="0"/>
               </a:spcBef>
@@ -21291,7 +21894,7 @@
             <a:endParaRPr dirty="0"/>
           </a:p>
           <a:p>
-            <a:pPr marL="0" lvl="0" indent="0" algn="l" rtl="0">
+            <a:pPr marL="0" lvl="0" indent="0" rtl="0">
               <a:spcBef>
                 <a:spcPts val="1600"/>
               </a:spcBef>
@@ -21333,7 +21936,7 @@
             <a:endParaRPr dirty="0"/>
           </a:p>
           <a:p>
-            <a:pPr marL="0" lvl="0" indent="0" algn="l" rtl="0">
+            <a:pPr marL="0" lvl="0" indent="0" rtl="0">
               <a:spcBef>
                 <a:spcPts val="1600"/>
               </a:spcBef>
@@ -21765,7 +22368,7 @@
           </a:bodyPr>
           <a:lstStyle/>
           <a:p>
-            <a:pPr marL="457200" lvl="0" indent="-311150" algn="l" rtl="0">
+            <a:pPr marL="457200" lvl="0" indent="-311150" algn="just" rtl="0">
               <a:spcBef>
                 <a:spcPts val="0"/>
               </a:spcBef>
@@ -21776,17 +22379,17 @@
               <a:buChar char="-"/>
             </a:pPr>
             <a:r>
-              <a:rPr lang="ru" b="1" dirty="0"/>
+              <a:rPr lang="ru" sz="1400" b="1" dirty="0"/>
               <a:t>створення </a:t>
             </a:r>
             <a:r>
-              <a:rPr lang="ru" dirty="0"/>
+              <a:rPr lang="ru" sz="1400" dirty="0"/>
               <a:t>нової гілки: git branch &lt;new_branch&gt;</a:t>
             </a:r>
-            <a:endParaRPr dirty="0"/>
+            <a:endParaRPr sz="1400" dirty="0"/>
           </a:p>
           <a:p>
-            <a:pPr marL="457200" lvl="0" indent="-311150" algn="l" rtl="0">
+            <a:pPr marL="457200" lvl="0" indent="-311150" algn="just" rtl="0">
               <a:spcBef>
                 <a:spcPts val="0"/>
               </a:spcBef>
@@ -21797,17 +22400,17 @@
               <a:buChar char="-"/>
             </a:pPr>
             <a:r>
-              <a:rPr lang="ru" b="1" dirty="0"/>
+              <a:rPr lang="ru" sz="1400" b="1" dirty="0"/>
               <a:t>перемикання </a:t>
             </a:r>
             <a:r>
-              <a:rPr lang="ru" dirty="0"/>
+              <a:rPr lang="ru" sz="1400" dirty="0"/>
               <a:t>на нову гілку: git checkout &lt;new_branch&gt;</a:t>
             </a:r>
-            <a:endParaRPr dirty="0"/>
+            <a:endParaRPr sz="1400" dirty="0"/>
           </a:p>
           <a:p>
-            <a:pPr marL="457200" lvl="0" indent="-311150" algn="l" rtl="0">
+            <a:pPr marL="457200" lvl="0" indent="-311150" algn="just" rtl="0">
               <a:spcBef>
                 <a:spcPts val="0"/>
               </a:spcBef>
@@ -21818,22 +22421,22 @@
               <a:buChar char="-"/>
             </a:pPr>
             <a:r>
-              <a:rPr lang="ru" b="1" dirty="0"/>
+              <a:rPr lang="ru" sz="1400" b="1" dirty="0"/>
               <a:t>створення </a:t>
             </a:r>
             <a:r>
-              <a:rPr lang="ru" dirty="0"/>
+              <a:rPr lang="ru" sz="1400" dirty="0"/>
               <a:t>нової гілки та </a:t>
             </a:r>
             <a:r>
-              <a:rPr lang="ru" b="1" dirty="0"/>
+              <a:rPr lang="ru" sz="1400" b="1" dirty="0"/>
               <a:t>перемикання </a:t>
             </a:r>
             <a:r>
-              <a:rPr lang="ru" dirty="0"/>
+              <a:rPr lang="ru" sz="1400" dirty="0"/>
               <a:t>на неї: git checkout -b &lt;new_branch&gt;</a:t>
             </a:r>
-            <a:endParaRPr dirty="0"/>
+            <a:endParaRPr sz="1400" dirty="0"/>
           </a:p>
         </p:txBody>
       </p:sp>
@@ -22150,7 +22753,7 @@
           </a:bodyPr>
           <a:lstStyle/>
           <a:p>
-            <a:pPr marL="457200" lvl="0" indent="-311150" algn="l" rtl="0">
+            <a:pPr marL="457200" lvl="0" indent="-311150" algn="just" rtl="0">
               <a:spcBef>
                 <a:spcPts val="0"/>
               </a:spcBef>
@@ -22171,7 +22774,7 @@
             <a:endParaRPr dirty="0"/>
           </a:p>
           <a:p>
-            <a:pPr marL="457200" lvl="0" indent="-311150" algn="l" rtl="0">
+            <a:pPr marL="457200" lvl="0" indent="-311150" algn="just" rtl="0">
               <a:spcBef>
                 <a:spcPts val="0"/>
               </a:spcBef>
@@ -22192,7 +22795,7 @@
             <a:endParaRPr dirty="0"/>
           </a:p>
           <a:p>
-            <a:pPr marL="457200" lvl="0" indent="-311150" algn="l" rtl="0">
+            <a:pPr marL="457200" lvl="0" indent="-311150" algn="just" rtl="0">
               <a:spcBef>
                 <a:spcPts val="0"/>
               </a:spcBef>
@@ -22213,7 +22816,7 @@
             <a:endParaRPr dirty="0"/>
           </a:p>
           <a:p>
-            <a:pPr marL="0" lvl="0" indent="0" algn="l" rtl="0">
+            <a:pPr marL="0" lvl="0" indent="0" algn="just" rtl="0">
               <a:spcBef>
                 <a:spcPts val="1600"/>
               </a:spcBef>

</xml_diff>